<commit_message>
painting/erasing can now be disabled
painting/erasing can now be disabled
</commit_message>
<xml_diff>
--- a/Preview.pptx
+++ b/Preview.pptx
@@ -259,7 +259,7 @@
           <a:p>
             <a:fld id="{159B554F-0A3C-4E11-9282-850BA7307B97}" type="datetimeFigureOut">
               <a:rPr lang="de-DE" smtClean="0"/>
-              <a:t>27.05.2018</a:t>
+              <a:t>07.06.2018</a:t>
             </a:fld>
             <a:endParaRPr lang="de-DE"/>
           </a:p>
@@ -457,7 +457,7 @@
           <a:p>
             <a:fld id="{159B554F-0A3C-4E11-9282-850BA7307B97}" type="datetimeFigureOut">
               <a:rPr lang="de-DE" smtClean="0"/>
-              <a:t>27.05.2018</a:t>
+              <a:t>07.06.2018</a:t>
             </a:fld>
             <a:endParaRPr lang="de-DE"/>
           </a:p>
@@ -665,7 +665,7 @@
           <a:p>
             <a:fld id="{159B554F-0A3C-4E11-9282-850BA7307B97}" type="datetimeFigureOut">
               <a:rPr lang="de-DE" smtClean="0"/>
-              <a:t>27.05.2018</a:t>
+              <a:t>07.06.2018</a:t>
             </a:fld>
             <a:endParaRPr lang="de-DE"/>
           </a:p>
@@ -863,7 +863,7 @@
           <a:p>
             <a:fld id="{159B554F-0A3C-4E11-9282-850BA7307B97}" type="datetimeFigureOut">
               <a:rPr lang="de-DE" smtClean="0"/>
-              <a:t>27.05.2018</a:t>
+              <a:t>07.06.2018</a:t>
             </a:fld>
             <a:endParaRPr lang="de-DE"/>
           </a:p>
@@ -1138,7 +1138,7 @@
           <a:p>
             <a:fld id="{159B554F-0A3C-4E11-9282-850BA7307B97}" type="datetimeFigureOut">
               <a:rPr lang="de-DE" smtClean="0"/>
-              <a:t>27.05.2018</a:t>
+              <a:t>07.06.2018</a:t>
             </a:fld>
             <a:endParaRPr lang="de-DE"/>
           </a:p>
@@ -1403,7 +1403,7 @@
           <a:p>
             <a:fld id="{159B554F-0A3C-4E11-9282-850BA7307B97}" type="datetimeFigureOut">
               <a:rPr lang="de-DE" smtClean="0"/>
-              <a:t>27.05.2018</a:t>
+              <a:t>07.06.2018</a:t>
             </a:fld>
             <a:endParaRPr lang="de-DE"/>
           </a:p>
@@ -1815,7 +1815,7 @@
           <a:p>
             <a:fld id="{159B554F-0A3C-4E11-9282-850BA7307B97}" type="datetimeFigureOut">
               <a:rPr lang="de-DE" smtClean="0"/>
-              <a:t>27.05.2018</a:t>
+              <a:t>07.06.2018</a:t>
             </a:fld>
             <a:endParaRPr lang="de-DE"/>
           </a:p>
@@ -1956,7 +1956,7 @@
           <a:p>
             <a:fld id="{159B554F-0A3C-4E11-9282-850BA7307B97}" type="datetimeFigureOut">
               <a:rPr lang="de-DE" smtClean="0"/>
-              <a:t>27.05.2018</a:t>
+              <a:t>07.06.2018</a:t>
             </a:fld>
             <a:endParaRPr lang="de-DE"/>
           </a:p>
@@ -2069,7 +2069,7 @@
           <a:p>
             <a:fld id="{159B554F-0A3C-4E11-9282-850BA7307B97}" type="datetimeFigureOut">
               <a:rPr lang="de-DE" smtClean="0"/>
-              <a:t>27.05.2018</a:t>
+              <a:t>07.06.2018</a:t>
             </a:fld>
             <a:endParaRPr lang="de-DE"/>
           </a:p>
@@ -2380,7 +2380,7 @@
           <a:p>
             <a:fld id="{159B554F-0A3C-4E11-9282-850BA7307B97}" type="datetimeFigureOut">
               <a:rPr lang="de-DE" smtClean="0"/>
-              <a:t>27.05.2018</a:t>
+              <a:t>07.06.2018</a:t>
             </a:fld>
             <a:endParaRPr lang="de-DE"/>
           </a:p>
@@ -2668,7 +2668,7 @@
           <a:p>
             <a:fld id="{159B554F-0A3C-4E11-9282-850BA7307B97}" type="datetimeFigureOut">
               <a:rPr lang="de-DE" smtClean="0"/>
-              <a:t>27.05.2018</a:t>
+              <a:t>07.06.2018</a:t>
             </a:fld>
             <a:endParaRPr lang="de-DE"/>
           </a:p>
@@ -2909,7 +2909,7 @@
           <a:p>
             <a:fld id="{159B554F-0A3C-4E11-9282-850BA7307B97}" type="datetimeFigureOut">
               <a:rPr lang="de-DE" smtClean="0"/>
-              <a:t>27.05.2018</a:t>
+              <a:t>07.06.2018</a:t>
             </a:fld>
             <a:endParaRPr lang="de-DE"/>
           </a:p>
@@ -3328,10 +3328,10 @@
       </p:grpSpPr>
       <p:pic>
         <p:nvPicPr>
-          <p:cNvPr id="2" name="Grafik 1">
-            <a:extLst>
-              <a:ext uri="{FF2B5EF4-FFF2-40B4-BE49-F238E27FC236}">
-                <a16:creationId xmlns:a16="http://schemas.microsoft.com/office/drawing/2014/main" id="{7F8EA301-7BAA-4CDC-B4AE-A052F08841D0}"/>
+          <p:cNvPr id="3" name="Grafik 2">
+            <a:extLst>
+              <a:ext uri="{FF2B5EF4-FFF2-40B4-BE49-F238E27FC236}">
+                <a16:creationId xmlns:a16="http://schemas.microsoft.com/office/drawing/2014/main" id="{618C46F7-93D6-4E92-A810-0683FB3C6E60}"/>
               </a:ext>
             </a:extLst>
           </p:cNvPr>
@@ -3348,8 +3348,8 @@
         </p:blipFill>
         <p:spPr>
           <a:xfrm>
-            <a:off x="3279870" y="404271"/>
-            <a:ext cx="5632253" cy="6049457"/>
+            <a:off x="3568180" y="446956"/>
+            <a:ext cx="4762088" cy="5878343"/>
           </a:xfrm>
           <a:prstGeom prst="rect">
             <a:avLst/>
@@ -3370,8 +3370,8 @@
         </p:nvSpPr>
         <p:spPr>
           <a:xfrm>
-            <a:off x="3279873" y="5687736"/>
-            <a:ext cx="5632253" cy="637563"/>
+            <a:off x="3568180" y="5457475"/>
+            <a:ext cx="4762088" cy="788564"/>
           </a:xfrm>
           <a:prstGeom prst="rect">
             <a:avLst/>
@@ -3425,8 +3425,8 @@
         </p:nvSpPr>
         <p:spPr>
           <a:xfrm>
-            <a:off x="3279873" y="4345498"/>
-            <a:ext cx="5632253" cy="1247118"/>
+            <a:off x="3568180" y="3796452"/>
+            <a:ext cx="4762088" cy="1631226"/>
           </a:xfrm>
           <a:prstGeom prst="rect">
             <a:avLst/>
@@ -3479,8 +3479,8 @@
         </p:nvSpPr>
         <p:spPr>
           <a:xfrm>
-            <a:off x="3279872" y="3791824"/>
-            <a:ext cx="5632253" cy="506114"/>
+            <a:off x="3568180" y="3007887"/>
+            <a:ext cx="4762088" cy="758769"/>
           </a:xfrm>
           <a:prstGeom prst="rect">
             <a:avLst/>
@@ -3533,8 +3533,8 @@
         </p:nvSpPr>
         <p:spPr>
           <a:xfrm>
-            <a:off x="3279871" y="532701"/>
-            <a:ext cx="5632253" cy="3211563"/>
+            <a:off x="3568180" y="485141"/>
+            <a:ext cx="4762088" cy="2492951"/>
           </a:xfrm>
           <a:prstGeom prst="rect">
             <a:avLst/>

</xml_diff>

<commit_message>
Bug fixes, Multi Brush Painting, Version 3.0
Bug fixes
Multi Brush Painting
Colorization of some of the buttons (wow!)
Code cleanup (regions)
</commit_message>
<xml_diff>
--- a/Preview.pptx
+++ b/Preview.pptx
@@ -259,7 +259,7 @@
           <a:p>
             <a:fld id="{159B554F-0A3C-4E11-9282-850BA7307B97}" type="datetimeFigureOut">
               <a:rPr lang="de-DE" smtClean="0"/>
-              <a:t>07.06.2018</a:t>
+              <a:t>16.06.2018</a:t>
             </a:fld>
             <a:endParaRPr lang="de-DE"/>
           </a:p>
@@ -457,7 +457,7 @@
           <a:p>
             <a:fld id="{159B554F-0A3C-4E11-9282-850BA7307B97}" type="datetimeFigureOut">
               <a:rPr lang="de-DE" smtClean="0"/>
-              <a:t>07.06.2018</a:t>
+              <a:t>16.06.2018</a:t>
             </a:fld>
             <a:endParaRPr lang="de-DE"/>
           </a:p>
@@ -665,7 +665,7 @@
           <a:p>
             <a:fld id="{159B554F-0A3C-4E11-9282-850BA7307B97}" type="datetimeFigureOut">
               <a:rPr lang="de-DE" smtClean="0"/>
-              <a:t>07.06.2018</a:t>
+              <a:t>16.06.2018</a:t>
             </a:fld>
             <a:endParaRPr lang="de-DE"/>
           </a:p>
@@ -863,7 +863,7 @@
           <a:p>
             <a:fld id="{159B554F-0A3C-4E11-9282-850BA7307B97}" type="datetimeFigureOut">
               <a:rPr lang="de-DE" smtClean="0"/>
-              <a:t>07.06.2018</a:t>
+              <a:t>16.06.2018</a:t>
             </a:fld>
             <a:endParaRPr lang="de-DE"/>
           </a:p>
@@ -1138,7 +1138,7 @@
           <a:p>
             <a:fld id="{159B554F-0A3C-4E11-9282-850BA7307B97}" type="datetimeFigureOut">
               <a:rPr lang="de-DE" smtClean="0"/>
-              <a:t>07.06.2018</a:t>
+              <a:t>16.06.2018</a:t>
             </a:fld>
             <a:endParaRPr lang="de-DE"/>
           </a:p>
@@ -1403,7 +1403,7 @@
           <a:p>
             <a:fld id="{159B554F-0A3C-4E11-9282-850BA7307B97}" type="datetimeFigureOut">
               <a:rPr lang="de-DE" smtClean="0"/>
-              <a:t>07.06.2018</a:t>
+              <a:t>16.06.2018</a:t>
             </a:fld>
             <a:endParaRPr lang="de-DE"/>
           </a:p>
@@ -1815,7 +1815,7 @@
           <a:p>
             <a:fld id="{159B554F-0A3C-4E11-9282-850BA7307B97}" type="datetimeFigureOut">
               <a:rPr lang="de-DE" smtClean="0"/>
-              <a:t>07.06.2018</a:t>
+              <a:t>16.06.2018</a:t>
             </a:fld>
             <a:endParaRPr lang="de-DE"/>
           </a:p>
@@ -1956,7 +1956,7 @@
           <a:p>
             <a:fld id="{159B554F-0A3C-4E11-9282-850BA7307B97}" type="datetimeFigureOut">
               <a:rPr lang="de-DE" smtClean="0"/>
-              <a:t>07.06.2018</a:t>
+              <a:t>16.06.2018</a:t>
             </a:fld>
             <a:endParaRPr lang="de-DE"/>
           </a:p>
@@ -2069,7 +2069,7 @@
           <a:p>
             <a:fld id="{159B554F-0A3C-4E11-9282-850BA7307B97}" type="datetimeFigureOut">
               <a:rPr lang="de-DE" smtClean="0"/>
-              <a:t>07.06.2018</a:t>
+              <a:t>16.06.2018</a:t>
             </a:fld>
             <a:endParaRPr lang="de-DE"/>
           </a:p>
@@ -2380,7 +2380,7 @@
           <a:p>
             <a:fld id="{159B554F-0A3C-4E11-9282-850BA7307B97}" type="datetimeFigureOut">
               <a:rPr lang="de-DE" smtClean="0"/>
-              <a:t>07.06.2018</a:t>
+              <a:t>16.06.2018</a:t>
             </a:fld>
             <a:endParaRPr lang="de-DE"/>
           </a:p>
@@ -2668,7 +2668,7 @@
           <a:p>
             <a:fld id="{159B554F-0A3C-4E11-9282-850BA7307B97}" type="datetimeFigureOut">
               <a:rPr lang="de-DE" smtClean="0"/>
-              <a:t>07.06.2018</a:t>
+              <a:t>16.06.2018</a:t>
             </a:fld>
             <a:endParaRPr lang="de-DE"/>
           </a:p>
@@ -2909,7 +2909,7 @@
           <a:p>
             <a:fld id="{159B554F-0A3C-4E11-9282-850BA7307B97}" type="datetimeFigureOut">
               <a:rPr lang="de-DE" smtClean="0"/>
-              <a:t>07.06.2018</a:t>
+              <a:t>16.06.2018</a:t>
             </a:fld>
             <a:endParaRPr lang="de-DE"/>
           </a:p>
@@ -3328,10 +3328,10 @@
       </p:grpSpPr>
       <p:pic>
         <p:nvPicPr>
-          <p:cNvPr id="3" name="Grafik 2">
-            <a:extLst>
-              <a:ext uri="{FF2B5EF4-FFF2-40B4-BE49-F238E27FC236}">
-                <a16:creationId xmlns:a16="http://schemas.microsoft.com/office/drawing/2014/main" id="{618C46F7-93D6-4E92-A810-0683FB3C6E60}"/>
+          <p:cNvPr id="4" name="Grafik 3">
+            <a:extLst>
+              <a:ext uri="{FF2B5EF4-FFF2-40B4-BE49-F238E27FC236}">
+                <a16:creationId xmlns:a16="http://schemas.microsoft.com/office/drawing/2014/main" id="{DC106B7F-66BB-4A20-A632-85DFF13F4C35}"/>
               </a:ext>
             </a:extLst>
           </p:cNvPr>
@@ -3348,8 +3348,8 @@
         </p:blipFill>
         <p:spPr>
           <a:xfrm>
-            <a:off x="3568180" y="446956"/>
-            <a:ext cx="4762088" cy="5878343"/>
+            <a:off x="2300287" y="152400"/>
+            <a:ext cx="7591425" cy="6553200"/>
           </a:xfrm>
           <a:prstGeom prst="rect">
             <a:avLst/>
@@ -3370,8 +3370,8 @@
         </p:nvSpPr>
         <p:spPr>
           <a:xfrm>
-            <a:off x="3568180" y="5457475"/>
-            <a:ext cx="4762088" cy="788564"/>
+            <a:off x="2300285" y="5833437"/>
+            <a:ext cx="7591425" cy="872163"/>
           </a:xfrm>
           <a:prstGeom prst="rect">
             <a:avLst/>
@@ -3425,8 +3425,8 @@
         </p:nvSpPr>
         <p:spPr>
           <a:xfrm>
-            <a:off x="3568180" y="3796452"/>
-            <a:ext cx="4762088" cy="1631226"/>
+            <a:off x="2300286" y="4125936"/>
+            <a:ext cx="7591424" cy="1677705"/>
           </a:xfrm>
           <a:prstGeom prst="rect">
             <a:avLst/>
@@ -3479,8 +3479,8 @@
         </p:nvSpPr>
         <p:spPr>
           <a:xfrm>
-            <a:off x="3568180" y="3007887"/>
-            <a:ext cx="4762088" cy="758769"/>
+            <a:off x="2300286" y="3230197"/>
+            <a:ext cx="7591425" cy="865942"/>
           </a:xfrm>
           <a:prstGeom prst="rect">
             <a:avLst/>
@@ -3533,8 +3533,8 @@
         </p:nvSpPr>
         <p:spPr>
           <a:xfrm>
-            <a:off x="3568180" y="485141"/>
-            <a:ext cx="4762088" cy="2492951"/>
+            <a:off x="2300287" y="233265"/>
+            <a:ext cx="7591425" cy="2967134"/>
           </a:xfrm>
           <a:prstGeom prst="rect">
             <a:avLst/>

</xml_diff>

<commit_message>
Updated documentation, version number
</commit_message>
<xml_diff>
--- a/Preview.pptx
+++ b/Preview.pptx
@@ -259,7 +259,7 @@
           <a:p>
             <a:fld id="{159B554F-0A3C-4E11-9282-850BA7307B97}" type="datetimeFigureOut">
               <a:rPr lang="de-DE" smtClean="0"/>
-              <a:t>16.06.2018</a:t>
+              <a:t>28.07.2018</a:t>
             </a:fld>
             <a:endParaRPr lang="de-DE"/>
           </a:p>
@@ -457,7 +457,7 @@
           <a:p>
             <a:fld id="{159B554F-0A3C-4E11-9282-850BA7307B97}" type="datetimeFigureOut">
               <a:rPr lang="de-DE" smtClean="0"/>
-              <a:t>16.06.2018</a:t>
+              <a:t>28.07.2018</a:t>
             </a:fld>
             <a:endParaRPr lang="de-DE"/>
           </a:p>
@@ -665,7 +665,7 @@
           <a:p>
             <a:fld id="{159B554F-0A3C-4E11-9282-850BA7307B97}" type="datetimeFigureOut">
               <a:rPr lang="de-DE" smtClean="0"/>
-              <a:t>16.06.2018</a:t>
+              <a:t>28.07.2018</a:t>
             </a:fld>
             <a:endParaRPr lang="de-DE"/>
           </a:p>
@@ -863,7 +863,7 @@
           <a:p>
             <a:fld id="{159B554F-0A3C-4E11-9282-850BA7307B97}" type="datetimeFigureOut">
               <a:rPr lang="de-DE" smtClean="0"/>
-              <a:t>16.06.2018</a:t>
+              <a:t>28.07.2018</a:t>
             </a:fld>
             <a:endParaRPr lang="de-DE"/>
           </a:p>
@@ -1138,7 +1138,7 @@
           <a:p>
             <a:fld id="{159B554F-0A3C-4E11-9282-850BA7307B97}" type="datetimeFigureOut">
               <a:rPr lang="de-DE" smtClean="0"/>
-              <a:t>16.06.2018</a:t>
+              <a:t>28.07.2018</a:t>
             </a:fld>
             <a:endParaRPr lang="de-DE"/>
           </a:p>
@@ -1403,7 +1403,7 @@
           <a:p>
             <a:fld id="{159B554F-0A3C-4E11-9282-850BA7307B97}" type="datetimeFigureOut">
               <a:rPr lang="de-DE" smtClean="0"/>
-              <a:t>16.06.2018</a:t>
+              <a:t>28.07.2018</a:t>
             </a:fld>
             <a:endParaRPr lang="de-DE"/>
           </a:p>
@@ -1815,7 +1815,7 @@
           <a:p>
             <a:fld id="{159B554F-0A3C-4E11-9282-850BA7307B97}" type="datetimeFigureOut">
               <a:rPr lang="de-DE" smtClean="0"/>
-              <a:t>16.06.2018</a:t>
+              <a:t>28.07.2018</a:t>
             </a:fld>
             <a:endParaRPr lang="de-DE"/>
           </a:p>
@@ -1956,7 +1956,7 @@
           <a:p>
             <a:fld id="{159B554F-0A3C-4E11-9282-850BA7307B97}" type="datetimeFigureOut">
               <a:rPr lang="de-DE" smtClean="0"/>
-              <a:t>16.06.2018</a:t>
+              <a:t>28.07.2018</a:t>
             </a:fld>
             <a:endParaRPr lang="de-DE"/>
           </a:p>
@@ -2069,7 +2069,7 @@
           <a:p>
             <a:fld id="{159B554F-0A3C-4E11-9282-850BA7307B97}" type="datetimeFigureOut">
               <a:rPr lang="de-DE" smtClean="0"/>
-              <a:t>16.06.2018</a:t>
+              <a:t>28.07.2018</a:t>
             </a:fld>
             <a:endParaRPr lang="de-DE"/>
           </a:p>
@@ -2380,7 +2380,7 @@
           <a:p>
             <a:fld id="{159B554F-0A3C-4E11-9282-850BA7307B97}" type="datetimeFigureOut">
               <a:rPr lang="de-DE" smtClean="0"/>
-              <a:t>16.06.2018</a:t>
+              <a:t>28.07.2018</a:t>
             </a:fld>
             <a:endParaRPr lang="de-DE"/>
           </a:p>
@@ -2668,7 +2668,7 @@
           <a:p>
             <a:fld id="{159B554F-0A3C-4E11-9282-850BA7307B97}" type="datetimeFigureOut">
               <a:rPr lang="de-DE" smtClean="0"/>
-              <a:t>16.06.2018</a:t>
+              <a:t>28.07.2018</a:t>
             </a:fld>
             <a:endParaRPr lang="de-DE"/>
           </a:p>
@@ -2909,7 +2909,7 @@
           <a:p>
             <a:fld id="{159B554F-0A3C-4E11-9282-850BA7307B97}" type="datetimeFigureOut">
               <a:rPr lang="de-DE" smtClean="0"/>
-              <a:t>16.06.2018</a:t>
+              <a:t>28.07.2018</a:t>
             </a:fld>
             <a:endParaRPr lang="de-DE"/>
           </a:p>
@@ -3328,10 +3328,10 @@
       </p:grpSpPr>
       <p:pic>
         <p:nvPicPr>
-          <p:cNvPr id="4" name="Grafik 3">
-            <a:extLst>
-              <a:ext uri="{FF2B5EF4-FFF2-40B4-BE49-F238E27FC236}">
-                <a16:creationId xmlns:a16="http://schemas.microsoft.com/office/drawing/2014/main" id="{DC106B7F-66BB-4A20-A632-85DFF13F4C35}"/>
+          <p:cNvPr id="3" name="Grafik 2">
+            <a:extLst>
+              <a:ext uri="{FF2B5EF4-FFF2-40B4-BE49-F238E27FC236}">
+                <a16:creationId xmlns:a16="http://schemas.microsoft.com/office/drawing/2014/main" id="{D5638E30-966B-45F0-A6FF-DADFB91E0CB0}"/>
               </a:ext>
             </a:extLst>
           </p:cNvPr>
@@ -3348,8 +3348,8 @@
         </p:blipFill>
         <p:spPr>
           <a:xfrm>
-            <a:off x="2300287" y="152400"/>
-            <a:ext cx="7591425" cy="6553200"/>
+            <a:off x="2300285" y="233265"/>
+            <a:ext cx="7629525" cy="6581775"/>
           </a:xfrm>
           <a:prstGeom prst="rect">
             <a:avLst/>
@@ -3370,8 +3370,8 @@
         </p:nvSpPr>
         <p:spPr>
           <a:xfrm>
-            <a:off x="2300285" y="5833437"/>
-            <a:ext cx="7591425" cy="872163"/>
+            <a:off x="2300285" y="5871797"/>
+            <a:ext cx="7591425" cy="943243"/>
           </a:xfrm>
           <a:prstGeom prst="rect">
             <a:avLst/>
@@ -3425,8 +3425,8 @@
         </p:nvSpPr>
         <p:spPr>
           <a:xfrm>
-            <a:off x="2300286" y="4125936"/>
-            <a:ext cx="7591424" cy="1677705"/>
+            <a:off x="2300286" y="4054110"/>
+            <a:ext cx="7591424" cy="1787890"/>
           </a:xfrm>
           <a:prstGeom prst="rect">
             <a:avLst/>
@@ -3480,7 +3480,7 @@
         <p:spPr>
           <a:xfrm>
             <a:off x="2300286" y="3230197"/>
-            <a:ext cx="7591425" cy="865942"/>
+            <a:ext cx="7591425" cy="794116"/>
           </a:xfrm>
           <a:prstGeom prst="rect">
             <a:avLst/>

</xml_diff>

<commit_message>
Updated selected colors and .pptx
Updated selected colors and .pptx
</commit_message>
<xml_diff>
--- a/Preview.pptx
+++ b/Preview.pptx
@@ -2,10 +2,11 @@
 <file path=ppt/presentation.xml><?xml version="1.0" encoding="utf-8"?>
 <p:presentation xmlns:a="http://schemas.openxmlformats.org/drawingml/2006/main" xmlns:r="http://schemas.openxmlformats.org/officeDocument/2006/relationships" xmlns:p="http://schemas.openxmlformats.org/presentationml/2006/main" saveSubsetFonts="1">
   <p:sldMasterIdLst>
-    <p:sldMasterId id="2147483648" r:id="rId1"/>
+    <p:sldMasterId id="2147483696" r:id="rId1"/>
   </p:sldMasterIdLst>
   <p:sldIdLst>
     <p:sldId id="256" r:id="rId2"/>
+    <p:sldId id="257" r:id="rId3"/>
   </p:sldIdLst>
   <p:sldSz cx="12192000" cy="6858000"/>
   <p:notesSz cx="6858000" cy="9144000"/>
@@ -134,7 +135,7 @@
           <p:cNvPr id="2" name="Titel 1">
             <a:extLst>
               <a:ext uri="{FF2B5EF4-FFF2-40B4-BE49-F238E27FC236}">
-                <a16:creationId xmlns:a16="http://schemas.microsoft.com/office/drawing/2014/main" id="{08AC9A1D-3057-4DC8-9910-579FE9D9ACDE}"/>
+                <a16:creationId xmlns:a16="http://schemas.microsoft.com/office/drawing/2014/main" id="{C1E6BE8B-17E1-44B6-BEDF-23C9094EABB2}"/>
               </a:ext>
             </a:extLst>
           </p:cNvPr>
@@ -171,7 +172,7 @@
           <p:cNvPr id="3" name="Untertitel 2">
             <a:extLst>
               <a:ext uri="{FF2B5EF4-FFF2-40B4-BE49-F238E27FC236}">
-                <a16:creationId xmlns:a16="http://schemas.microsoft.com/office/drawing/2014/main" id="{3C0828AA-3352-4CB5-9E7A-73AEFF944280}"/>
+                <a16:creationId xmlns:a16="http://schemas.microsoft.com/office/drawing/2014/main" id="{60A0593C-8636-4C5E-8133-A5F488439BD4}"/>
               </a:ext>
             </a:extLst>
           </p:cNvPr>
@@ -241,7 +242,7 @@
           <p:cNvPr id="4" name="Datumsplatzhalter 3">
             <a:extLst>
               <a:ext uri="{FF2B5EF4-FFF2-40B4-BE49-F238E27FC236}">
-                <a16:creationId xmlns:a16="http://schemas.microsoft.com/office/drawing/2014/main" id="{BF3723BD-53BB-4F43-9C23-383E12265D38}"/>
+                <a16:creationId xmlns:a16="http://schemas.microsoft.com/office/drawing/2014/main" id="{7AECAC8D-ABBA-404C-8550-06B35E4FB580}"/>
               </a:ext>
             </a:extLst>
           </p:cNvPr>
@@ -259,7 +260,7 @@
           <a:p>
             <a:fld id="{159B554F-0A3C-4E11-9282-850BA7307B97}" type="datetimeFigureOut">
               <a:rPr lang="de-DE" smtClean="0"/>
-              <a:t>28.07.2018</a:t>
+              <a:t>04.08.2018</a:t>
             </a:fld>
             <a:endParaRPr lang="de-DE"/>
           </a:p>
@@ -270,7 +271,7 @@
           <p:cNvPr id="5" name="Fußzeilenplatzhalter 4">
             <a:extLst>
               <a:ext uri="{FF2B5EF4-FFF2-40B4-BE49-F238E27FC236}">
-                <a16:creationId xmlns:a16="http://schemas.microsoft.com/office/drawing/2014/main" id="{0B583561-37EE-4A19-AD43-DB645D79AF7D}"/>
+                <a16:creationId xmlns:a16="http://schemas.microsoft.com/office/drawing/2014/main" id="{66796619-2B5A-4442-ADB5-FA69367A3041}"/>
               </a:ext>
             </a:extLst>
           </p:cNvPr>
@@ -295,7 +296,7 @@
           <p:cNvPr id="6" name="Foliennummernplatzhalter 5">
             <a:extLst>
               <a:ext uri="{FF2B5EF4-FFF2-40B4-BE49-F238E27FC236}">
-                <a16:creationId xmlns:a16="http://schemas.microsoft.com/office/drawing/2014/main" id="{810A853C-F773-45A8-B167-02956D40A3E6}"/>
+                <a16:creationId xmlns:a16="http://schemas.microsoft.com/office/drawing/2014/main" id="{C2FA9096-B3D6-4211-9DAC-B4376D8C73EE}"/>
               </a:ext>
             </a:extLst>
           </p:cNvPr>
@@ -322,7 +323,7 @@
     </p:spTree>
     <p:extLst>
       <p:ext uri="{BB962C8B-B14F-4D97-AF65-F5344CB8AC3E}">
-        <p14:creationId xmlns:p14="http://schemas.microsoft.com/office/powerpoint/2010/main" val="1631294404"/>
+        <p14:creationId xmlns:p14="http://schemas.microsoft.com/office/powerpoint/2010/main" val="230230547"/>
       </p:ext>
     </p:extLst>
   </p:cSld>
@@ -354,7 +355,7 @@
           <p:cNvPr id="2" name="Titel 1">
             <a:extLst>
               <a:ext uri="{FF2B5EF4-FFF2-40B4-BE49-F238E27FC236}">
-                <a16:creationId xmlns:a16="http://schemas.microsoft.com/office/drawing/2014/main" id="{E61300A7-DE15-4FE6-AFCB-298C82F59E38}"/>
+                <a16:creationId xmlns:a16="http://schemas.microsoft.com/office/drawing/2014/main" id="{6AA6311E-CA45-4285-82EF-B3B606718BAA}"/>
               </a:ext>
             </a:extLst>
           </p:cNvPr>
@@ -382,7 +383,7 @@
           <p:cNvPr id="3" name="Vertikaler Textplatzhalter 2">
             <a:extLst>
               <a:ext uri="{FF2B5EF4-FFF2-40B4-BE49-F238E27FC236}">
-                <a16:creationId xmlns:a16="http://schemas.microsoft.com/office/drawing/2014/main" id="{F0F25197-7201-48A5-B808-3328FE03F817}"/>
+                <a16:creationId xmlns:a16="http://schemas.microsoft.com/office/drawing/2014/main" id="{1FBE7712-194C-4D58-B734-F2C6209EC6C6}"/>
               </a:ext>
             </a:extLst>
           </p:cNvPr>
@@ -439,7 +440,7 @@
           <p:cNvPr id="4" name="Datumsplatzhalter 3">
             <a:extLst>
               <a:ext uri="{FF2B5EF4-FFF2-40B4-BE49-F238E27FC236}">
-                <a16:creationId xmlns:a16="http://schemas.microsoft.com/office/drawing/2014/main" id="{D9165052-BAD3-4E26-9281-2C3EBC7CE19F}"/>
+                <a16:creationId xmlns:a16="http://schemas.microsoft.com/office/drawing/2014/main" id="{5071EC87-0533-47AE-AAAD-7F1B010588F9}"/>
               </a:ext>
             </a:extLst>
           </p:cNvPr>
@@ -457,7 +458,7 @@
           <a:p>
             <a:fld id="{159B554F-0A3C-4E11-9282-850BA7307B97}" type="datetimeFigureOut">
               <a:rPr lang="de-DE" smtClean="0"/>
-              <a:t>28.07.2018</a:t>
+              <a:t>04.08.2018</a:t>
             </a:fld>
             <a:endParaRPr lang="de-DE"/>
           </a:p>
@@ -468,7 +469,7 @@
           <p:cNvPr id="5" name="Fußzeilenplatzhalter 4">
             <a:extLst>
               <a:ext uri="{FF2B5EF4-FFF2-40B4-BE49-F238E27FC236}">
-                <a16:creationId xmlns:a16="http://schemas.microsoft.com/office/drawing/2014/main" id="{2EFA7E32-B565-484E-B75A-0B88DBF48D49}"/>
+                <a16:creationId xmlns:a16="http://schemas.microsoft.com/office/drawing/2014/main" id="{BA5BEF1C-199E-4040-9F4B-07A0AA4C9DD4}"/>
               </a:ext>
             </a:extLst>
           </p:cNvPr>
@@ -493,7 +494,7 @@
           <p:cNvPr id="6" name="Foliennummernplatzhalter 5">
             <a:extLst>
               <a:ext uri="{FF2B5EF4-FFF2-40B4-BE49-F238E27FC236}">
-                <a16:creationId xmlns:a16="http://schemas.microsoft.com/office/drawing/2014/main" id="{97597E7D-C374-42DC-B8CE-94B706C14F6E}"/>
+                <a16:creationId xmlns:a16="http://schemas.microsoft.com/office/drawing/2014/main" id="{678FD20B-6B76-4E3A-AAB0-A27DE4EB1C05}"/>
               </a:ext>
             </a:extLst>
           </p:cNvPr>
@@ -520,7 +521,7 @@
     </p:spTree>
     <p:extLst>
       <p:ext uri="{BB962C8B-B14F-4D97-AF65-F5344CB8AC3E}">
-        <p14:creationId xmlns:p14="http://schemas.microsoft.com/office/powerpoint/2010/main" val="1489813557"/>
+        <p14:creationId xmlns:p14="http://schemas.microsoft.com/office/powerpoint/2010/main" val="3800259622"/>
       </p:ext>
     </p:extLst>
   </p:cSld>
@@ -552,7 +553,7 @@
           <p:cNvPr id="2" name="Vertikaler Titel 1">
             <a:extLst>
               <a:ext uri="{FF2B5EF4-FFF2-40B4-BE49-F238E27FC236}">
-                <a16:creationId xmlns:a16="http://schemas.microsoft.com/office/drawing/2014/main" id="{F72D73FF-5580-43A6-B312-4D7980C41E90}"/>
+                <a16:creationId xmlns:a16="http://schemas.microsoft.com/office/drawing/2014/main" id="{E2E53794-C156-46D6-AB64-9544B4CD458D}"/>
               </a:ext>
             </a:extLst>
           </p:cNvPr>
@@ -585,7 +586,7 @@
           <p:cNvPr id="3" name="Vertikaler Textplatzhalter 2">
             <a:extLst>
               <a:ext uri="{FF2B5EF4-FFF2-40B4-BE49-F238E27FC236}">
-                <a16:creationId xmlns:a16="http://schemas.microsoft.com/office/drawing/2014/main" id="{0A21CB39-67CF-42D9-A93C-9F40CB7B56EB}"/>
+                <a16:creationId xmlns:a16="http://schemas.microsoft.com/office/drawing/2014/main" id="{8773D126-2401-4C6C-B8CF-ECD48D8E076B}"/>
               </a:ext>
             </a:extLst>
           </p:cNvPr>
@@ -647,7 +648,7 @@
           <p:cNvPr id="4" name="Datumsplatzhalter 3">
             <a:extLst>
               <a:ext uri="{FF2B5EF4-FFF2-40B4-BE49-F238E27FC236}">
-                <a16:creationId xmlns:a16="http://schemas.microsoft.com/office/drawing/2014/main" id="{E7B16F9B-07E6-4946-BB6B-5F80CECC6D07}"/>
+                <a16:creationId xmlns:a16="http://schemas.microsoft.com/office/drawing/2014/main" id="{AF9298AC-B320-489E-AFE2-CFE0975EA9D3}"/>
               </a:ext>
             </a:extLst>
           </p:cNvPr>
@@ -665,7 +666,7 @@
           <a:p>
             <a:fld id="{159B554F-0A3C-4E11-9282-850BA7307B97}" type="datetimeFigureOut">
               <a:rPr lang="de-DE" smtClean="0"/>
-              <a:t>28.07.2018</a:t>
+              <a:t>04.08.2018</a:t>
             </a:fld>
             <a:endParaRPr lang="de-DE"/>
           </a:p>
@@ -676,7 +677,7 @@
           <p:cNvPr id="5" name="Fußzeilenplatzhalter 4">
             <a:extLst>
               <a:ext uri="{FF2B5EF4-FFF2-40B4-BE49-F238E27FC236}">
-                <a16:creationId xmlns:a16="http://schemas.microsoft.com/office/drawing/2014/main" id="{D0C5AB09-6BC5-4C5E-94C4-41813BE93022}"/>
+                <a16:creationId xmlns:a16="http://schemas.microsoft.com/office/drawing/2014/main" id="{0E45BD6C-70DC-43F7-BE24-BD5BF3774E97}"/>
               </a:ext>
             </a:extLst>
           </p:cNvPr>
@@ -701,7 +702,7 @@
           <p:cNvPr id="6" name="Foliennummernplatzhalter 5">
             <a:extLst>
               <a:ext uri="{FF2B5EF4-FFF2-40B4-BE49-F238E27FC236}">
-                <a16:creationId xmlns:a16="http://schemas.microsoft.com/office/drawing/2014/main" id="{893975A5-FE6E-44A7-9271-495C3AC4A4D2}"/>
+                <a16:creationId xmlns:a16="http://schemas.microsoft.com/office/drawing/2014/main" id="{B9328C4F-324A-4295-A483-A312056D6D32}"/>
               </a:ext>
             </a:extLst>
           </p:cNvPr>
@@ -728,7 +729,7 @@
     </p:spTree>
     <p:extLst>
       <p:ext uri="{BB962C8B-B14F-4D97-AF65-F5344CB8AC3E}">
-        <p14:creationId xmlns:p14="http://schemas.microsoft.com/office/powerpoint/2010/main" val="3738638352"/>
+        <p14:creationId xmlns:p14="http://schemas.microsoft.com/office/powerpoint/2010/main" val="1680674499"/>
       </p:ext>
     </p:extLst>
   </p:cSld>
@@ -760,7 +761,7 @@
           <p:cNvPr id="2" name="Titel 1">
             <a:extLst>
               <a:ext uri="{FF2B5EF4-FFF2-40B4-BE49-F238E27FC236}">
-                <a16:creationId xmlns:a16="http://schemas.microsoft.com/office/drawing/2014/main" id="{4AA97324-08E8-48CE-8A52-D7FA0380E431}"/>
+                <a16:creationId xmlns:a16="http://schemas.microsoft.com/office/drawing/2014/main" id="{4DD18C4F-F2A4-4E90-AA65-3E634C4CB3D0}"/>
               </a:ext>
             </a:extLst>
           </p:cNvPr>
@@ -788,7 +789,7 @@
           <p:cNvPr id="3" name="Inhaltsplatzhalter 2">
             <a:extLst>
               <a:ext uri="{FF2B5EF4-FFF2-40B4-BE49-F238E27FC236}">
-                <a16:creationId xmlns:a16="http://schemas.microsoft.com/office/drawing/2014/main" id="{F7970329-ACCC-48BB-B026-21DC0A86E7E1}"/>
+                <a16:creationId xmlns:a16="http://schemas.microsoft.com/office/drawing/2014/main" id="{72B36E83-22E4-4F2C-9FC7-9F56036C8830}"/>
               </a:ext>
             </a:extLst>
           </p:cNvPr>
@@ -845,7 +846,7 @@
           <p:cNvPr id="4" name="Datumsplatzhalter 3">
             <a:extLst>
               <a:ext uri="{FF2B5EF4-FFF2-40B4-BE49-F238E27FC236}">
-                <a16:creationId xmlns:a16="http://schemas.microsoft.com/office/drawing/2014/main" id="{376A2B42-50FD-4DC8-9576-35E40B17786F}"/>
+                <a16:creationId xmlns:a16="http://schemas.microsoft.com/office/drawing/2014/main" id="{9FE203CB-4163-419D-BE48-CA69A970383B}"/>
               </a:ext>
             </a:extLst>
           </p:cNvPr>
@@ -863,7 +864,7 @@
           <a:p>
             <a:fld id="{159B554F-0A3C-4E11-9282-850BA7307B97}" type="datetimeFigureOut">
               <a:rPr lang="de-DE" smtClean="0"/>
-              <a:t>28.07.2018</a:t>
+              <a:t>04.08.2018</a:t>
             </a:fld>
             <a:endParaRPr lang="de-DE"/>
           </a:p>
@@ -874,7 +875,7 @@
           <p:cNvPr id="5" name="Fußzeilenplatzhalter 4">
             <a:extLst>
               <a:ext uri="{FF2B5EF4-FFF2-40B4-BE49-F238E27FC236}">
-                <a16:creationId xmlns:a16="http://schemas.microsoft.com/office/drawing/2014/main" id="{22F1E614-F7DA-4FB3-873E-A10043BC839D}"/>
+                <a16:creationId xmlns:a16="http://schemas.microsoft.com/office/drawing/2014/main" id="{397F4F49-23C5-47CB-80CC-FCBD7BA07879}"/>
               </a:ext>
             </a:extLst>
           </p:cNvPr>
@@ -899,7 +900,7 @@
           <p:cNvPr id="6" name="Foliennummernplatzhalter 5">
             <a:extLst>
               <a:ext uri="{FF2B5EF4-FFF2-40B4-BE49-F238E27FC236}">
-                <a16:creationId xmlns:a16="http://schemas.microsoft.com/office/drawing/2014/main" id="{DB6F7CC6-8F57-4D87-A9EA-131EAC2DC00F}"/>
+                <a16:creationId xmlns:a16="http://schemas.microsoft.com/office/drawing/2014/main" id="{6C7A2AF0-5BF9-467F-9BDF-E0B861C1BE16}"/>
               </a:ext>
             </a:extLst>
           </p:cNvPr>
@@ -926,7 +927,7 @@
     </p:spTree>
     <p:extLst>
       <p:ext uri="{BB962C8B-B14F-4D97-AF65-F5344CB8AC3E}">
-        <p14:creationId xmlns:p14="http://schemas.microsoft.com/office/powerpoint/2010/main" val="787718496"/>
+        <p14:creationId xmlns:p14="http://schemas.microsoft.com/office/powerpoint/2010/main" val="2153034844"/>
       </p:ext>
     </p:extLst>
   </p:cSld>
@@ -958,7 +959,7 @@
           <p:cNvPr id="2" name="Titel 1">
             <a:extLst>
               <a:ext uri="{FF2B5EF4-FFF2-40B4-BE49-F238E27FC236}">
-                <a16:creationId xmlns:a16="http://schemas.microsoft.com/office/drawing/2014/main" id="{000D305B-A523-475B-8532-5DA968AF8A42}"/>
+                <a16:creationId xmlns:a16="http://schemas.microsoft.com/office/drawing/2014/main" id="{73B6071B-0872-4EB0-842D-32C5CD45F5F1}"/>
               </a:ext>
             </a:extLst>
           </p:cNvPr>
@@ -995,7 +996,7 @@
           <p:cNvPr id="3" name="Textplatzhalter 2">
             <a:extLst>
               <a:ext uri="{FF2B5EF4-FFF2-40B4-BE49-F238E27FC236}">
-                <a16:creationId xmlns:a16="http://schemas.microsoft.com/office/drawing/2014/main" id="{28B67A40-A0E4-4EA9-A9FB-782A235AD452}"/>
+                <a16:creationId xmlns:a16="http://schemas.microsoft.com/office/drawing/2014/main" id="{22873703-C51E-4E91-8512-310CC50F2145}"/>
               </a:ext>
             </a:extLst>
           </p:cNvPr>
@@ -1120,7 +1121,7 @@
           <p:cNvPr id="4" name="Datumsplatzhalter 3">
             <a:extLst>
               <a:ext uri="{FF2B5EF4-FFF2-40B4-BE49-F238E27FC236}">
-                <a16:creationId xmlns:a16="http://schemas.microsoft.com/office/drawing/2014/main" id="{5A0509A5-47F5-4481-BAAF-0059DC910117}"/>
+                <a16:creationId xmlns:a16="http://schemas.microsoft.com/office/drawing/2014/main" id="{B3232FDA-EB7C-4E5E-B73C-C70EBB0E2FF9}"/>
               </a:ext>
             </a:extLst>
           </p:cNvPr>
@@ -1138,7 +1139,7 @@
           <a:p>
             <a:fld id="{159B554F-0A3C-4E11-9282-850BA7307B97}" type="datetimeFigureOut">
               <a:rPr lang="de-DE" smtClean="0"/>
-              <a:t>28.07.2018</a:t>
+              <a:t>04.08.2018</a:t>
             </a:fld>
             <a:endParaRPr lang="de-DE"/>
           </a:p>
@@ -1149,7 +1150,7 @@
           <p:cNvPr id="5" name="Fußzeilenplatzhalter 4">
             <a:extLst>
               <a:ext uri="{FF2B5EF4-FFF2-40B4-BE49-F238E27FC236}">
-                <a16:creationId xmlns:a16="http://schemas.microsoft.com/office/drawing/2014/main" id="{E76F0A0D-FC13-45E6-82E0-5999F69552BD}"/>
+                <a16:creationId xmlns:a16="http://schemas.microsoft.com/office/drawing/2014/main" id="{4AB582DF-39D9-4BB9-BAA5-3658D125FB15}"/>
               </a:ext>
             </a:extLst>
           </p:cNvPr>
@@ -1174,7 +1175,7 @@
           <p:cNvPr id="6" name="Foliennummernplatzhalter 5">
             <a:extLst>
               <a:ext uri="{FF2B5EF4-FFF2-40B4-BE49-F238E27FC236}">
-                <a16:creationId xmlns:a16="http://schemas.microsoft.com/office/drawing/2014/main" id="{F5DEA81A-0647-4E73-8E76-F66906EEB564}"/>
+                <a16:creationId xmlns:a16="http://schemas.microsoft.com/office/drawing/2014/main" id="{4E7B10D1-40E5-4B4A-9AD4-73C8882ABACB}"/>
               </a:ext>
             </a:extLst>
           </p:cNvPr>
@@ -1201,7 +1202,7 @@
     </p:spTree>
     <p:extLst>
       <p:ext uri="{BB962C8B-B14F-4D97-AF65-F5344CB8AC3E}">
-        <p14:creationId xmlns:p14="http://schemas.microsoft.com/office/powerpoint/2010/main" val="849670880"/>
+        <p14:creationId xmlns:p14="http://schemas.microsoft.com/office/powerpoint/2010/main" val="2110642856"/>
       </p:ext>
     </p:extLst>
   </p:cSld>
@@ -1233,7 +1234,7 @@
           <p:cNvPr id="2" name="Titel 1">
             <a:extLst>
               <a:ext uri="{FF2B5EF4-FFF2-40B4-BE49-F238E27FC236}">
-                <a16:creationId xmlns:a16="http://schemas.microsoft.com/office/drawing/2014/main" id="{BDA57307-ED38-465B-BEA5-1FB879BFD354}"/>
+                <a16:creationId xmlns:a16="http://schemas.microsoft.com/office/drawing/2014/main" id="{2648A566-338F-4657-A273-CCFA956F5878}"/>
               </a:ext>
             </a:extLst>
           </p:cNvPr>
@@ -1261,7 +1262,7 @@
           <p:cNvPr id="3" name="Inhaltsplatzhalter 2">
             <a:extLst>
               <a:ext uri="{FF2B5EF4-FFF2-40B4-BE49-F238E27FC236}">
-                <a16:creationId xmlns:a16="http://schemas.microsoft.com/office/drawing/2014/main" id="{4C63C94F-F083-4507-BF11-E741567D80DA}"/>
+                <a16:creationId xmlns:a16="http://schemas.microsoft.com/office/drawing/2014/main" id="{B6AC0132-BB65-4FB8-BEE4-FC3802533485}"/>
               </a:ext>
             </a:extLst>
           </p:cNvPr>
@@ -1323,7 +1324,7 @@
           <p:cNvPr id="4" name="Inhaltsplatzhalter 3">
             <a:extLst>
               <a:ext uri="{FF2B5EF4-FFF2-40B4-BE49-F238E27FC236}">
-                <a16:creationId xmlns:a16="http://schemas.microsoft.com/office/drawing/2014/main" id="{66D0E687-25DF-4C85-9E01-3E5D1B2787D1}"/>
+                <a16:creationId xmlns:a16="http://schemas.microsoft.com/office/drawing/2014/main" id="{6EA40595-9189-465B-99A6-DA52A6E06046}"/>
               </a:ext>
             </a:extLst>
           </p:cNvPr>
@@ -1385,7 +1386,7 @@
           <p:cNvPr id="5" name="Datumsplatzhalter 4">
             <a:extLst>
               <a:ext uri="{FF2B5EF4-FFF2-40B4-BE49-F238E27FC236}">
-                <a16:creationId xmlns:a16="http://schemas.microsoft.com/office/drawing/2014/main" id="{E6D8A5F9-2EEC-4083-A3A0-0DF4421CA4A6}"/>
+                <a16:creationId xmlns:a16="http://schemas.microsoft.com/office/drawing/2014/main" id="{7FDF0479-3E40-4F2A-8714-1FF735B71129}"/>
               </a:ext>
             </a:extLst>
           </p:cNvPr>
@@ -1403,7 +1404,7 @@
           <a:p>
             <a:fld id="{159B554F-0A3C-4E11-9282-850BA7307B97}" type="datetimeFigureOut">
               <a:rPr lang="de-DE" smtClean="0"/>
-              <a:t>28.07.2018</a:t>
+              <a:t>04.08.2018</a:t>
             </a:fld>
             <a:endParaRPr lang="de-DE"/>
           </a:p>
@@ -1414,7 +1415,7 @@
           <p:cNvPr id="6" name="Fußzeilenplatzhalter 5">
             <a:extLst>
               <a:ext uri="{FF2B5EF4-FFF2-40B4-BE49-F238E27FC236}">
-                <a16:creationId xmlns:a16="http://schemas.microsoft.com/office/drawing/2014/main" id="{0CA0EA50-3EE0-4D01-BC5F-F438BE59B660}"/>
+                <a16:creationId xmlns:a16="http://schemas.microsoft.com/office/drawing/2014/main" id="{5B68A803-8393-4D92-B4B5-CA256ADD486B}"/>
               </a:ext>
             </a:extLst>
           </p:cNvPr>
@@ -1439,7 +1440,7 @@
           <p:cNvPr id="7" name="Foliennummernplatzhalter 6">
             <a:extLst>
               <a:ext uri="{FF2B5EF4-FFF2-40B4-BE49-F238E27FC236}">
-                <a16:creationId xmlns:a16="http://schemas.microsoft.com/office/drawing/2014/main" id="{24AF501F-EDC1-4356-BCCB-D7ABAF11BE29}"/>
+                <a16:creationId xmlns:a16="http://schemas.microsoft.com/office/drawing/2014/main" id="{63233488-A972-4BC2-8313-C7A53BBB5BA1}"/>
               </a:ext>
             </a:extLst>
           </p:cNvPr>
@@ -1466,7 +1467,7 @@
     </p:spTree>
     <p:extLst>
       <p:ext uri="{BB962C8B-B14F-4D97-AF65-F5344CB8AC3E}">
-        <p14:creationId xmlns:p14="http://schemas.microsoft.com/office/powerpoint/2010/main" val="2034403030"/>
+        <p14:creationId xmlns:p14="http://schemas.microsoft.com/office/powerpoint/2010/main" val="3205341553"/>
       </p:ext>
     </p:extLst>
   </p:cSld>
@@ -1498,7 +1499,7 @@
           <p:cNvPr id="2" name="Titel 1">
             <a:extLst>
               <a:ext uri="{FF2B5EF4-FFF2-40B4-BE49-F238E27FC236}">
-                <a16:creationId xmlns:a16="http://schemas.microsoft.com/office/drawing/2014/main" id="{1F9350C2-26DD-4E55-B7A9-ED6D34406B47}"/>
+                <a16:creationId xmlns:a16="http://schemas.microsoft.com/office/drawing/2014/main" id="{5C692B89-806A-4E1C-B0C8-086601C089AF}"/>
               </a:ext>
             </a:extLst>
           </p:cNvPr>
@@ -1531,7 +1532,7 @@
           <p:cNvPr id="3" name="Textplatzhalter 2">
             <a:extLst>
               <a:ext uri="{FF2B5EF4-FFF2-40B4-BE49-F238E27FC236}">
-                <a16:creationId xmlns:a16="http://schemas.microsoft.com/office/drawing/2014/main" id="{D73052DB-33F5-4014-8B77-7447DD1BA9A2}"/>
+                <a16:creationId xmlns:a16="http://schemas.microsoft.com/office/drawing/2014/main" id="{636672FE-BBAB-47B1-83AD-56870666B716}"/>
               </a:ext>
             </a:extLst>
           </p:cNvPr>
@@ -1602,7 +1603,7 @@
           <p:cNvPr id="4" name="Inhaltsplatzhalter 3">
             <a:extLst>
               <a:ext uri="{FF2B5EF4-FFF2-40B4-BE49-F238E27FC236}">
-                <a16:creationId xmlns:a16="http://schemas.microsoft.com/office/drawing/2014/main" id="{D0E89676-345D-4CD3-81BC-81A1B0826DB5}"/>
+                <a16:creationId xmlns:a16="http://schemas.microsoft.com/office/drawing/2014/main" id="{31A1BA06-E31D-42A6-8621-5D94A04CE958}"/>
               </a:ext>
             </a:extLst>
           </p:cNvPr>
@@ -1664,7 +1665,7 @@
           <p:cNvPr id="5" name="Textplatzhalter 4">
             <a:extLst>
               <a:ext uri="{FF2B5EF4-FFF2-40B4-BE49-F238E27FC236}">
-                <a16:creationId xmlns:a16="http://schemas.microsoft.com/office/drawing/2014/main" id="{F940D5C9-DC9A-4F8C-8862-F6DF1453564E}"/>
+                <a16:creationId xmlns:a16="http://schemas.microsoft.com/office/drawing/2014/main" id="{867946CB-DC9D-4373-AB86-DDF318291589}"/>
               </a:ext>
             </a:extLst>
           </p:cNvPr>
@@ -1735,7 +1736,7 @@
           <p:cNvPr id="6" name="Inhaltsplatzhalter 5">
             <a:extLst>
               <a:ext uri="{FF2B5EF4-FFF2-40B4-BE49-F238E27FC236}">
-                <a16:creationId xmlns:a16="http://schemas.microsoft.com/office/drawing/2014/main" id="{9923282D-25B9-44E8-9027-DE4B1E554661}"/>
+                <a16:creationId xmlns:a16="http://schemas.microsoft.com/office/drawing/2014/main" id="{BB1304A1-ADCE-4B42-9F06-CE152F1C4058}"/>
               </a:ext>
             </a:extLst>
           </p:cNvPr>
@@ -1797,7 +1798,7 @@
           <p:cNvPr id="7" name="Datumsplatzhalter 6">
             <a:extLst>
               <a:ext uri="{FF2B5EF4-FFF2-40B4-BE49-F238E27FC236}">
-                <a16:creationId xmlns:a16="http://schemas.microsoft.com/office/drawing/2014/main" id="{890AEEC1-E121-4A2E-A5AB-ADDA019E9441}"/>
+                <a16:creationId xmlns:a16="http://schemas.microsoft.com/office/drawing/2014/main" id="{36DF23C4-B6B8-436F-9A3F-AD9FA33294C9}"/>
               </a:ext>
             </a:extLst>
           </p:cNvPr>
@@ -1815,7 +1816,7 @@
           <a:p>
             <a:fld id="{159B554F-0A3C-4E11-9282-850BA7307B97}" type="datetimeFigureOut">
               <a:rPr lang="de-DE" smtClean="0"/>
-              <a:t>28.07.2018</a:t>
+              <a:t>04.08.2018</a:t>
             </a:fld>
             <a:endParaRPr lang="de-DE"/>
           </a:p>
@@ -1826,7 +1827,7 @@
           <p:cNvPr id="8" name="Fußzeilenplatzhalter 7">
             <a:extLst>
               <a:ext uri="{FF2B5EF4-FFF2-40B4-BE49-F238E27FC236}">
-                <a16:creationId xmlns:a16="http://schemas.microsoft.com/office/drawing/2014/main" id="{35623DCD-0277-4F83-85D4-D76EA81E217F}"/>
+                <a16:creationId xmlns:a16="http://schemas.microsoft.com/office/drawing/2014/main" id="{84F63C2D-1E3C-4517-9C74-E4F9F9BA72AB}"/>
               </a:ext>
             </a:extLst>
           </p:cNvPr>
@@ -1851,7 +1852,7 @@
           <p:cNvPr id="9" name="Foliennummernplatzhalter 8">
             <a:extLst>
               <a:ext uri="{FF2B5EF4-FFF2-40B4-BE49-F238E27FC236}">
-                <a16:creationId xmlns:a16="http://schemas.microsoft.com/office/drawing/2014/main" id="{6EB8EC3E-DFFE-4773-811A-14CABF6A2745}"/>
+                <a16:creationId xmlns:a16="http://schemas.microsoft.com/office/drawing/2014/main" id="{73EE77B0-E6CC-4059-94FE-C1020A08F441}"/>
               </a:ext>
             </a:extLst>
           </p:cNvPr>
@@ -1878,7 +1879,7 @@
     </p:spTree>
     <p:extLst>
       <p:ext uri="{BB962C8B-B14F-4D97-AF65-F5344CB8AC3E}">
-        <p14:creationId xmlns:p14="http://schemas.microsoft.com/office/powerpoint/2010/main" val="3256115519"/>
+        <p14:creationId xmlns:p14="http://schemas.microsoft.com/office/powerpoint/2010/main" val="4099012213"/>
       </p:ext>
     </p:extLst>
   </p:cSld>
@@ -1910,7 +1911,7 @@
           <p:cNvPr id="2" name="Titel 1">
             <a:extLst>
               <a:ext uri="{FF2B5EF4-FFF2-40B4-BE49-F238E27FC236}">
-                <a16:creationId xmlns:a16="http://schemas.microsoft.com/office/drawing/2014/main" id="{6F11A13B-74D0-4255-B650-5FCF7C97C5C3}"/>
+                <a16:creationId xmlns:a16="http://schemas.microsoft.com/office/drawing/2014/main" id="{A868005B-DE0F-424C-8DF9-F2428488457B}"/>
               </a:ext>
             </a:extLst>
           </p:cNvPr>
@@ -1938,7 +1939,7 @@
           <p:cNvPr id="3" name="Datumsplatzhalter 2">
             <a:extLst>
               <a:ext uri="{FF2B5EF4-FFF2-40B4-BE49-F238E27FC236}">
-                <a16:creationId xmlns:a16="http://schemas.microsoft.com/office/drawing/2014/main" id="{354EA438-C2E2-49A7-8F05-3DD1D5B96B1F}"/>
+                <a16:creationId xmlns:a16="http://schemas.microsoft.com/office/drawing/2014/main" id="{CBC51BA3-C8C1-4C9B-8E7C-94D14CD6F1EF}"/>
               </a:ext>
             </a:extLst>
           </p:cNvPr>
@@ -1956,7 +1957,7 @@
           <a:p>
             <a:fld id="{159B554F-0A3C-4E11-9282-850BA7307B97}" type="datetimeFigureOut">
               <a:rPr lang="de-DE" smtClean="0"/>
-              <a:t>28.07.2018</a:t>
+              <a:t>04.08.2018</a:t>
             </a:fld>
             <a:endParaRPr lang="de-DE"/>
           </a:p>
@@ -1967,7 +1968,7 @@
           <p:cNvPr id="4" name="Fußzeilenplatzhalter 3">
             <a:extLst>
               <a:ext uri="{FF2B5EF4-FFF2-40B4-BE49-F238E27FC236}">
-                <a16:creationId xmlns:a16="http://schemas.microsoft.com/office/drawing/2014/main" id="{DD6202CF-C2A7-4497-AB28-200B3292D588}"/>
+                <a16:creationId xmlns:a16="http://schemas.microsoft.com/office/drawing/2014/main" id="{4734F0A2-18BE-4A9F-9CAB-4805C0BC640E}"/>
               </a:ext>
             </a:extLst>
           </p:cNvPr>
@@ -1992,7 +1993,7 @@
           <p:cNvPr id="5" name="Foliennummernplatzhalter 4">
             <a:extLst>
               <a:ext uri="{FF2B5EF4-FFF2-40B4-BE49-F238E27FC236}">
-                <a16:creationId xmlns:a16="http://schemas.microsoft.com/office/drawing/2014/main" id="{A1B3DB53-F4EB-4155-ADD0-C04368A4B6F0}"/>
+                <a16:creationId xmlns:a16="http://schemas.microsoft.com/office/drawing/2014/main" id="{C1538497-0346-4B97-9B85-DC0093F16578}"/>
               </a:ext>
             </a:extLst>
           </p:cNvPr>
@@ -2019,7 +2020,7 @@
     </p:spTree>
     <p:extLst>
       <p:ext uri="{BB962C8B-B14F-4D97-AF65-F5344CB8AC3E}">
-        <p14:creationId xmlns:p14="http://schemas.microsoft.com/office/powerpoint/2010/main" val="1474465717"/>
+        <p14:creationId xmlns:p14="http://schemas.microsoft.com/office/powerpoint/2010/main" val="612561880"/>
       </p:ext>
     </p:extLst>
   </p:cSld>
@@ -2051,7 +2052,7 @@
           <p:cNvPr id="2" name="Datumsplatzhalter 1">
             <a:extLst>
               <a:ext uri="{FF2B5EF4-FFF2-40B4-BE49-F238E27FC236}">
-                <a16:creationId xmlns:a16="http://schemas.microsoft.com/office/drawing/2014/main" id="{7E0D7035-1442-4416-9422-9E0401368007}"/>
+                <a16:creationId xmlns:a16="http://schemas.microsoft.com/office/drawing/2014/main" id="{E65160F8-C7DC-4BD8-97A1-867A55BABE34}"/>
               </a:ext>
             </a:extLst>
           </p:cNvPr>
@@ -2069,7 +2070,7 @@
           <a:p>
             <a:fld id="{159B554F-0A3C-4E11-9282-850BA7307B97}" type="datetimeFigureOut">
               <a:rPr lang="de-DE" smtClean="0"/>
-              <a:t>28.07.2018</a:t>
+              <a:t>04.08.2018</a:t>
             </a:fld>
             <a:endParaRPr lang="de-DE"/>
           </a:p>
@@ -2080,7 +2081,7 @@
           <p:cNvPr id="3" name="Fußzeilenplatzhalter 2">
             <a:extLst>
               <a:ext uri="{FF2B5EF4-FFF2-40B4-BE49-F238E27FC236}">
-                <a16:creationId xmlns:a16="http://schemas.microsoft.com/office/drawing/2014/main" id="{E9EC5667-D976-41D4-B225-5C251AB5B451}"/>
+                <a16:creationId xmlns:a16="http://schemas.microsoft.com/office/drawing/2014/main" id="{B220FDCD-F008-4291-9017-F7E08F918E14}"/>
               </a:ext>
             </a:extLst>
           </p:cNvPr>
@@ -2105,7 +2106,7 @@
           <p:cNvPr id="4" name="Foliennummernplatzhalter 3">
             <a:extLst>
               <a:ext uri="{FF2B5EF4-FFF2-40B4-BE49-F238E27FC236}">
-                <a16:creationId xmlns:a16="http://schemas.microsoft.com/office/drawing/2014/main" id="{43CDEBDC-08E8-419B-B081-942FB05C3B22}"/>
+                <a16:creationId xmlns:a16="http://schemas.microsoft.com/office/drawing/2014/main" id="{129653F8-F82C-4B5A-BE47-F466935FEE6B}"/>
               </a:ext>
             </a:extLst>
           </p:cNvPr>
@@ -2132,7 +2133,7 @@
     </p:spTree>
     <p:extLst>
       <p:ext uri="{BB962C8B-B14F-4D97-AF65-F5344CB8AC3E}">
-        <p14:creationId xmlns:p14="http://schemas.microsoft.com/office/powerpoint/2010/main" val="3657020501"/>
+        <p14:creationId xmlns:p14="http://schemas.microsoft.com/office/powerpoint/2010/main" val="64318499"/>
       </p:ext>
     </p:extLst>
   </p:cSld>
@@ -2164,7 +2165,7 @@
           <p:cNvPr id="2" name="Titel 1">
             <a:extLst>
               <a:ext uri="{FF2B5EF4-FFF2-40B4-BE49-F238E27FC236}">
-                <a16:creationId xmlns:a16="http://schemas.microsoft.com/office/drawing/2014/main" id="{E8ABEB77-F037-4061-94C3-73C72CB27E85}"/>
+                <a16:creationId xmlns:a16="http://schemas.microsoft.com/office/drawing/2014/main" id="{608C76D9-1268-41FE-8719-D2297A1AE128}"/>
               </a:ext>
             </a:extLst>
           </p:cNvPr>
@@ -2201,7 +2202,7 @@
           <p:cNvPr id="3" name="Inhaltsplatzhalter 2">
             <a:extLst>
               <a:ext uri="{FF2B5EF4-FFF2-40B4-BE49-F238E27FC236}">
-                <a16:creationId xmlns:a16="http://schemas.microsoft.com/office/drawing/2014/main" id="{97AB81C9-656B-43A0-AB1C-2FA9A73A3854}"/>
+                <a16:creationId xmlns:a16="http://schemas.microsoft.com/office/drawing/2014/main" id="{D92978BC-3EDF-40B4-ABB5-E7513A0F5DCB}"/>
               </a:ext>
             </a:extLst>
           </p:cNvPr>
@@ -2291,7 +2292,7 @@
           <p:cNvPr id="4" name="Textplatzhalter 3">
             <a:extLst>
               <a:ext uri="{FF2B5EF4-FFF2-40B4-BE49-F238E27FC236}">
-                <a16:creationId xmlns:a16="http://schemas.microsoft.com/office/drawing/2014/main" id="{F64C2CAE-8E74-4E55-BC56-840D7EBAAB05}"/>
+                <a16:creationId xmlns:a16="http://schemas.microsoft.com/office/drawing/2014/main" id="{C0C4167E-F079-409F-9249-DC4747DF0E80}"/>
               </a:ext>
             </a:extLst>
           </p:cNvPr>
@@ -2362,7 +2363,7 @@
           <p:cNvPr id="5" name="Datumsplatzhalter 4">
             <a:extLst>
               <a:ext uri="{FF2B5EF4-FFF2-40B4-BE49-F238E27FC236}">
-                <a16:creationId xmlns:a16="http://schemas.microsoft.com/office/drawing/2014/main" id="{489E5C0A-8532-4EDB-9308-9E6BDBD1C473}"/>
+                <a16:creationId xmlns:a16="http://schemas.microsoft.com/office/drawing/2014/main" id="{CA84F749-1E9C-473A-9028-737664CED702}"/>
               </a:ext>
             </a:extLst>
           </p:cNvPr>
@@ -2380,7 +2381,7 @@
           <a:p>
             <a:fld id="{159B554F-0A3C-4E11-9282-850BA7307B97}" type="datetimeFigureOut">
               <a:rPr lang="de-DE" smtClean="0"/>
-              <a:t>28.07.2018</a:t>
+              <a:t>04.08.2018</a:t>
             </a:fld>
             <a:endParaRPr lang="de-DE"/>
           </a:p>
@@ -2391,7 +2392,7 @@
           <p:cNvPr id="6" name="Fußzeilenplatzhalter 5">
             <a:extLst>
               <a:ext uri="{FF2B5EF4-FFF2-40B4-BE49-F238E27FC236}">
-                <a16:creationId xmlns:a16="http://schemas.microsoft.com/office/drawing/2014/main" id="{701FEB0C-A5FD-40C8-A0B0-B9E44CC10631}"/>
+                <a16:creationId xmlns:a16="http://schemas.microsoft.com/office/drawing/2014/main" id="{448F2026-28C2-44C2-B23B-4A58AAFF07CD}"/>
               </a:ext>
             </a:extLst>
           </p:cNvPr>
@@ -2416,7 +2417,7 @@
           <p:cNvPr id="7" name="Foliennummernplatzhalter 6">
             <a:extLst>
               <a:ext uri="{FF2B5EF4-FFF2-40B4-BE49-F238E27FC236}">
-                <a16:creationId xmlns:a16="http://schemas.microsoft.com/office/drawing/2014/main" id="{FAA60D48-1A54-4C38-9671-5C1AC66FEEFD}"/>
+                <a16:creationId xmlns:a16="http://schemas.microsoft.com/office/drawing/2014/main" id="{940E9B80-97B4-4C05-A544-0268A5A43919}"/>
               </a:ext>
             </a:extLst>
           </p:cNvPr>
@@ -2443,7 +2444,7 @@
     </p:spTree>
     <p:extLst>
       <p:ext uri="{BB962C8B-B14F-4D97-AF65-F5344CB8AC3E}">
-        <p14:creationId xmlns:p14="http://schemas.microsoft.com/office/powerpoint/2010/main" val="2826007567"/>
+        <p14:creationId xmlns:p14="http://schemas.microsoft.com/office/powerpoint/2010/main" val="3738352260"/>
       </p:ext>
     </p:extLst>
   </p:cSld>
@@ -2475,7 +2476,7 @@
           <p:cNvPr id="2" name="Titel 1">
             <a:extLst>
               <a:ext uri="{FF2B5EF4-FFF2-40B4-BE49-F238E27FC236}">
-                <a16:creationId xmlns:a16="http://schemas.microsoft.com/office/drawing/2014/main" id="{014093F4-3FED-4F09-9537-1DE100C92A8E}"/>
+                <a16:creationId xmlns:a16="http://schemas.microsoft.com/office/drawing/2014/main" id="{0DB9B8D3-F30F-4C6C-9D97-2F28E1A2F376}"/>
               </a:ext>
             </a:extLst>
           </p:cNvPr>
@@ -2512,7 +2513,7 @@
           <p:cNvPr id="3" name="Bildplatzhalter 2">
             <a:extLst>
               <a:ext uri="{FF2B5EF4-FFF2-40B4-BE49-F238E27FC236}">
-                <a16:creationId xmlns:a16="http://schemas.microsoft.com/office/drawing/2014/main" id="{0EF022AF-9F78-46E6-A102-4761C3C39808}"/>
+                <a16:creationId xmlns:a16="http://schemas.microsoft.com/office/drawing/2014/main" id="{704A80B7-78DE-4983-B8E0-E111E600AA71}"/>
               </a:ext>
             </a:extLst>
           </p:cNvPr>
@@ -2579,7 +2580,7 @@
           <p:cNvPr id="4" name="Textplatzhalter 3">
             <a:extLst>
               <a:ext uri="{FF2B5EF4-FFF2-40B4-BE49-F238E27FC236}">
-                <a16:creationId xmlns:a16="http://schemas.microsoft.com/office/drawing/2014/main" id="{4D50F38F-5DE6-4356-995F-001B7EC98D29}"/>
+                <a16:creationId xmlns:a16="http://schemas.microsoft.com/office/drawing/2014/main" id="{86F2F5C2-DCC2-4738-8C92-42D41F56FB32}"/>
               </a:ext>
             </a:extLst>
           </p:cNvPr>
@@ -2650,7 +2651,7 @@
           <p:cNvPr id="5" name="Datumsplatzhalter 4">
             <a:extLst>
               <a:ext uri="{FF2B5EF4-FFF2-40B4-BE49-F238E27FC236}">
-                <a16:creationId xmlns:a16="http://schemas.microsoft.com/office/drawing/2014/main" id="{58CF5275-1C84-4390-AB12-AE426157E2BD}"/>
+                <a16:creationId xmlns:a16="http://schemas.microsoft.com/office/drawing/2014/main" id="{1AA82704-95D6-4913-A55F-552014A4F5C7}"/>
               </a:ext>
             </a:extLst>
           </p:cNvPr>
@@ -2668,7 +2669,7 @@
           <a:p>
             <a:fld id="{159B554F-0A3C-4E11-9282-850BA7307B97}" type="datetimeFigureOut">
               <a:rPr lang="de-DE" smtClean="0"/>
-              <a:t>28.07.2018</a:t>
+              <a:t>04.08.2018</a:t>
             </a:fld>
             <a:endParaRPr lang="de-DE"/>
           </a:p>
@@ -2679,7 +2680,7 @@
           <p:cNvPr id="6" name="Fußzeilenplatzhalter 5">
             <a:extLst>
               <a:ext uri="{FF2B5EF4-FFF2-40B4-BE49-F238E27FC236}">
-                <a16:creationId xmlns:a16="http://schemas.microsoft.com/office/drawing/2014/main" id="{65C3C4D8-45BF-4069-A7E2-D2BE6D2007C8}"/>
+                <a16:creationId xmlns:a16="http://schemas.microsoft.com/office/drawing/2014/main" id="{BFDA9E13-A90E-4553-B13E-BC54ABBDE273}"/>
               </a:ext>
             </a:extLst>
           </p:cNvPr>
@@ -2704,7 +2705,7 @@
           <p:cNvPr id="7" name="Foliennummernplatzhalter 6">
             <a:extLst>
               <a:ext uri="{FF2B5EF4-FFF2-40B4-BE49-F238E27FC236}">
-                <a16:creationId xmlns:a16="http://schemas.microsoft.com/office/drawing/2014/main" id="{37C51CAA-9D44-4638-9868-EDF45881D197}"/>
+                <a16:creationId xmlns:a16="http://schemas.microsoft.com/office/drawing/2014/main" id="{A59CD455-0770-49F0-BD9A-F9BB67F110DE}"/>
               </a:ext>
             </a:extLst>
           </p:cNvPr>
@@ -2731,7 +2732,7 @@
     </p:spTree>
     <p:extLst>
       <p:ext uri="{BB962C8B-B14F-4D97-AF65-F5344CB8AC3E}">
-        <p14:creationId xmlns:p14="http://schemas.microsoft.com/office/powerpoint/2010/main" val="148626044"/>
+        <p14:creationId xmlns:p14="http://schemas.microsoft.com/office/powerpoint/2010/main" val="336068563"/>
       </p:ext>
     </p:extLst>
   </p:cSld>
@@ -2768,7 +2769,7 @@
           <p:cNvPr id="2" name="Titelplatzhalter 1">
             <a:extLst>
               <a:ext uri="{FF2B5EF4-FFF2-40B4-BE49-F238E27FC236}">
-                <a16:creationId xmlns:a16="http://schemas.microsoft.com/office/drawing/2014/main" id="{0E0F1252-17DA-4F79-A8C9-EB3871E4DAC8}"/>
+                <a16:creationId xmlns:a16="http://schemas.microsoft.com/office/drawing/2014/main" id="{CCD814B0-05CE-4D25-9AFA-E800AEF1BE4E}"/>
               </a:ext>
             </a:extLst>
           </p:cNvPr>
@@ -2806,7 +2807,7 @@
           <p:cNvPr id="3" name="Textplatzhalter 2">
             <a:extLst>
               <a:ext uri="{FF2B5EF4-FFF2-40B4-BE49-F238E27FC236}">
-                <a16:creationId xmlns:a16="http://schemas.microsoft.com/office/drawing/2014/main" id="{F5A7A55A-F527-477A-954C-6C935F2458A8}"/>
+                <a16:creationId xmlns:a16="http://schemas.microsoft.com/office/drawing/2014/main" id="{5F40418D-CB60-4570-9D8E-4CF0059F003F}"/>
               </a:ext>
             </a:extLst>
           </p:cNvPr>
@@ -2873,7 +2874,7 @@
           <p:cNvPr id="4" name="Datumsplatzhalter 3">
             <a:extLst>
               <a:ext uri="{FF2B5EF4-FFF2-40B4-BE49-F238E27FC236}">
-                <a16:creationId xmlns:a16="http://schemas.microsoft.com/office/drawing/2014/main" id="{E754A3A0-D8A7-4A41-A922-6DC75B171B5D}"/>
+                <a16:creationId xmlns:a16="http://schemas.microsoft.com/office/drawing/2014/main" id="{A77C4261-1817-4CAB-9DC6-8060FCB57484}"/>
               </a:ext>
             </a:extLst>
           </p:cNvPr>
@@ -2909,7 +2910,7 @@
           <a:p>
             <a:fld id="{159B554F-0A3C-4E11-9282-850BA7307B97}" type="datetimeFigureOut">
               <a:rPr lang="de-DE" smtClean="0"/>
-              <a:t>28.07.2018</a:t>
+              <a:t>04.08.2018</a:t>
             </a:fld>
             <a:endParaRPr lang="de-DE"/>
           </a:p>
@@ -2920,7 +2921,7 @@
           <p:cNvPr id="5" name="Fußzeilenplatzhalter 4">
             <a:extLst>
               <a:ext uri="{FF2B5EF4-FFF2-40B4-BE49-F238E27FC236}">
-                <a16:creationId xmlns:a16="http://schemas.microsoft.com/office/drawing/2014/main" id="{B8BF512B-C55C-4B85-97D9-3060DF7C3DDA}"/>
+                <a16:creationId xmlns:a16="http://schemas.microsoft.com/office/drawing/2014/main" id="{7F403E4A-2C9B-4BB4-9C10-E8C9B5F25FF6}"/>
               </a:ext>
             </a:extLst>
           </p:cNvPr>
@@ -2963,7 +2964,7 @@
           <p:cNvPr id="6" name="Foliennummernplatzhalter 5">
             <a:extLst>
               <a:ext uri="{FF2B5EF4-FFF2-40B4-BE49-F238E27FC236}">
-                <a16:creationId xmlns:a16="http://schemas.microsoft.com/office/drawing/2014/main" id="{A25586F5-DD4F-4A9A-9786-6888A3A1A650}"/>
+                <a16:creationId xmlns:a16="http://schemas.microsoft.com/office/drawing/2014/main" id="{62575796-1EE5-48AC-9BA8-4E890C5271B0}"/>
               </a:ext>
             </a:extLst>
           </p:cNvPr>
@@ -3008,23 +3009,23 @@
     </p:spTree>
     <p:extLst>
       <p:ext uri="{BB962C8B-B14F-4D97-AF65-F5344CB8AC3E}">
-        <p14:creationId xmlns:p14="http://schemas.microsoft.com/office/powerpoint/2010/main" val="3655904738"/>
+        <p14:creationId xmlns:p14="http://schemas.microsoft.com/office/powerpoint/2010/main" val="3356936076"/>
       </p:ext>
     </p:extLst>
   </p:cSld>
   <p:clrMap bg1="lt1" tx1="dk1" bg2="lt2" tx2="dk2" accent1="accent1" accent2="accent2" accent3="accent3" accent4="accent4" accent5="accent5" accent6="accent6" hlink="hlink" folHlink="folHlink"/>
   <p:sldLayoutIdLst>
-    <p:sldLayoutId id="2147483649" r:id="rId1"/>
-    <p:sldLayoutId id="2147483650" r:id="rId2"/>
-    <p:sldLayoutId id="2147483651" r:id="rId3"/>
-    <p:sldLayoutId id="2147483652" r:id="rId4"/>
-    <p:sldLayoutId id="2147483653" r:id="rId5"/>
-    <p:sldLayoutId id="2147483654" r:id="rId6"/>
-    <p:sldLayoutId id="2147483655" r:id="rId7"/>
-    <p:sldLayoutId id="2147483656" r:id="rId8"/>
-    <p:sldLayoutId id="2147483657" r:id="rId9"/>
-    <p:sldLayoutId id="2147483658" r:id="rId10"/>
-    <p:sldLayoutId id="2147483659" r:id="rId11"/>
+    <p:sldLayoutId id="2147483697" r:id="rId1"/>
+    <p:sldLayoutId id="2147483698" r:id="rId2"/>
+    <p:sldLayoutId id="2147483699" r:id="rId3"/>
+    <p:sldLayoutId id="2147483700" r:id="rId4"/>
+    <p:sldLayoutId id="2147483701" r:id="rId5"/>
+    <p:sldLayoutId id="2147483702" r:id="rId6"/>
+    <p:sldLayoutId id="2147483703" r:id="rId7"/>
+    <p:sldLayoutId id="2147483704" r:id="rId8"/>
+    <p:sldLayoutId id="2147483705" r:id="rId9"/>
+    <p:sldLayoutId id="2147483706" r:id="rId10"/>
+    <p:sldLayoutId id="2147483707" r:id="rId11"/>
   </p:sldLayoutIdLst>
   <p:txStyles>
     <p:titleStyle>
@@ -3328,10 +3329,10 @@
       </p:grpSpPr>
       <p:pic>
         <p:nvPicPr>
-          <p:cNvPr id="3" name="Grafik 2">
-            <a:extLst>
-              <a:ext uri="{FF2B5EF4-FFF2-40B4-BE49-F238E27FC236}">
-                <a16:creationId xmlns:a16="http://schemas.microsoft.com/office/drawing/2014/main" id="{D5638E30-966B-45F0-A6FF-DADFB91E0CB0}"/>
+          <p:cNvPr id="2" name="Grafik 1">
+            <a:extLst>
+              <a:ext uri="{FF2B5EF4-FFF2-40B4-BE49-F238E27FC236}">
+                <a16:creationId xmlns:a16="http://schemas.microsoft.com/office/drawing/2014/main" id="{4A915CC7-B7AF-4882-94B7-F3F7F4952198}"/>
               </a:ext>
             </a:extLst>
           </p:cNvPr>
@@ -3348,8 +3349,8 @@
         </p:blipFill>
         <p:spPr>
           <a:xfrm>
-            <a:off x="2300285" y="233265"/>
-            <a:ext cx="7629525" cy="6581775"/>
+            <a:off x="3025166" y="41972"/>
+            <a:ext cx="5970211" cy="6774055"/>
           </a:xfrm>
           <a:prstGeom prst="rect">
             <a:avLst/>
@@ -3370,8 +3371,8 @@
         </p:nvSpPr>
         <p:spPr>
           <a:xfrm>
-            <a:off x="2300285" y="5871797"/>
-            <a:ext cx="7591425" cy="943243"/>
+            <a:off x="3025165" y="5776645"/>
+            <a:ext cx="5970211" cy="986203"/>
           </a:xfrm>
           <a:prstGeom prst="rect">
             <a:avLst/>
@@ -3425,8 +3426,8 @@
         </p:nvSpPr>
         <p:spPr>
           <a:xfrm>
-            <a:off x="2300286" y="4054110"/>
-            <a:ext cx="7591424" cy="1787890"/>
+            <a:off x="3025165" y="4362548"/>
+            <a:ext cx="5970212" cy="1384300"/>
           </a:xfrm>
           <a:prstGeom prst="rect">
             <a:avLst/>
@@ -3479,8 +3480,8 @@
         </p:nvSpPr>
         <p:spPr>
           <a:xfrm>
-            <a:off x="2300286" y="3230197"/>
-            <a:ext cx="7591425" cy="794116"/>
+            <a:off x="3025166" y="3567077"/>
+            <a:ext cx="5970212" cy="765674"/>
           </a:xfrm>
           <a:prstGeom prst="rect">
             <a:avLst/>
@@ -3533,8 +3534,8 @@
         </p:nvSpPr>
         <p:spPr>
           <a:xfrm>
-            <a:off x="2300287" y="233265"/>
-            <a:ext cx="7591425" cy="2967134"/>
+            <a:off x="3025166" y="138113"/>
+            <a:ext cx="5970211" cy="3399168"/>
           </a:xfrm>
           <a:prstGeom prst="rect">
             <a:avLst/>
@@ -3577,6 +3578,1851 @@
     <p:extLst>
       <p:ext uri="{BB962C8B-B14F-4D97-AF65-F5344CB8AC3E}">
         <p14:creationId xmlns:p14="http://schemas.microsoft.com/office/powerpoint/2010/main" val="4026227720"/>
+      </p:ext>
+    </p:extLst>
+  </p:cSld>
+  <p:clrMapOvr>
+    <a:masterClrMapping/>
+  </p:clrMapOvr>
+</p:sld>
+</file>
+
+<file path=ppt/slides/slide2.xml><?xml version="1.0" encoding="utf-8"?>
+<p:sld xmlns:a="http://schemas.openxmlformats.org/drawingml/2006/main" xmlns:r="http://schemas.openxmlformats.org/officeDocument/2006/relationships" xmlns:p="http://schemas.openxmlformats.org/presentationml/2006/main">
+  <p:cSld>
+    <p:bg>
+      <p:bgPr>
+        <a:solidFill>
+          <a:schemeClr val="bg1"/>
+        </a:solidFill>
+        <a:effectLst/>
+      </p:bgPr>
+    </p:bg>
+    <p:spTree>
+      <p:nvGrpSpPr>
+        <p:cNvPr id="1" name=""/>
+        <p:cNvGrpSpPr/>
+        <p:nvPr/>
+      </p:nvGrpSpPr>
+      <p:grpSpPr>
+        <a:xfrm>
+          <a:off x="0" y="0"/>
+          <a:ext cx="0" cy="0"/>
+          <a:chOff x="0" y="0"/>
+          <a:chExt cx="0" cy="0"/>
+        </a:xfrm>
+      </p:grpSpPr>
+      <p:pic>
+        <p:nvPicPr>
+          <p:cNvPr id="4" name="Grafik 3" descr="Ein Bild, das Screenshot enthält.&#10;&#10;Mit sehr hoher Zuverlässigkeit generierte Beschreibung">
+            <a:extLst>
+              <a:ext uri="{FF2B5EF4-FFF2-40B4-BE49-F238E27FC236}">
+                <a16:creationId xmlns:a16="http://schemas.microsoft.com/office/drawing/2014/main" id="{126FCEB3-21B9-40FC-A914-A20DD464D6DD}"/>
+              </a:ext>
+            </a:extLst>
+          </p:cNvPr>
+          <p:cNvPicPr>
+            <a:picLocks noChangeAspect="1"/>
+          </p:cNvPicPr>
+          <p:nvPr/>
+        </p:nvPicPr>
+        <p:blipFill rotWithShape="1">
+          <a:blip r:embed="rId2">
+            <a:extLst>
+              <a:ext uri="{28A0092B-C50C-407E-A947-70E740481C1C}">
+                <a14:useLocalDpi xmlns:a14="http://schemas.microsoft.com/office/drawing/2010/main" val="0"/>
+              </a:ext>
+            </a:extLst>
+          </a:blip>
+          <a:srcRect r="5778"/>
+          <a:stretch/>
+        </p:blipFill>
+        <p:spPr>
+          <a:xfrm>
+            <a:off x="20" y="10"/>
+            <a:ext cx="12191980" cy="6857990"/>
+          </a:xfrm>
+          <a:prstGeom prst="rect">
+            <a:avLst/>
+          </a:prstGeom>
+        </p:spPr>
+      </p:pic>
+      <p:grpSp>
+        <p:nvGrpSpPr>
+          <p:cNvPr id="74" name="Gruppieren 73">
+            <a:extLst>
+              <a:ext uri="{FF2B5EF4-FFF2-40B4-BE49-F238E27FC236}">
+                <a16:creationId xmlns:a16="http://schemas.microsoft.com/office/drawing/2014/main" id="{5F9A7F81-718B-4EA3-8431-35229ECA3D18}"/>
+              </a:ext>
+            </a:extLst>
+          </p:cNvPr>
+          <p:cNvGrpSpPr/>
+          <p:nvPr/>
+        </p:nvGrpSpPr>
+        <p:grpSpPr>
+          <a:xfrm>
+            <a:off x="-2436045" y="-4273699"/>
+            <a:ext cx="7767064" cy="14280824"/>
+            <a:chOff x="-2436045" y="-4273699"/>
+            <a:chExt cx="7767064" cy="14280824"/>
+          </a:xfrm>
+        </p:grpSpPr>
+        <p:sp>
+          <p:nvSpPr>
+            <p:cNvPr id="20" name="Rechteck 19">
+              <a:extLst>
+                <a:ext uri="{FF2B5EF4-FFF2-40B4-BE49-F238E27FC236}">
+                  <a16:creationId xmlns:a16="http://schemas.microsoft.com/office/drawing/2014/main" id="{03C8042B-5E2A-4C08-B94B-AB60B3FC05A4}"/>
+                </a:ext>
+              </a:extLst>
+            </p:cNvPr>
+            <p:cNvSpPr/>
+            <p:nvPr/>
+          </p:nvSpPr>
+          <p:spPr>
+            <a:xfrm rot="1581459">
+              <a:off x="-2436045" y="-4273699"/>
+              <a:ext cx="7767064" cy="12665687"/>
+            </a:xfrm>
+            <a:prstGeom prst="rect">
+              <a:avLst/>
+            </a:prstGeom>
+            <a:solidFill>
+              <a:schemeClr val="bg1"/>
+            </a:solidFill>
+            <a:ln w="76200">
+              <a:solidFill>
+                <a:schemeClr val="bg1"/>
+              </a:solidFill>
+            </a:ln>
+            <a:effectLst>
+              <a:outerShdw blurRad="63500" sx="102000" sy="102000" algn="ctr" rotWithShape="0">
+                <a:prstClr val="black">
+                  <a:alpha val="40000"/>
+                </a:prstClr>
+              </a:outerShdw>
+            </a:effectLst>
+          </p:spPr>
+          <p:style>
+            <a:lnRef idx="2">
+              <a:schemeClr val="accent1">
+                <a:shade val="50000"/>
+              </a:schemeClr>
+            </a:lnRef>
+            <a:fillRef idx="1">
+              <a:schemeClr val="accent1"/>
+            </a:fillRef>
+            <a:effectRef idx="0">
+              <a:schemeClr val="accent1"/>
+            </a:effectRef>
+            <a:fontRef idx="minor">
+              <a:schemeClr val="lt1"/>
+            </a:fontRef>
+          </p:style>
+          <p:txBody>
+            <a:bodyPr rtlCol="0" anchor="ctr"/>
+            <a:lstStyle/>
+            <a:p>
+              <a:pPr algn="ctr"/>
+              <a:endParaRPr lang="de-DE"/>
+            </a:p>
+          </p:txBody>
+        </p:sp>
+        <p:sp>
+          <p:nvSpPr>
+            <p:cNvPr id="73" name="Rechteck 72">
+              <a:extLst>
+                <a:ext uri="{FF2B5EF4-FFF2-40B4-BE49-F238E27FC236}">
+                  <a16:creationId xmlns:a16="http://schemas.microsoft.com/office/drawing/2014/main" id="{F828E4AB-A04A-46DA-B01D-C3934790D05E}"/>
+                </a:ext>
+              </a:extLst>
+            </p:cNvPr>
+            <p:cNvSpPr/>
+            <p:nvPr/>
+          </p:nvSpPr>
+          <p:spPr>
+            <a:xfrm rot="1581459">
+              <a:off x="4416190" y="-2658562"/>
+              <a:ext cx="416052" cy="12665687"/>
+            </a:xfrm>
+            <a:prstGeom prst="rect">
+              <a:avLst/>
+            </a:prstGeom>
+            <a:solidFill>
+              <a:srgbClr val="92D050"/>
+            </a:solidFill>
+            <a:ln w="76200">
+              <a:solidFill>
+                <a:srgbClr val="92D050"/>
+              </a:solidFill>
+            </a:ln>
+            <a:effectLst>
+              <a:outerShdw blurRad="63500" sx="102000" sy="102000" algn="ctr" rotWithShape="0">
+                <a:prstClr val="black">
+                  <a:alpha val="40000"/>
+                </a:prstClr>
+              </a:outerShdw>
+            </a:effectLst>
+          </p:spPr>
+          <p:style>
+            <a:lnRef idx="2">
+              <a:schemeClr val="accent1">
+                <a:shade val="50000"/>
+              </a:schemeClr>
+            </a:lnRef>
+            <a:fillRef idx="1">
+              <a:schemeClr val="accent1"/>
+            </a:fillRef>
+            <a:effectRef idx="0">
+              <a:schemeClr val="accent1"/>
+            </a:effectRef>
+            <a:fontRef idx="minor">
+              <a:schemeClr val="lt1"/>
+            </a:fontRef>
+          </p:style>
+          <p:txBody>
+            <a:bodyPr rtlCol="0" anchor="ctr"/>
+            <a:lstStyle/>
+            <a:p>
+              <a:pPr algn="ctr"/>
+              <a:endParaRPr lang="de-DE"/>
+            </a:p>
+          </p:txBody>
+        </p:sp>
+      </p:grpSp>
+      <p:sp>
+        <p:nvSpPr>
+          <p:cNvPr id="26" name="Rechteck 25">
+            <a:extLst>
+              <a:ext uri="{FF2B5EF4-FFF2-40B4-BE49-F238E27FC236}">
+                <a16:creationId xmlns:a16="http://schemas.microsoft.com/office/drawing/2014/main" id="{11F8EBFA-939E-455F-B5F3-1340C16420AB}"/>
+              </a:ext>
+            </a:extLst>
+          </p:cNvPr>
+          <p:cNvSpPr/>
+          <p:nvPr/>
+        </p:nvSpPr>
+        <p:spPr>
+          <a:xfrm>
+            <a:off x="582163" y="850979"/>
+            <a:ext cx="2130805" cy="271163"/>
+          </a:xfrm>
+          <a:prstGeom prst="rect">
+            <a:avLst/>
+          </a:prstGeom>
+          <a:solidFill>
+            <a:schemeClr val="bg1">
+              <a:alpha val="0"/>
+            </a:schemeClr>
+          </a:solidFill>
+          <a:ln>
+            <a:noFill/>
+          </a:ln>
+          <a:effectLst>
+            <a:outerShdw blurRad="50800" dist="38100" dir="2700000" algn="tl" rotWithShape="0">
+              <a:prstClr val="black">
+                <a:alpha val="40000"/>
+              </a:prstClr>
+            </a:outerShdw>
+          </a:effectLst>
+        </p:spPr>
+        <p:style>
+          <a:lnRef idx="2">
+            <a:schemeClr val="accent1">
+              <a:shade val="50000"/>
+            </a:schemeClr>
+          </a:lnRef>
+          <a:fillRef idx="1">
+            <a:schemeClr val="accent1"/>
+          </a:fillRef>
+          <a:effectRef idx="0">
+            <a:schemeClr val="accent1"/>
+          </a:effectRef>
+          <a:fontRef idx="minor">
+            <a:schemeClr val="lt1"/>
+          </a:fontRef>
+        </p:style>
+        <p:txBody>
+          <a:bodyPr rtlCol="0" anchor="ctr"/>
+          <a:lstStyle/>
+          <a:p>
+            <a:r>
+              <a:rPr lang="de-DE" dirty="0" err="1">
+                <a:solidFill>
+                  <a:schemeClr val="bg2">
+                    <a:lumMod val="10000"/>
+                  </a:schemeClr>
+                </a:solidFill>
+                <a:effectLst>
+                  <a:outerShdw blurRad="50800" dist="50800" dir="5400000" sx="1000" sy="1000" algn="ctr" rotWithShape="0">
+                    <a:schemeClr val="bg1">
+                      <a:lumMod val="50000"/>
+                      <a:alpha val="10000"/>
+                    </a:schemeClr>
+                  </a:outerShdw>
+                </a:effectLst>
+              </a:rPr>
+              <a:t>Parenting</a:t>
+            </a:r>
+            <a:endParaRPr lang="de-DE" dirty="0">
+              <a:solidFill>
+                <a:schemeClr val="bg2">
+                  <a:lumMod val="10000"/>
+                </a:schemeClr>
+              </a:solidFill>
+              <a:effectLst>
+                <a:outerShdw blurRad="50800" dist="50800" dir="5400000" sx="1000" sy="1000" algn="ctr" rotWithShape="0">
+                  <a:schemeClr val="bg1">
+                    <a:lumMod val="50000"/>
+                    <a:alpha val="10000"/>
+                  </a:schemeClr>
+                </a:outerShdw>
+              </a:effectLst>
+            </a:endParaRPr>
+          </a:p>
+        </p:txBody>
+      </p:sp>
+      <p:sp>
+        <p:nvSpPr>
+          <p:cNvPr id="27" name="Rechteck 26">
+            <a:extLst>
+              <a:ext uri="{FF2B5EF4-FFF2-40B4-BE49-F238E27FC236}">
+                <a16:creationId xmlns:a16="http://schemas.microsoft.com/office/drawing/2014/main" id="{B77F07A1-721C-4EB3-BA1D-1F9A2FD7E6E9}"/>
+              </a:ext>
+            </a:extLst>
+          </p:cNvPr>
+          <p:cNvSpPr/>
+          <p:nvPr/>
+        </p:nvSpPr>
+        <p:spPr>
+          <a:xfrm>
+            <a:off x="582163" y="1253898"/>
+            <a:ext cx="2130805" cy="271163"/>
+          </a:xfrm>
+          <a:prstGeom prst="rect">
+            <a:avLst/>
+          </a:prstGeom>
+          <a:solidFill>
+            <a:schemeClr val="bg1">
+              <a:alpha val="0"/>
+            </a:schemeClr>
+          </a:solidFill>
+          <a:ln>
+            <a:noFill/>
+          </a:ln>
+          <a:effectLst>
+            <a:outerShdw blurRad="50800" dist="38100" dir="2700000" algn="tl" rotWithShape="0">
+              <a:prstClr val="black">
+                <a:alpha val="40000"/>
+              </a:prstClr>
+            </a:outerShdw>
+          </a:effectLst>
+        </p:spPr>
+        <p:style>
+          <a:lnRef idx="2">
+            <a:schemeClr val="accent1">
+              <a:shade val="50000"/>
+            </a:schemeClr>
+          </a:lnRef>
+          <a:fillRef idx="1">
+            <a:schemeClr val="accent1"/>
+          </a:fillRef>
+          <a:effectRef idx="0">
+            <a:schemeClr val="accent1"/>
+          </a:effectRef>
+          <a:fontRef idx="minor">
+            <a:schemeClr val="lt1"/>
+          </a:fontRef>
+        </p:style>
+        <p:txBody>
+          <a:bodyPr rtlCol="0" anchor="ctr"/>
+          <a:lstStyle/>
+          <a:p>
+            <a:r>
+              <a:rPr lang="de-DE" dirty="0">
+                <a:solidFill>
+                  <a:schemeClr val="bg2">
+                    <a:lumMod val="10000"/>
+                  </a:schemeClr>
+                </a:solidFill>
+                <a:effectLst>
+                  <a:outerShdw blurRad="50800" dist="50800" dir="5400000" sx="1000" sy="1000" algn="ctr" rotWithShape="0">
+                    <a:schemeClr val="bg1">
+                      <a:lumMod val="50000"/>
+                      <a:alpha val="10000"/>
+                    </a:schemeClr>
+                  </a:outerShdw>
+                </a:effectLst>
+              </a:rPr>
+              <a:t>Density</a:t>
+            </a:r>
+          </a:p>
+        </p:txBody>
+      </p:sp>
+      <p:sp>
+        <p:nvSpPr>
+          <p:cNvPr id="52" name="Rechteck 51">
+            <a:extLst>
+              <a:ext uri="{FF2B5EF4-FFF2-40B4-BE49-F238E27FC236}">
+                <a16:creationId xmlns:a16="http://schemas.microsoft.com/office/drawing/2014/main" id="{7620DAF5-217C-4E8C-A529-A160796AACDA}"/>
+              </a:ext>
+            </a:extLst>
+          </p:cNvPr>
+          <p:cNvSpPr/>
+          <p:nvPr/>
+        </p:nvSpPr>
+        <p:spPr>
+          <a:xfrm>
+            <a:off x="3362515" y="850979"/>
+            <a:ext cx="2130805" cy="271163"/>
+          </a:xfrm>
+          <a:prstGeom prst="rect">
+            <a:avLst/>
+          </a:prstGeom>
+          <a:solidFill>
+            <a:schemeClr val="bg1">
+              <a:alpha val="0"/>
+            </a:schemeClr>
+          </a:solidFill>
+          <a:ln>
+            <a:noFill/>
+          </a:ln>
+          <a:effectLst>
+            <a:outerShdw blurRad="50800" dist="38100" dir="2700000" algn="tl" rotWithShape="0">
+              <a:prstClr val="black">
+                <a:alpha val="40000"/>
+              </a:prstClr>
+            </a:outerShdw>
+          </a:effectLst>
+        </p:spPr>
+        <p:style>
+          <a:lnRef idx="2">
+            <a:schemeClr val="accent1">
+              <a:shade val="50000"/>
+            </a:schemeClr>
+          </a:lnRef>
+          <a:fillRef idx="1">
+            <a:schemeClr val="accent1"/>
+          </a:fillRef>
+          <a:effectRef idx="0">
+            <a:schemeClr val="accent1"/>
+          </a:effectRef>
+          <a:fontRef idx="minor">
+            <a:schemeClr val="lt1"/>
+          </a:fontRef>
+        </p:style>
+        <p:txBody>
+          <a:bodyPr rtlCol="0" anchor="ctr"/>
+          <a:lstStyle/>
+          <a:p>
+            <a:r>
+              <a:rPr lang="de-DE" dirty="0">
+                <a:solidFill>
+                  <a:schemeClr val="bg2">
+                    <a:lumMod val="10000"/>
+                  </a:schemeClr>
+                </a:solidFill>
+                <a:effectLst>
+                  <a:outerShdw blurRad="50800" dist="50800" dir="5400000" sx="1000" sy="1000" algn="ctr" rotWithShape="0">
+                    <a:schemeClr val="bg1">
+                      <a:lumMod val="50000"/>
+                      <a:alpha val="10000"/>
+                    </a:schemeClr>
+                  </a:outerShdw>
+                </a:effectLst>
+              </a:rPr>
+              <a:t>Multi-</a:t>
+            </a:r>
+            <a:r>
+              <a:rPr lang="de-DE" dirty="0" err="1">
+                <a:solidFill>
+                  <a:schemeClr val="bg2">
+                    <a:lumMod val="10000"/>
+                  </a:schemeClr>
+                </a:solidFill>
+                <a:effectLst>
+                  <a:outerShdw blurRad="50800" dist="50800" dir="5400000" sx="1000" sy="1000" algn="ctr" rotWithShape="0">
+                    <a:schemeClr val="bg1">
+                      <a:lumMod val="50000"/>
+                      <a:alpha val="10000"/>
+                    </a:schemeClr>
+                  </a:outerShdw>
+                </a:effectLst>
+              </a:rPr>
+              <a:t>Brush</a:t>
+            </a:r>
+            <a:r>
+              <a:rPr lang="de-DE" dirty="0">
+                <a:solidFill>
+                  <a:schemeClr val="bg2">
+                    <a:lumMod val="10000"/>
+                  </a:schemeClr>
+                </a:solidFill>
+                <a:effectLst>
+                  <a:outerShdw blurRad="50800" dist="50800" dir="5400000" sx="1000" sy="1000" algn="ctr" rotWithShape="0">
+                    <a:schemeClr val="bg1">
+                      <a:lumMod val="50000"/>
+                      <a:alpha val="10000"/>
+                    </a:schemeClr>
+                  </a:outerShdw>
+                </a:effectLst>
+              </a:rPr>
+              <a:t>-Painting</a:t>
+            </a:r>
+          </a:p>
+        </p:txBody>
+      </p:sp>
+      <p:sp>
+        <p:nvSpPr>
+          <p:cNvPr id="53" name="Rechteck 52">
+            <a:extLst>
+              <a:ext uri="{FF2B5EF4-FFF2-40B4-BE49-F238E27FC236}">
+                <a16:creationId xmlns:a16="http://schemas.microsoft.com/office/drawing/2014/main" id="{D54088B5-5993-46E3-9EC9-186A1228A0EC}"/>
+              </a:ext>
+            </a:extLst>
+          </p:cNvPr>
+          <p:cNvSpPr/>
+          <p:nvPr/>
+        </p:nvSpPr>
+        <p:spPr>
+          <a:xfrm>
+            <a:off x="3382678" y="1253898"/>
+            <a:ext cx="2130805" cy="271163"/>
+          </a:xfrm>
+          <a:prstGeom prst="rect">
+            <a:avLst/>
+          </a:prstGeom>
+          <a:solidFill>
+            <a:schemeClr val="bg1">
+              <a:alpha val="0"/>
+            </a:schemeClr>
+          </a:solidFill>
+          <a:ln>
+            <a:noFill/>
+          </a:ln>
+          <a:effectLst>
+            <a:outerShdw blurRad="50800" dist="38100" dir="2700000" algn="tl" rotWithShape="0">
+              <a:prstClr val="black">
+                <a:alpha val="40000"/>
+              </a:prstClr>
+            </a:outerShdw>
+          </a:effectLst>
+        </p:spPr>
+        <p:style>
+          <a:lnRef idx="2">
+            <a:schemeClr val="accent1">
+              <a:shade val="50000"/>
+            </a:schemeClr>
+          </a:lnRef>
+          <a:fillRef idx="1">
+            <a:schemeClr val="accent1"/>
+          </a:fillRef>
+          <a:effectRef idx="0">
+            <a:schemeClr val="accent1"/>
+          </a:effectRef>
+          <a:fontRef idx="minor">
+            <a:schemeClr val="lt1"/>
+          </a:fontRef>
+        </p:style>
+        <p:txBody>
+          <a:bodyPr rtlCol="0" anchor="ctr"/>
+          <a:lstStyle/>
+          <a:p>
+            <a:r>
+              <a:rPr lang="de-DE" dirty="0">
+                <a:solidFill>
+                  <a:schemeClr val="bg2">
+                    <a:lumMod val="10000"/>
+                  </a:schemeClr>
+                </a:solidFill>
+                <a:effectLst>
+                  <a:outerShdw blurRad="50800" dist="50800" dir="5400000" sx="1000" sy="1000" algn="ctr" rotWithShape="0">
+                    <a:schemeClr val="bg1">
+                      <a:lumMod val="50000"/>
+                      <a:alpha val="10000"/>
+                    </a:schemeClr>
+                  </a:outerShdw>
+                </a:effectLst>
+              </a:rPr>
+              <a:t>Copy And Paste</a:t>
+            </a:r>
+          </a:p>
+        </p:txBody>
+      </p:sp>
+      <p:sp>
+        <p:nvSpPr>
+          <p:cNvPr id="56" name="Rechteck 55">
+            <a:extLst>
+              <a:ext uri="{FF2B5EF4-FFF2-40B4-BE49-F238E27FC236}">
+                <a16:creationId xmlns:a16="http://schemas.microsoft.com/office/drawing/2014/main" id="{97E6CEA2-A7F3-4541-8EA7-68E5F5E61579}"/>
+              </a:ext>
+            </a:extLst>
+          </p:cNvPr>
+          <p:cNvSpPr/>
+          <p:nvPr/>
+        </p:nvSpPr>
+        <p:spPr>
+          <a:xfrm>
+            <a:off x="3382678" y="1615902"/>
+            <a:ext cx="2130805" cy="714405"/>
+          </a:xfrm>
+          <a:prstGeom prst="rect">
+            <a:avLst/>
+          </a:prstGeom>
+          <a:solidFill>
+            <a:schemeClr val="bg1">
+              <a:alpha val="0"/>
+            </a:schemeClr>
+          </a:solidFill>
+          <a:ln>
+            <a:noFill/>
+          </a:ln>
+          <a:effectLst>
+            <a:outerShdw blurRad="50800" dist="38100" dir="2700000" algn="tl" rotWithShape="0">
+              <a:prstClr val="black">
+                <a:alpha val="40000"/>
+              </a:prstClr>
+            </a:outerShdw>
+          </a:effectLst>
+        </p:spPr>
+        <p:style>
+          <a:lnRef idx="2">
+            <a:schemeClr val="accent1">
+              <a:shade val="50000"/>
+            </a:schemeClr>
+          </a:lnRef>
+          <a:fillRef idx="1">
+            <a:schemeClr val="accent1"/>
+          </a:fillRef>
+          <a:effectRef idx="0">
+            <a:schemeClr val="accent1"/>
+          </a:effectRef>
+          <a:fontRef idx="minor">
+            <a:schemeClr val="lt1"/>
+          </a:fontRef>
+        </p:style>
+        <p:txBody>
+          <a:bodyPr rtlCol="0" anchor="ctr"/>
+          <a:lstStyle/>
+          <a:p>
+            <a:r>
+              <a:rPr lang="de-DE" dirty="0" err="1">
+                <a:solidFill>
+                  <a:schemeClr val="bg2">
+                    <a:lumMod val="10000"/>
+                  </a:schemeClr>
+                </a:solidFill>
+                <a:effectLst>
+                  <a:outerShdw blurRad="50800" dist="50800" dir="5400000" sx="1000" sy="1000" algn="ctr" rotWithShape="0">
+                    <a:schemeClr val="bg1">
+                      <a:lumMod val="50000"/>
+                      <a:alpha val="10000"/>
+                    </a:schemeClr>
+                  </a:outerShdw>
+                </a:effectLst>
+              </a:rPr>
+              <a:t>Enable</a:t>
+            </a:r>
+            <a:r>
+              <a:rPr lang="de-DE" dirty="0">
+                <a:solidFill>
+                  <a:schemeClr val="bg2">
+                    <a:lumMod val="10000"/>
+                  </a:schemeClr>
+                </a:solidFill>
+                <a:effectLst>
+                  <a:outerShdw blurRad="50800" dist="50800" dir="5400000" sx="1000" sy="1000" algn="ctr" rotWithShape="0">
+                    <a:schemeClr val="bg1">
+                      <a:lumMod val="50000"/>
+                      <a:alpha val="10000"/>
+                    </a:schemeClr>
+                  </a:outerShdw>
+                </a:effectLst>
+              </a:rPr>
+              <a:t>/</a:t>
+            </a:r>
+            <a:r>
+              <a:rPr lang="de-DE" dirty="0" err="1">
+                <a:solidFill>
+                  <a:schemeClr val="bg2">
+                    <a:lumMod val="10000"/>
+                  </a:schemeClr>
+                </a:solidFill>
+                <a:effectLst>
+                  <a:outerShdw blurRad="50800" dist="50800" dir="5400000" sx="1000" sy="1000" algn="ctr" rotWithShape="0">
+                    <a:schemeClr val="bg1">
+                      <a:lumMod val="50000"/>
+                      <a:alpha val="10000"/>
+                    </a:schemeClr>
+                  </a:outerShdw>
+                </a:effectLst>
+              </a:rPr>
+              <a:t>Disable</a:t>
+            </a:r>
+            <a:r>
+              <a:rPr lang="de-DE" dirty="0">
+                <a:solidFill>
+                  <a:schemeClr val="bg2">
+                    <a:lumMod val="10000"/>
+                  </a:schemeClr>
+                </a:solidFill>
+                <a:effectLst>
+                  <a:outerShdw blurRad="50800" dist="50800" dir="5400000" sx="1000" sy="1000" algn="ctr" rotWithShape="0">
+                    <a:schemeClr val="bg1">
+                      <a:lumMod val="50000"/>
+                      <a:alpha val="10000"/>
+                    </a:schemeClr>
+                  </a:outerShdw>
+                </a:effectLst>
+              </a:rPr>
+              <a:t> Painting</a:t>
+            </a:r>
+          </a:p>
+        </p:txBody>
+      </p:sp>
+      <p:sp>
+        <p:nvSpPr>
+          <p:cNvPr id="63" name="Rechteck 62">
+            <a:extLst>
+              <a:ext uri="{FF2B5EF4-FFF2-40B4-BE49-F238E27FC236}">
+                <a16:creationId xmlns:a16="http://schemas.microsoft.com/office/drawing/2014/main" id="{5DF0C7A0-2BE8-4BA9-9E97-2D05CE2D277E}"/>
+              </a:ext>
+            </a:extLst>
+          </p:cNvPr>
+          <p:cNvSpPr/>
+          <p:nvPr/>
+        </p:nvSpPr>
+        <p:spPr>
+          <a:xfrm>
+            <a:off x="595142" y="1656817"/>
+            <a:ext cx="2130805" cy="271163"/>
+          </a:xfrm>
+          <a:prstGeom prst="rect">
+            <a:avLst/>
+          </a:prstGeom>
+          <a:solidFill>
+            <a:schemeClr val="bg1">
+              <a:alpha val="0"/>
+            </a:schemeClr>
+          </a:solidFill>
+          <a:ln>
+            <a:noFill/>
+          </a:ln>
+          <a:effectLst>
+            <a:outerShdw blurRad="50800" dist="38100" dir="2700000" algn="tl" rotWithShape="0">
+              <a:prstClr val="black">
+                <a:alpha val="40000"/>
+              </a:prstClr>
+            </a:outerShdw>
+          </a:effectLst>
+        </p:spPr>
+        <p:style>
+          <a:lnRef idx="2">
+            <a:schemeClr val="accent1">
+              <a:shade val="50000"/>
+            </a:schemeClr>
+          </a:lnRef>
+          <a:fillRef idx="1">
+            <a:schemeClr val="accent1"/>
+          </a:fillRef>
+          <a:effectRef idx="0">
+            <a:schemeClr val="accent1"/>
+          </a:effectRef>
+          <a:fontRef idx="minor">
+            <a:schemeClr val="lt1"/>
+          </a:fontRef>
+        </p:style>
+        <p:txBody>
+          <a:bodyPr rtlCol="0" anchor="ctr"/>
+          <a:lstStyle/>
+          <a:p>
+            <a:r>
+              <a:rPr lang="de-DE" dirty="0" err="1">
+                <a:solidFill>
+                  <a:schemeClr val="bg2">
+                    <a:lumMod val="10000"/>
+                  </a:schemeClr>
+                </a:solidFill>
+                <a:effectLst>
+                  <a:outerShdw blurRad="50800" dist="50800" dir="5400000" sx="1000" sy="1000" algn="ctr" rotWithShape="0">
+                    <a:schemeClr val="bg1">
+                      <a:lumMod val="50000"/>
+                      <a:alpha val="10000"/>
+                    </a:schemeClr>
+                  </a:outerShdw>
+                </a:effectLst>
+              </a:rPr>
+              <a:t>Brush</a:t>
+            </a:r>
+            <a:r>
+              <a:rPr lang="de-DE" dirty="0">
+                <a:solidFill>
+                  <a:schemeClr val="bg2">
+                    <a:lumMod val="10000"/>
+                  </a:schemeClr>
+                </a:solidFill>
+                <a:effectLst>
+                  <a:outerShdw blurRad="50800" dist="50800" dir="5400000" sx="1000" sy="1000" algn="ctr" rotWithShape="0">
+                    <a:schemeClr val="bg1">
+                      <a:lumMod val="50000"/>
+                      <a:alpha val="10000"/>
+                    </a:schemeClr>
+                  </a:outerShdw>
+                </a:effectLst>
+              </a:rPr>
+              <a:t> Size</a:t>
+            </a:r>
+          </a:p>
+        </p:txBody>
+      </p:sp>
+      <p:sp>
+        <p:nvSpPr>
+          <p:cNvPr id="64" name="Rechteck 63">
+            <a:extLst>
+              <a:ext uri="{FF2B5EF4-FFF2-40B4-BE49-F238E27FC236}">
+                <a16:creationId xmlns:a16="http://schemas.microsoft.com/office/drawing/2014/main" id="{1357F489-CDA6-4B2F-A0F5-F58C51411A2F}"/>
+              </a:ext>
+            </a:extLst>
+          </p:cNvPr>
+          <p:cNvSpPr/>
+          <p:nvPr/>
+        </p:nvSpPr>
+        <p:spPr>
+          <a:xfrm>
+            <a:off x="595142" y="2059144"/>
+            <a:ext cx="2130805" cy="271163"/>
+          </a:xfrm>
+          <a:prstGeom prst="rect">
+            <a:avLst/>
+          </a:prstGeom>
+          <a:solidFill>
+            <a:schemeClr val="bg1">
+              <a:alpha val="0"/>
+            </a:schemeClr>
+          </a:solidFill>
+          <a:ln>
+            <a:noFill/>
+          </a:ln>
+          <a:effectLst>
+            <a:outerShdw blurRad="50800" dist="38100" dir="2700000" algn="tl" rotWithShape="0">
+              <a:prstClr val="black">
+                <a:alpha val="40000"/>
+              </a:prstClr>
+            </a:outerShdw>
+          </a:effectLst>
+        </p:spPr>
+        <p:style>
+          <a:lnRef idx="2">
+            <a:schemeClr val="accent1">
+              <a:shade val="50000"/>
+            </a:schemeClr>
+          </a:lnRef>
+          <a:fillRef idx="1">
+            <a:schemeClr val="accent1"/>
+          </a:fillRef>
+          <a:effectRef idx="0">
+            <a:schemeClr val="accent1"/>
+          </a:effectRef>
+          <a:fontRef idx="minor">
+            <a:schemeClr val="lt1"/>
+          </a:fontRef>
+        </p:style>
+        <p:txBody>
+          <a:bodyPr rtlCol="0" anchor="ctr"/>
+          <a:lstStyle/>
+          <a:p>
+            <a:r>
+              <a:rPr lang="de-DE" dirty="0">
+                <a:solidFill>
+                  <a:schemeClr val="bg2">
+                    <a:lumMod val="10000"/>
+                  </a:schemeClr>
+                </a:solidFill>
+                <a:effectLst>
+                  <a:outerShdw blurRad="50800" dist="50800" dir="5400000" sx="1000" sy="1000" algn="ctr" rotWithShape="0">
+                    <a:schemeClr val="bg1">
+                      <a:lumMod val="50000"/>
+                      <a:alpha val="10000"/>
+                    </a:schemeClr>
+                  </a:outerShdw>
+                </a:effectLst>
+              </a:rPr>
+              <a:t>Offset </a:t>
+            </a:r>
+            <a:r>
+              <a:rPr lang="de-DE" dirty="0" err="1">
+                <a:solidFill>
+                  <a:schemeClr val="bg2">
+                    <a:lumMod val="10000"/>
+                  </a:schemeClr>
+                </a:solidFill>
+                <a:effectLst>
+                  <a:outerShdw blurRad="50800" dist="50800" dir="5400000" sx="1000" sy="1000" algn="ctr" rotWithShape="0">
+                    <a:schemeClr val="bg1">
+                      <a:lumMod val="50000"/>
+                      <a:alpha val="10000"/>
+                    </a:schemeClr>
+                  </a:outerShdw>
+                </a:effectLst>
+              </a:rPr>
+              <a:t>From</a:t>
+            </a:r>
+            <a:r>
+              <a:rPr lang="de-DE" dirty="0">
+                <a:solidFill>
+                  <a:schemeClr val="bg2">
+                    <a:lumMod val="10000"/>
+                  </a:schemeClr>
+                </a:solidFill>
+                <a:effectLst>
+                  <a:outerShdw blurRad="50800" dist="50800" dir="5400000" sx="1000" sy="1000" algn="ctr" rotWithShape="0">
+                    <a:schemeClr val="bg1">
+                      <a:lumMod val="50000"/>
+                      <a:alpha val="10000"/>
+                    </a:schemeClr>
+                  </a:outerShdw>
+                </a:effectLst>
+              </a:rPr>
+              <a:t> Pivot</a:t>
+            </a:r>
+          </a:p>
+        </p:txBody>
+      </p:sp>
+      <p:sp>
+        <p:nvSpPr>
+          <p:cNvPr id="65" name="Rechteck 64">
+            <a:extLst>
+              <a:ext uri="{FF2B5EF4-FFF2-40B4-BE49-F238E27FC236}">
+                <a16:creationId xmlns:a16="http://schemas.microsoft.com/office/drawing/2014/main" id="{1EED07DF-3838-415E-B90B-B20BFE1BBA3C}"/>
+              </a:ext>
+            </a:extLst>
+          </p:cNvPr>
+          <p:cNvSpPr/>
+          <p:nvPr/>
+        </p:nvSpPr>
+        <p:spPr>
+          <a:xfrm>
+            <a:off x="595142" y="2462063"/>
+            <a:ext cx="2130805" cy="271163"/>
+          </a:xfrm>
+          <a:prstGeom prst="rect">
+            <a:avLst/>
+          </a:prstGeom>
+          <a:solidFill>
+            <a:schemeClr val="bg1">
+              <a:alpha val="0"/>
+            </a:schemeClr>
+          </a:solidFill>
+          <a:ln>
+            <a:noFill/>
+          </a:ln>
+          <a:effectLst>
+            <a:outerShdw blurRad="50800" dist="38100" dir="2700000" algn="tl" rotWithShape="0">
+              <a:prstClr val="black">
+                <a:alpha val="40000"/>
+              </a:prstClr>
+            </a:outerShdw>
+          </a:effectLst>
+        </p:spPr>
+        <p:style>
+          <a:lnRef idx="2">
+            <a:schemeClr val="accent1">
+              <a:shade val="50000"/>
+            </a:schemeClr>
+          </a:lnRef>
+          <a:fillRef idx="1">
+            <a:schemeClr val="accent1"/>
+          </a:fillRef>
+          <a:effectRef idx="0">
+            <a:schemeClr val="accent1"/>
+          </a:effectRef>
+          <a:fontRef idx="minor">
+            <a:schemeClr val="lt1"/>
+          </a:fontRef>
+        </p:style>
+        <p:txBody>
+          <a:bodyPr rtlCol="0" anchor="ctr"/>
+          <a:lstStyle/>
+          <a:p>
+            <a:r>
+              <a:rPr lang="de-DE" dirty="0" err="1">
+                <a:solidFill>
+                  <a:schemeClr val="bg2">
+                    <a:lumMod val="10000"/>
+                  </a:schemeClr>
+                </a:solidFill>
+                <a:effectLst>
+                  <a:outerShdw blurRad="50800" dist="50800" dir="5400000" sx="1000" sy="1000" algn="ctr" rotWithShape="0">
+                    <a:schemeClr val="bg1">
+                      <a:lumMod val="50000"/>
+                      <a:alpha val="10000"/>
+                    </a:schemeClr>
+                  </a:outerShdw>
+                </a:effectLst>
+              </a:rPr>
+              <a:t>Rotational</a:t>
+            </a:r>
+            <a:r>
+              <a:rPr lang="de-DE" dirty="0">
+                <a:solidFill>
+                  <a:schemeClr val="bg2">
+                    <a:lumMod val="10000"/>
+                  </a:schemeClr>
+                </a:solidFill>
+                <a:effectLst>
+                  <a:outerShdw blurRad="50800" dist="50800" dir="5400000" sx="1000" sy="1000" algn="ctr" rotWithShape="0">
+                    <a:schemeClr val="bg1">
+                      <a:lumMod val="50000"/>
+                      <a:alpha val="10000"/>
+                    </a:schemeClr>
+                  </a:outerShdw>
+                </a:effectLst>
+              </a:rPr>
+              <a:t> Offset</a:t>
+            </a:r>
+          </a:p>
+        </p:txBody>
+      </p:sp>
+      <p:sp>
+        <p:nvSpPr>
+          <p:cNvPr id="66" name="Rechteck 65">
+            <a:extLst>
+              <a:ext uri="{FF2B5EF4-FFF2-40B4-BE49-F238E27FC236}">
+                <a16:creationId xmlns:a16="http://schemas.microsoft.com/office/drawing/2014/main" id="{C91E571C-03CA-4393-9B9B-82ACD4A2196E}"/>
+              </a:ext>
+            </a:extLst>
+          </p:cNvPr>
+          <p:cNvSpPr/>
+          <p:nvPr/>
+        </p:nvSpPr>
+        <p:spPr>
+          <a:xfrm>
+            <a:off x="607060" y="4891370"/>
+            <a:ext cx="2130805" cy="271163"/>
+          </a:xfrm>
+          <a:prstGeom prst="rect">
+            <a:avLst/>
+          </a:prstGeom>
+          <a:solidFill>
+            <a:schemeClr val="bg1">
+              <a:alpha val="0"/>
+            </a:schemeClr>
+          </a:solidFill>
+          <a:ln>
+            <a:noFill/>
+          </a:ln>
+          <a:effectLst>
+            <a:outerShdw blurRad="50800" dist="38100" dir="2700000" algn="tl" rotWithShape="0">
+              <a:prstClr val="black">
+                <a:alpha val="40000"/>
+              </a:prstClr>
+            </a:outerShdw>
+          </a:effectLst>
+        </p:spPr>
+        <p:style>
+          <a:lnRef idx="2">
+            <a:schemeClr val="accent1">
+              <a:shade val="50000"/>
+            </a:schemeClr>
+          </a:lnRef>
+          <a:fillRef idx="1">
+            <a:schemeClr val="accent1"/>
+          </a:fillRef>
+          <a:effectRef idx="0">
+            <a:schemeClr val="accent1"/>
+          </a:effectRef>
+          <a:fontRef idx="minor">
+            <a:schemeClr val="lt1"/>
+          </a:fontRef>
+        </p:style>
+        <p:txBody>
+          <a:bodyPr rtlCol="0" anchor="ctr"/>
+          <a:lstStyle/>
+          <a:p>
+            <a:r>
+              <a:rPr lang="de-DE" dirty="0">
+                <a:solidFill>
+                  <a:schemeClr val="bg2">
+                    <a:lumMod val="10000"/>
+                  </a:schemeClr>
+                </a:solidFill>
+                <a:effectLst>
+                  <a:outerShdw blurRad="50800" dist="50800" dir="5400000" sx="1000" sy="1000" algn="ctr" rotWithShape="0">
+                    <a:schemeClr val="bg1">
+                      <a:lumMod val="50000"/>
+                      <a:alpha val="10000"/>
+                    </a:schemeClr>
+                  </a:outerShdw>
+                </a:effectLst>
+              </a:rPr>
+              <a:t>Min and Max </a:t>
+            </a:r>
+            <a:r>
+              <a:rPr lang="de-DE" dirty="0" err="1">
+                <a:solidFill>
+                  <a:schemeClr val="bg2">
+                    <a:lumMod val="10000"/>
+                  </a:schemeClr>
+                </a:solidFill>
+                <a:effectLst>
+                  <a:outerShdw blurRad="50800" dist="50800" dir="5400000" sx="1000" sy="1000" algn="ctr" rotWithShape="0">
+                    <a:schemeClr val="bg1">
+                      <a:lumMod val="50000"/>
+                      <a:alpha val="10000"/>
+                    </a:schemeClr>
+                  </a:outerShdw>
+                </a:effectLst>
+              </a:rPr>
+              <a:t>Scale</a:t>
+            </a:r>
+            <a:endParaRPr lang="de-DE" dirty="0">
+              <a:solidFill>
+                <a:schemeClr val="bg2">
+                  <a:lumMod val="10000"/>
+                </a:schemeClr>
+              </a:solidFill>
+              <a:effectLst>
+                <a:outerShdw blurRad="50800" dist="50800" dir="5400000" sx="1000" sy="1000" algn="ctr" rotWithShape="0">
+                  <a:schemeClr val="bg1">
+                    <a:lumMod val="50000"/>
+                    <a:alpha val="10000"/>
+                  </a:schemeClr>
+                </a:outerShdw>
+              </a:effectLst>
+            </a:endParaRPr>
+          </a:p>
+        </p:txBody>
+      </p:sp>
+      <p:sp>
+        <p:nvSpPr>
+          <p:cNvPr id="67" name="Rechteck 66">
+            <a:extLst>
+              <a:ext uri="{FF2B5EF4-FFF2-40B4-BE49-F238E27FC236}">
+                <a16:creationId xmlns:a16="http://schemas.microsoft.com/office/drawing/2014/main" id="{72FCCF9B-D0F8-449C-BEC9-98E1AB7E36EA}"/>
+              </a:ext>
+            </a:extLst>
+          </p:cNvPr>
+          <p:cNvSpPr/>
+          <p:nvPr/>
+        </p:nvSpPr>
+        <p:spPr>
+          <a:xfrm>
+            <a:off x="607062" y="3266718"/>
+            <a:ext cx="2130805" cy="271163"/>
+          </a:xfrm>
+          <a:prstGeom prst="rect">
+            <a:avLst/>
+          </a:prstGeom>
+          <a:solidFill>
+            <a:schemeClr val="bg1">
+              <a:alpha val="0"/>
+            </a:schemeClr>
+          </a:solidFill>
+          <a:ln>
+            <a:noFill/>
+          </a:ln>
+          <a:effectLst>
+            <a:outerShdw blurRad="50800" dist="38100" dir="2700000" algn="tl" rotWithShape="0">
+              <a:prstClr val="black">
+                <a:alpha val="40000"/>
+              </a:prstClr>
+            </a:outerShdw>
+          </a:effectLst>
+        </p:spPr>
+        <p:style>
+          <a:lnRef idx="2">
+            <a:schemeClr val="accent1">
+              <a:shade val="50000"/>
+            </a:schemeClr>
+          </a:lnRef>
+          <a:fillRef idx="1">
+            <a:schemeClr val="accent1"/>
+          </a:fillRef>
+          <a:effectRef idx="0">
+            <a:schemeClr val="accent1"/>
+          </a:effectRef>
+          <a:fontRef idx="minor">
+            <a:schemeClr val="lt1"/>
+          </a:fontRef>
+        </p:style>
+        <p:txBody>
+          <a:bodyPr rtlCol="0" anchor="ctr"/>
+          <a:lstStyle/>
+          <a:p>
+            <a:r>
+              <a:rPr lang="de-DE" dirty="0" err="1">
+                <a:solidFill>
+                  <a:schemeClr val="bg2">
+                    <a:lumMod val="10000"/>
+                  </a:schemeClr>
+                </a:solidFill>
+                <a:effectLst>
+                  <a:outerShdw blurRad="50800" dist="50800" dir="5400000" sx="1000" sy="1000" algn="ctr" rotWithShape="0">
+                    <a:schemeClr val="bg1">
+                      <a:lumMod val="50000"/>
+                      <a:alpha val="10000"/>
+                    </a:schemeClr>
+                  </a:outerShdw>
+                </a:effectLst>
+              </a:rPr>
+              <a:t>Align</a:t>
+            </a:r>
+            <a:r>
+              <a:rPr lang="de-DE" dirty="0">
+                <a:solidFill>
+                  <a:schemeClr val="bg2">
+                    <a:lumMod val="10000"/>
+                  </a:schemeClr>
+                </a:solidFill>
+                <a:effectLst>
+                  <a:outerShdw blurRad="50800" dist="50800" dir="5400000" sx="1000" sy="1000" algn="ctr" rotWithShape="0">
+                    <a:schemeClr val="bg1">
+                      <a:lumMod val="50000"/>
+                      <a:alpha val="10000"/>
+                    </a:schemeClr>
+                  </a:outerShdw>
+                </a:effectLst>
+              </a:rPr>
+              <a:t> </a:t>
+            </a:r>
+            <a:r>
+              <a:rPr lang="de-DE" dirty="0" err="1">
+                <a:solidFill>
+                  <a:schemeClr val="bg2">
+                    <a:lumMod val="10000"/>
+                  </a:schemeClr>
+                </a:solidFill>
+                <a:effectLst>
+                  <a:outerShdw blurRad="50800" dist="50800" dir="5400000" sx="1000" sy="1000" algn="ctr" rotWithShape="0">
+                    <a:schemeClr val="bg1">
+                      <a:lumMod val="50000"/>
+                      <a:alpha val="10000"/>
+                    </a:schemeClr>
+                  </a:outerShdw>
+                </a:effectLst>
+              </a:rPr>
+              <a:t>to</a:t>
+            </a:r>
+            <a:r>
+              <a:rPr lang="de-DE" dirty="0">
+                <a:solidFill>
+                  <a:schemeClr val="bg2">
+                    <a:lumMod val="10000"/>
+                  </a:schemeClr>
+                </a:solidFill>
+                <a:effectLst>
+                  <a:outerShdw blurRad="50800" dist="50800" dir="5400000" sx="1000" sy="1000" algn="ctr" rotWithShape="0">
+                    <a:schemeClr val="bg1">
+                      <a:lumMod val="50000"/>
+                      <a:alpha val="10000"/>
+                    </a:schemeClr>
+                  </a:outerShdw>
+                </a:effectLst>
+              </a:rPr>
+              <a:t> Surface</a:t>
+            </a:r>
+          </a:p>
+        </p:txBody>
+      </p:sp>
+      <p:sp>
+        <p:nvSpPr>
+          <p:cNvPr id="68" name="Rechteck 67">
+            <a:extLst>
+              <a:ext uri="{FF2B5EF4-FFF2-40B4-BE49-F238E27FC236}">
+                <a16:creationId xmlns:a16="http://schemas.microsoft.com/office/drawing/2014/main" id="{EE9757CF-F28D-47E6-B24C-2C7CE25B9F9A}"/>
+              </a:ext>
+            </a:extLst>
+          </p:cNvPr>
+          <p:cNvSpPr/>
+          <p:nvPr/>
+        </p:nvSpPr>
+        <p:spPr>
+          <a:xfrm>
+            <a:off x="595142" y="2864982"/>
+            <a:ext cx="2130805" cy="271163"/>
+          </a:xfrm>
+          <a:prstGeom prst="rect">
+            <a:avLst/>
+          </a:prstGeom>
+          <a:solidFill>
+            <a:schemeClr val="bg1">
+              <a:alpha val="0"/>
+            </a:schemeClr>
+          </a:solidFill>
+          <a:ln>
+            <a:noFill/>
+          </a:ln>
+          <a:effectLst>
+            <a:outerShdw blurRad="50800" dist="38100" dir="2700000" algn="tl" rotWithShape="0">
+              <a:prstClr val="black">
+                <a:alpha val="40000"/>
+              </a:prstClr>
+            </a:outerShdw>
+          </a:effectLst>
+        </p:spPr>
+        <p:style>
+          <a:lnRef idx="2">
+            <a:schemeClr val="accent1">
+              <a:shade val="50000"/>
+            </a:schemeClr>
+          </a:lnRef>
+          <a:fillRef idx="1">
+            <a:schemeClr val="accent1"/>
+          </a:fillRef>
+          <a:effectRef idx="0">
+            <a:schemeClr val="accent1"/>
+          </a:effectRef>
+          <a:fontRef idx="minor">
+            <a:schemeClr val="lt1"/>
+          </a:fontRef>
+        </p:style>
+        <p:txBody>
+          <a:bodyPr rtlCol="0" anchor="ctr"/>
+          <a:lstStyle/>
+          <a:p>
+            <a:r>
+              <a:rPr lang="de-DE" dirty="0" err="1">
+                <a:solidFill>
+                  <a:schemeClr val="bg2">
+                    <a:lumMod val="10000"/>
+                  </a:schemeClr>
+                </a:solidFill>
+                <a:effectLst>
+                  <a:outerShdw blurRad="50800" dist="50800" dir="5400000" sx="1000" sy="1000" algn="ctr" rotWithShape="0">
+                    <a:schemeClr val="bg1">
+                      <a:lumMod val="50000"/>
+                      <a:alpha val="10000"/>
+                    </a:schemeClr>
+                  </a:outerShdw>
+                </a:effectLst>
+              </a:rPr>
+              <a:t>Randomize</a:t>
+            </a:r>
+            <a:r>
+              <a:rPr lang="de-DE" dirty="0">
+                <a:solidFill>
+                  <a:schemeClr val="bg2">
+                    <a:lumMod val="10000"/>
+                  </a:schemeClr>
+                </a:solidFill>
+                <a:effectLst>
+                  <a:outerShdw blurRad="50800" dist="50800" dir="5400000" sx="1000" sy="1000" algn="ctr" rotWithShape="0">
+                    <a:schemeClr val="bg1">
+                      <a:lumMod val="50000"/>
+                      <a:alpha val="10000"/>
+                    </a:schemeClr>
+                  </a:outerShdw>
+                </a:effectLst>
+              </a:rPr>
+              <a:t> Rotation</a:t>
+            </a:r>
+          </a:p>
+        </p:txBody>
+      </p:sp>
+      <p:sp>
+        <p:nvSpPr>
+          <p:cNvPr id="69" name="Rechteck 68">
+            <a:extLst>
+              <a:ext uri="{FF2B5EF4-FFF2-40B4-BE49-F238E27FC236}">
+                <a16:creationId xmlns:a16="http://schemas.microsoft.com/office/drawing/2014/main" id="{1F5AD25B-E44F-4E5F-9285-B606C0EEF64B}"/>
+              </a:ext>
+            </a:extLst>
+          </p:cNvPr>
+          <p:cNvSpPr/>
+          <p:nvPr/>
+        </p:nvSpPr>
+        <p:spPr>
+          <a:xfrm>
+            <a:off x="607062" y="3674282"/>
+            <a:ext cx="2130805" cy="271163"/>
+          </a:xfrm>
+          <a:prstGeom prst="rect">
+            <a:avLst/>
+          </a:prstGeom>
+          <a:solidFill>
+            <a:schemeClr val="bg1">
+              <a:alpha val="0"/>
+            </a:schemeClr>
+          </a:solidFill>
+          <a:ln>
+            <a:noFill/>
+          </a:ln>
+          <a:effectLst>
+            <a:outerShdw blurRad="50800" dist="38100" dir="2700000" algn="tl" rotWithShape="0">
+              <a:prstClr val="black">
+                <a:alpha val="40000"/>
+              </a:prstClr>
+            </a:outerShdw>
+          </a:effectLst>
+        </p:spPr>
+        <p:style>
+          <a:lnRef idx="2">
+            <a:schemeClr val="accent1">
+              <a:shade val="50000"/>
+            </a:schemeClr>
+          </a:lnRef>
+          <a:fillRef idx="1">
+            <a:schemeClr val="accent1"/>
+          </a:fillRef>
+          <a:effectRef idx="0">
+            <a:schemeClr val="accent1"/>
+          </a:effectRef>
+          <a:fontRef idx="minor">
+            <a:schemeClr val="lt1"/>
+          </a:fontRef>
+        </p:style>
+        <p:txBody>
+          <a:bodyPr rtlCol="0" anchor="ctr"/>
+          <a:lstStyle/>
+          <a:p>
+            <a:r>
+              <a:rPr lang="de-DE" dirty="0" err="1">
+                <a:solidFill>
+                  <a:schemeClr val="bg2">
+                    <a:lumMod val="10000"/>
+                  </a:schemeClr>
+                </a:solidFill>
+                <a:effectLst>
+                  <a:outerShdw blurRad="50800" dist="50800" dir="5400000" sx="1000" sy="1000" algn="ctr" rotWithShape="0">
+                    <a:schemeClr val="bg1">
+                      <a:lumMod val="50000"/>
+                      <a:alpha val="10000"/>
+                    </a:schemeClr>
+                  </a:outerShdw>
+                </a:effectLst>
+              </a:rPr>
+              <a:t>Allow</a:t>
+            </a:r>
+            <a:r>
+              <a:rPr lang="de-DE" dirty="0">
+                <a:solidFill>
+                  <a:schemeClr val="bg2">
+                    <a:lumMod val="10000"/>
+                  </a:schemeClr>
+                </a:solidFill>
+                <a:effectLst>
+                  <a:outerShdw blurRad="50800" dist="50800" dir="5400000" sx="1000" sy="1000" algn="ctr" rotWithShape="0">
+                    <a:schemeClr val="bg1">
+                      <a:lumMod val="50000"/>
+                      <a:alpha val="10000"/>
+                    </a:schemeClr>
+                  </a:outerShdw>
+                </a:effectLst>
+              </a:rPr>
+              <a:t> </a:t>
+            </a:r>
+            <a:r>
+              <a:rPr lang="de-DE" dirty="0" err="1">
+                <a:solidFill>
+                  <a:schemeClr val="bg2">
+                    <a:lumMod val="10000"/>
+                  </a:schemeClr>
+                </a:solidFill>
+                <a:effectLst>
+                  <a:outerShdw blurRad="50800" dist="50800" dir="5400000" sx="1000" sy="1000" algn="ctr" rotWithShape="0">
+                    <a:schemeClr val="bg1">
+                      <a:lumMod val="50000"/>
+                      <a:alpha val="10000"/>
+                    </a:schemeClr>
+                  </a:outerShdw>
+                </a:effectLst>
+              </a:rPr>
+              <a:t>Intercollision</a:t>
+            </a:r>
+            <a:endParaRPr lang="de-DE" dirty="0">
+              <a:solidFill>
+                <a:schemeClr val="bg2">
+                  <a:lumMod val="10000"/>
+                </a:schemeClr>
+              </a:solidFill>
+              <a:effectLst>
+                <a:outerShdw blurRad="50800" dist="50800" dir="5400000" sx="1000" sy="1000" algn="ctr" rotWithShape="0">
+                  <a:schemeClr val="bg1">
+                    <a:lumMod val="50000"/>
+                    <a:alpha val="10000"/>
+                  </a:schemeClr>
+                </a:outerShdw>
+              </a:effectLst>
+            </a:endParaRPr>
+          </a:p>
+        </p:txBody>
+      </p:sp>
+      <p:sp>
+        <p:nvSpPr>
+          <p:cNvPr id="70" name="Rechteck 69">
+            <a:extLst>
+              <a:ext uri="{FF2B5EF4-FFF2-40B4-BE49-F238E27FC236}">
+                <a16:creationId xmlns:a16="http://schemas.microsoft.com/office/drawing/2014/main" id="{124BD13E-33B7-475C-9CF1-F55BA4742FD3}"/>
+              </a:ext>
+            </a:extLst>
+          </p:cNvPr>
+          <p:cNvSpPr/>
+          <p:nvPr/>
+        </p:nvSpPr>
+        <p:spPr>
+          <a:xfrm>
+            <a:off x="607061" y="4081765"/>
+            <a:ext cx="2130805" cy="271163"/>
+          </a:xfrm>
+          <a:prstGeom prst="rect">
+            <a:avLst/>
+          </a:prstGeom>
+          <a:solidFill>
+            <a:schemeClr val="bg1">
+              <a:alpha val="0"/>
+            </a:schemeClr>
+          </a:solidFill>
+          <a:ln>
+            <a:noFill/>
+          </a:ln>
+          <a:effectLst>
+            <a:outerShdw blurRad="50800" dist="38100" dir="2700000" algn="tl" rotWithShape="0">
+              <a:prstClr val="black">
+                <a:alpha val="40000"/>
+              </a:prstClr>
+            </a:outerShdw>
+          </a:effectLst>
+        </p:spPr>
+        <p:style>
+          <a:lnRef idx="2">
+            <a:schemeClr val="accent1">
+              <a:shade val="50000"/>
+            </a:schemeClr>
+          </a:lnRef>
+          <a:fillRef idx="1">
+            <a:schemeClr val="accent1"/>
+          </a:fillRef>
+          <a:effectRef idx="0">
+            <a:schemeClr val="accent1"/>
+          </a:effectRef>
+          <a:fontRef idx="minor">
+            <a:schemeClr val="lt1"/>
+          </a:fontRef>
+        </p:style>
+        <p:txBody>
+          <a:bodyPr rtlCol="0" anchor="ctr"/>
+          <a:lstStyle/>
+          <a:p>
+            <a:r>
+              <a:rPr lang="de-DE" dirty="0">
+                <a:solidFill>
+                  <a:schemeClr val="bg2">
+                    <a:lumMod val="10000"/>
+                  </a:schemeClr>
+                </a:solidFill>
+                <a:effectLst>
+                  <a:outerShdw blurRad="50800" dist="50800" dir="5400000" sx="1000" sy="1000" algn="ctr" rotWithShape="0">
+                    <a:schemeClr val="bg1">
+                      <a:lumMod val="50000"/>
+                      <a:alpha val="10000"/>
+                    </a:schemeClr>
+                  </a:outerShdw>
+                </a:effectLst>
+              </a:rPr>
+              <a:t>Filter </a:t>
+            </a:r>
+            <a:r>
+              <a:rPr lang="de-DE" dirty="0" err="1">
+                <a:solidFill>
+                  <a:schemeClr val="bg2">
+                    <a:lumMod val="10000"/>
+                  </a:schemeClr>
+                </a:solidFill>
+                <a:effectLst>
+                  <a:outerShdw blurRad="50800" dist="50800" dir="5400000" sx="1000" sy="1000" algn="ctr" rotWithShape="0">
+                    <a:schemeClr val="bg1">
+                      <a:lumMod val="50000"/>
+                      <a:alpha val="10000"/>
+                    </a:schemeClr>
+                  </a:outerShdw>
+                </a:effectLst>
+              </a:rPr>
+              <a:t>by</a:t>
+            </a:r>
+            <a:r>
+              <a:rPr lang="de-DE" dirty="0">
+                <a:solidFill>
+                  <a:schemeClr val="bg2">
+                    <a:lumMod val="10000"/>
+                  </a:schemeClr>
+                </a:solidFill>
+                <a:effectLst>
+                  <a:outerShdw blurRad="50800" dist="50800" dir="5400000" sx="1000" sy="1000" algn="ctr" rotWithShape="0">
+                    <a:schemeClr val="bg1">
+                      <a:lumMod val="50000"/>
+                      <a:alpha val="10000"/>
+                    </a:schemeClr>
+                  </a:outerShdw>
+                </a:effectLst>
+              </a:rPr>
+              <a:t> </a:t>
+            </a:r>
+            <a:r>
+              <a:rPr lang="de-DE" dirty="0" err="1">
+                <a:solidFill>
+                  <a:schemeClr val="bg2">
+                    <a:lumMod val="10000"/>
+                  </a:schemeClr>
+                </a:solidFill>
+                <a:effectLst>
+                  <a:outerShdw blurRad="50800" dist="50800" dir="5400000" sx="1000" sy="1000" algn="ctr" rotWithShape="0">
+                    <a:schemeClr val="bg1">
+                      <a:lumMod val="50000"/>
+                      <a:alpha val="10000"/>
+                    </a:schemeClr>
+                  </a:outerShdw>
+                </a:effectLst>
+              </a:rPr>
+              <a:t>Slope</a:t>
+            </a:r>
+            <a:endParaRPr lang="de-DE" dirty="0">
+              <a:solidFill>
+                <a:schemeClr val="bg2">
+                  <a:lumMod val="10000"/>
+                </a:schemeClr>
+              </a:solidFill>
+              <a:effectLst>
+                <a:outerShdw blurRad="50800" dist="50800" dir="5400000" sx="1000" sy="1000" algn="ctr" rotWithShape="0">
+                  <a:schemeClr val="bg1">
+                    <a:lumMod val="50000"/>
+                    <a:alpha val="10000"/>
+                  </a:schemeClr>
+                </a:outerShdw>
+              </a:effectLst>
+            </a:endParaRPr>
+          </a:p>
+        </p:txBody>
+      </p:sp>
+      <p:sp>
+        <p:nvSpPr>
+          <p:cNvPr id="71" name="Rechteck 70">
+            <a:extLst>
+              <a:ext uri="{FF2B5EF4-FFF2-40B4-BE49-F238E27FC236}">
+                <a16:creationId xmlns:a16="http://schemas.microsoft.com/office/drawing/2014/main" id="{4E187B48-7712-4066-B73F-41D148FF1D14}"/>
+              </a:ext>
+            </a:extLst>
+          </p:cNvPr>
+          <p:cNvSpPr/>
+          <p:nvPr/>
+        </p:nvSpPr>
+        <p:spPr>
+          <a:xfrm>
+            <a:off x="607060" y="4489248"/>
+            <a:ext cx="2130805" cy="271163"/>
+          </a:xfrm>
+          <a:prstGeom prst="rect">
+            <a:avLst/>
+          </a:prstGeom>
+          <a:solidFill>
+            <a:schemeClr val="bg1">
+              <a:alpha val="0"/>
+            </a:schemeClr>
+          </a:solidFill>
+          <a:ln>
+            <a:noFill/>
+          </a:ln>
+          <a:effectLst>
+            <a:outerShdw blurRad="50800" dist="38100" dir="2700000" algn="tl" rotWithShape="0">
+              <a:prstClr val="black">
+                <a:alpha val="40000"/>
+              </a:prstClr>
+            </a:outerShdw>
+          </a:effectLst>
+        </p:spPr>
+        <p:style>
+          <a:lnRef idx="2">
+            <a:schemeClr val="accent1">
+              <a:shade val="50000"/>
+            </a:schemeClr>
+          </a:lnRef>
+          <a:fillRef idx="1">
+            <a:schemeClr val="accent1"/>
+          </a:fillRef>
+          <a:effectRef idx="0">
+            <a:schemeClr val="accent1"/>
+          </a:effectRef>
+          <a:fontRef idx="minor">
+            <a:schemeClr val="lt1"/>
+          </a:fontRef>
+        </p:style>
+        <p:txBody>
+          <a:bodyPr rtlCol="0" anchor="ctr"/>
+          <a:lstStyle/>
+          <a:p>
+            <a:r>
+              <a:rPr lang="de-DE" dirty="0">
+                <a:solidFill>
+                  <a:schemeClr val="bg2">
+                    <a:lumMod val="10000"/>
+                  </a:schemeClr>
+                </a:solidFill>
+                <a:effectLst>
+                  <a:outerShdw blurRad="50800" dist="50800" dir="5400000" sx="1000" sy="1000" algn="ctr" rotWithShape="0">
+                    <a:schemeClr val="bg1">
+                      <a:lumMod val="50000"/>
+                      <a:alpha val="10000"/>
+                    </a:schemeClr>
+                  </a:outerShdw>
+                </a:effectLst>
+              </a:rPr>
+              <a:t>Filter </a:t>
+            </a:r>
+            <a:r>
+              <a:rPr lang="de-DE" dirty="0" err="1">
+                <a:solidFill>
+                  <a:schemeClr val="bg2">
+                    <a:lumMod val="10000"/>
+                  </a:schemeClr>
+                </a:solidFill>
+                <a:effectLst>
+                  <a:outerShdw blurRad="50800" dist="50800" dir="5400000" sx="1000" sy="1000" algn="ctr" rotWithShape="0">
+                    <a:schemeClr val="bg1">
+                      <a:lumMod val="50000"/>
+                      <a:alpha val="10000"/>
+                    </a:schemeClr>
+                  </a:outerShdw>
+                </a:effectLst>
+              </a:rPr>
+              <a:t>by</a:t>
+            </a:r>
+            <a:r>
+              <a:rPr lang="de-DE" dirty="0">
+                <a:solidFill>
+                  <a:schemeClr val="bg2">
+                    <a:lumMod val="10000"/>
+                  </a:schemeClr>
+                </a:solidFill>
+                <a:effectLst>
+                  <a:outerShdw blurRad="50800" dist="50800" dir="5400000" sx="1000" sy="1000" algn="ctr" rotWithShape="0">
+                    <a:schemeClr val="bg1">
+                      <a:lumMod val="50000"/>
+                      <a:alpha val="10000"/>
+                    </a:schemeClr>
+                  </a:outerShdw>
+                </a:effectLst>
+              </a:rPr>
+              <a:t> Layer</a:t>
+            </a:r>
+          </a:p>
+        </p:txBody>
+      </p:sp>
+      <p:sp>
+        <p:nvSpPr>
+          <p:cNvPr id="72" name="Rechteck 71">
+            <a:extLst>
+              <a:ext uri="{FF2B5EF4-FFF2-40B4-BE49-F238E27FC236}">
+                <a16:creationId xmlns:a16="http://schemas.microsoft.com/office/drawing/2014/main" id="{DC113D97-9D70-404C-9A5F-8260B96C60B4}"/>
+              </a:ext>
+            </a:extLst>
+          </p:cNvPr>
+          <p:cNvSpPr/>
+          <p:nvPr/>
+        </p:nvSpPr>
+        <p:spPr>
+          <a:xfrm>
+            <a:off x="607059" y="5295086"/>
+            <a:ext cx="2130805" cy="271163"/>
+          </a:xfrm>
+          <a:prstGeom prst="rect">
+            <a:avLst/>
+          </a:prstGeom>
+          <a:solidFill>
+            <a:schemeClr val="bg1">
+              <a:alpha val="0"/>
+            </a:schemeClr>
+          </a:solidFill>
+          <a:ln>
+            <a:noFill/>
+          </a:ln>
+          <a:effectLst>
+            <a:outerShdw blurRad="50800" dist="38100" dir="2700000" algn="tl" rotWithShape="0">
+              <a:prstClr val="black">
+                <a:alpha val="40000"/>
+              </a:prstClr>
+            </a:outerShdw>
+          </a:effectLst>
+        </p:spPr>
+        <p:style>
+          <a:lnRef idx="2">
+            <a:schemeClr val="accent1">
+              <a:shade val="50000"/>
+            </a:schemeClr>
+          </a:lnRef>
+          <a:fillRef idx="1">
+            <a:schemeClr val="accent1"/>
+          </a:fillRef>
+          <a:effectRef idx="0">
+            <a:schemeClr val="accent1"/>
+          </a:effectRef>
+          <a:fontRef idx="minor">
+            <a:schemeClr val="lt1"/>
+          </a:fontRef>
+        </p:style>
+        <p:txBody>
+          <a:bodyPr rtlCol="0" anchor="ctr"/>
+          <a:lstStyle/>
+          <a:p>
+            <a:r>
+              <a:rPr lang="de-DE" dirty="0">
+                <a:solidFill>
+                  <a:schemeClr val="bg2">
+                    <a:lumMod val="10000"/>
+                  </a:schemeClr>
+                </a:solidFill>
+                <a:effectLst>
+                  <a:outerShdw blurRad="50800" dist="50800" dir="5400000" sx="1000" sy="1000" algn="ctr" rotWithShape="0">
+                    <a:schemeClr val="bg1">
+                      <a:lumMod val="50000"/>
+                      <a:alpha val="10000"/>
+                    </a:schemeClr>
+                  </a:outerShdw>
+                </a:effectLst>
+              </a:rPr>
+              <a:t>Filter </a:t>
+            </a:r>
+            <a:r>
+              <a:rPr lang="de-DE" dirty="0" err="1">
+                <a:solidFill>
+                  <a:schemeClr val="bg2">
+                    <a:lumMod val="10000"/>
+                  </a:schemeClr>
+                </a:solidFill>
+                <a:effectLst>
+                  <a:outerShdw blurRad="50800" dist="50800" dir="5400000" sx="1000" sy="1000" algn="ctr" rotWithShape="0">
+                    <a:schemeClr val="bg1">
+                      <a:lumMod val="50000"/>
+                      <a:alpha val="10000"/>
+                    </a:schemeClr>
+                  </a:outerShdw>
+                </a:effectLst>
+              </a:rPr>
+              <a:t>by</a:t>
+            </a:r>
+            <a:r>
+              <a:rPr lang="de-DE" dirty="0">
+                <a:solidFill>
+                  <a:schemeClr val="bg2">
+                    <a:lumMod val="10000"/>
+                  </a:schemeClr>
+                </a:solidFill>
+                <a:effectLst>
+                  <a:outerShdw blurRad="50800" dist="50800" dir="5400000" sx="1000" sy="1000" algn="ctr" rotWithShape="0">
+                    <a:schemeClr val="bg1">
+                      <a:lumMod val="50000"/>
+                      <a:alpha val="10000"/>
+                    </a:schemeClr>
+                  </a:outerShdw>
+                </a:effectLst>
+              </a:rPr>
+              <a:t> Tag</a:t>
+            </a:r>
+          </a:p>
+        </p:txBody>
+      </p:sp>
+    </p:spTree>
+    <p:extLst>
+      <p:ext uri="{BB962C8B-B14F-4D97-AF65-F5344CB8AC3E}">
+        <p14:creationId xmlns:p14="http://schemas.microsoft.com/office/powerpoint/2010/main" val="912826963"/>
       </p:ext>
     </p:extLst>
   </p:cSld>

</xml_diff>

<commit_message>
Final Polish for v3.2
Thanks Dval!
</commit_message>
<xml_diff>
--- a/Preview.pptx
+++ b/Preview.pptx
@@ -7,6 +7,13 @@
   <p:sldIdLst>
     <p:sldId id="256" r:id="rId2"/>
     <p:sldId id="257" r:id="rId3"/>
+    <p:sldId id="258" r:id="rId4"/>
+    <p:sldId id="259" r:id="rId5"/>
+    <p:sldId id="260" r:id="rId6"/>
+    <p:sldId id="261" r:id="rId7"/>
+    <p:sldId id="262" r:id="rId8"/>
+    <p:sldId id="263" r:id="rId9"/>
+    <p:sldId id="264" r:id="rId10"/>
   </p:sldIdLst>
   <p:sldSz cx="12192000" cy="6858000"/>
   <p:notesSz cx="6858000" cy="9144000"/>
@@ -260,7 +267,7 @@
           <a:p>
             <a:fld id="{159B554F-0A3C-4E11-9282-850BA7307B97}" type="datetimeFigureOut">
               <a:rPr lang="de-DE" smtClean="0"/>
-              <a:t>04.08.2018</a:t>
+              <a:t>26.08.2018</a:t>
             </a:fld>
             <a:endParaRPr lang="de-DE"/>
           </a:p>
@@ -458,7 +465,7 @@
           <a:p>
             <a:fld id="{159B554F-0A3C-4E11-9282-850BA7307B97}" type="datetimeFigureOut">
               <a:rPr lang="de-DE" smtClean="0"/>
-              <a:t>04.08.2018</a:t>
+              <a:t>26.08.2018</a:t>
             </a:fld>
             <a:endParaRPr lang="de-DE"/>
           </a:p>
@@ -666,7 +673,7 @@
           <a:p>
             <a:fld id="{159B554F-0A3C-4E11-9282-850BA7307B97}" type="datetimeFigureOut">
               <a:rPr lang="de-DE" smtClean="0"/>
-              <a:t>04.08.2018</a:t>
+              <a:t>26.08.2018</a:t>
             </a:fld>
             <a:endParaRPr lang="de-DE"/>
           </a:p>
@@ -864,7 +871,7 @@
           <a:p>
             <a:fld id="{159B554F-0A3C-4E11-9282-850BA7307B97}" type="datetimeFigureOut">
               <a:rPr lang="de-DE" smtClean="0"/>
-              <a:t>04.08.2018</a:t>
+              <a:t>26.08.2018</a:t>
             </a:fld>
             <a:endParaRPr lang="de-DE"/>
           </a:p>
@@ -1139,7 +1146,7 @@
           <a:p>
             <a:fld id="{159B554F-0A3C-4E11-9282-850BA7307B97}" type="datetimeFigureOut">
               <a:rPr lang="de-DE" smtClean="0"/>
-              <a:t>04.08.2018</a:t>
+              <a:t>26.08.2018</a:t>
             </a:fld>
             <a:endParaRPr lang="de-DE"/>
           </a:p>
@@ -1404,7 +1411,7 @@
           <a:p>
             <a:fld id="{159B554F-0A3C-4E11-9282-850BA7307B97}" type="datetimeFigureOut">
               <a:rPr lang="de-DE" smtClean="0"/>
-              <a:t>04.08.2018</a:t>
+              <a:t>26.08.2018</a:t>
             </a:fld>
             <a:endParaRPr lang="de-DE"/>
           </a:p>
@@ -1816,7 +1823,7 @@
           <a:p>
             <a:fld id="{159B554F-0A3C-4E11-9282-850BA7307B97}" type="datetimeFigureOut">
               <a:rPr lang="de-DE" smtClean="0"/>
-              <a:t>04.08.2018</a:t>
+              <a:t>26.08.2018</a:t>
             </a:fld>
             <a:endParaRPr lang="de-DE"/>
           </a:p>
@@ -1957,7 +1964,7 @@
           <a:p>
             <a:fld id="{159B554F-0A3C-4E11-9282-850BA7307B97}" type="datetimeFigureOut">
               <a:rPr lang="de-DE" smtClean="0"/>
-              <a:t>04.08.2018</a:t>
+              <a:t>26.08.2018</a:t>
             </a:fld>
             <a:endParaRPr lang="de-DE"/>
           </a:p>
@@ -2070,7 +2077,7 @@
           <a:p>
             <a:fld id="{159B554F-0A3C-4E11-9282-850BA7307B97}" type="datetimeFigureOut">
               <a:rPr lang="de-DE" smtClean="0"/>
-              <a:t>04.08.2018</a:t>
+              <a:t>26.08.2018</a:t>
             </a:fld>
             <a:endParaRPr lang="de-DE"/>
           </a:p>
@@ -2381,7 +2388,7 @@
           <a:p>
             <a:fld id="{159B554F-0A3C-4E11-9282-850BA7307B97}" type="datetimeFigureOut">
               <a:rPr lang="de-DE" smtClean="0"/>
-              <a:t>04.08.2018</a:t>
+              <a:t>26.08.2018</a:t>
             </a:fld>
             <a:endParaRPr lang="de-DE"/>
           </a:p>
@@ -2669,7 +2676,7 @@
           <a:p>
             <a:fld id="{159B554F-0A3C-4E11-9282-850BA7307B97}" type="datetimeFigureOut">
               <a:rPr lang="de-DE" smtClean="0"/>
-              <a:t>04.08.2018</a:t>
+              <a:t>26.08.2018</a:t>
             </a:fld>
             <a:endParaRPr lang="de-DE"/>
           </a:p>
@@ -2910,7 +2917,7 @@
           <a:p>
             <a:fld id="{159B554F-0A3C-4E11-9282-850BA7307B97}" type="datetimeFigureOut">
               <a:rPr lang="de-DE" smtClean="0"/>
-              <a:t>04.08.2018</a:t>
+              <a:t>26.08.2018</a:t>
             </a:fld>
             <a:endParaRPr lang="de-DE"/>
           </a:p>
@@ -3329,10 +3336,10 @@
       </p:grpSpPr>
       <p:pic>
         <p:nvPicPr>
-          <p:cNvPr id="2" name="Grafik 1">
-            <a:extLst>
-              <a:ext uri="{FF2B5EF4-FFF2-40B4-BE49-F238E27FC236}">
-                <a16:creationId xmlns:a16="http://schemas.microsoft.com/office/drawing/2014/main" id="{4A915CC7-B7AF-4882-94B7-F3F7F4952198}"/>
+          <p:cNvPr id="3" name="Grafik 2">
+            <a:extLst>
+              <a:ext uri="{FF2B5EF4-FFF2-40B4-BE49-F238E27FC236}">
+                <a16:creationId xmlns:a16="http://schemas.microsoft.com/office/drawing/2014/main" id="{6BE31601-DE39-4848-959B-FCBBDCAE62B4}"/>
               </a:ext>
             </a:extLst>
           </p:cNvPr>
@@ -3349,8 +3356,8 @@
         </p:blipFill>
         <p:spPr>
           <a:xfrm>
-            <a:off x="3025166" y="41972"/>
-            <a:ext cx="5970211" cy="6774055"/>
+            <a:off x="3634551" y="4801"/>
+            <a:ext cx="4522304" cy="6858000"/>
           </a:xfrm>
           <a:prstGeom prst="rect">
             <a:avLst/>
@@ -3371,8 +3378,8 @@
         </p:nvSpPr>
         <p:spPr>
           <a:xfrm>
-            <a:off x="3025165" y="5776645"/>
-            <a:ext cx="5970211" cy="986203"/>
+            <a:off x="3634550" y="6047418"/>
+            <a:ext cx="4522305" cy="715430"/>
           </a:xfrm>
           <a:prstGeom prst="rect">
             <a:avLst/>
@@ -3426,8 +3433,8 @@
         </p:nvSpPr>
         <p:spPr>
           <a:xfrm>
-            <a:off x="3025165" y="4362548"/>
-            <a:ext cx="5970212" cy="1384300"/>
+            <a:off x="3634549" y="4362547"/>
+            <a:ext cx="4522306" cy="1655075"/>
           </a:xfrm>
           <a:prstGeom prst="rect">
             <a:avLst/>
@@ -3480,8 +3487,8 @@
         </p:nvSpPr>
         <p:spPr>
           <a:xfrm>
-            <a:off x="3025166" y="3567077"/>
-            <a:ext cx="5970212" cy="765674"/>
+            <a:off x="3634551" y="3666309"/>
+            <a:ext cx="4522304" cy="666442"/>
           </a:xfrm>
           <a:prstGeom prst="rect">
             <a:avLst/>
@@ -3534,8 +3541,8 @@
         </p:nvSpPr>
         <p:spPr>
           <a:xfrm>
-            <a:off x="3025166" y="138113"/>
-            <a:ext cx="5970211" cy="3399168"/>
+            <a:off x="3634551" y="95152"/>
+            <a:ext cx="4522304" cy="3541359"/>
           </a:xfrm>
           <a:prstGeom prst="rect">
             <a:avLst/>
@@ -3614,10 +3621,10 @@
       </p:grpSpPr>
       <p:pic>
         <p:nvPicPr>
-          <p:cNvPr id="4" name="Grafik 3" descr="Ein Bild, das Screenshot enthält.&#10;&#10;Mit sehr hoher Zuverlässigkeit generierte Beschreibung">
-            <a:extLst>
-              <a:ext uri="{FF2B5EF4-FFF2-40B4-BE49-F238E27FC236}">
-                <a16:creationId xmlns:a16="http://schemas.microsoft.com/office/drawing/2014/main" id="{126FCEB3-21B9-40FC-A914-A20DD464D6DD}"/>
+          <p:cNvPr id="8" name="Grafik 7">
+            <a:extLst>
+              <a:ext uri="{FF2B5EF4-FFF2-40B4-BE49-F238E27FC236}">
+                <a16:creationId xmlns:a16="http://schemas.microsoft.com/office/drawing/2014/main" id="{00B62927-BF66-4E82-8963-9EF63B3A04BD}"/>
               </a:ext>
             </a:extLst>
           </p:cNvPr>
@@ -3626,21 +3633,16 @@
           </p:cNvPicPr>
           <p:nvPr/>
         </p:nvPicPr>
-        <p:blipFill rotWithShape="1">
-          <a:blip r:embed="rId2">
-            <a:extLst>
-              <a:ext uri="{28A0092B-C50C-407E-A947-70E740481C1C}">
-                <a14:useLocalDpi xmlns:a14="http://schemas.microsoft.com/office/drawing/2010/main" val="0"/>
-              </a:ext>
-            </a:extLst>
-          </a:blip>
-          <a:srcRect r="5778"/>
-          <a:stretch/>
+        <p:blipFill>
+          <a:blip r:embed="rId2"/>
+          <a:stretch>
+            <a:fillRect/>
+          </a:stretch>
         </p:blipFill>
         <p:spPr>
           <a:xfrm>
-            <a:off x="20" y="10"/>
-            <a:ext cx="12191980" cy="6857990"/>
+            <a:off x="-749300" y="-680198"/>
+            <a:ext cx="12941300" cy="7538198"/>
           </a:xfrm>
           <a:prstGeom prst="rect">
             <a:avLst/>
@@ -3661,7 +3663,7 @@
         </p:nvGrpSpPr>
         <p:grpSpPr>
           <a:xfrm>
-            <a:off x="-2436045" y="-4273699"/>
+            <a:off x="-2807607" y="-4417027"/>
             <a:ext cx="7767064" cy="14280824"/>
             <a:chOff x="-2436045" y="-4273699"/>
             <a:chExt cx="7767064" cy="14280824"/>
@@ -3785,17 +3787,52 @@
             <a:lstStyle/>
             <a:p>
               <a:pPr algn="ctr"/>
-              <a:endParaRPr lang="de-DE"/>
+              <a:endParaRPr lang="de-DE" dirty="0"/>
             </a:p>
           </p:txBody>
         </p:sp>
       </p:grpSp>
       <p:sp>
         <p:nvSpPr>
-          <p:cNvPr id="26" name="Rechteck 25">
-            <a:extLst>
-              <a:ext uri="{FF2B5EF4-FFF2-40B4-BE49-F238E27FC236}">
-                <a16:creationId xmlns:a16="http://schemas.microsoft.com/office/drawing/2014/main" id="{11F8EBFA-939E-455F-B5F3-1340C16420AB}"/>
+          <p:cNvPr id="6" name="Textfeld 5">
+            <a:extLst>
+              <a:ext uri="{FF2B5EF4-FFF2-40B4-BE49-F238E27FC236}">
+                <a16:creationId xmlns:a16="http://schemas.microsoft.com/office/drawing/2014/main" id="{9957CCD8-6943-4C86-B0AB-E75FA175698A}"/>
+              </a:ext>
+            </a:extLst>
+          </p:cNvPr>
+          <p:cNvSpPr txBox="1"/>
+          <p:nvPr/>
+        </p:nvSpPr>
+        <p:spPr>
+          <a:xfrm>
+            <a:off x="291994" y="226523"/>
+            <a:ext cx="2714554" cy="369332"/>
+          </a:xfrm>
+          <a:prstGeom prst="rect">
+            <a:avLst/>
+          </a:prstGeom>
+          <a:noFill/>
+        </p:spPr>
+        <p:txBody>
+          <a:bodyPr wrap="square" rtlCol="0">
+            <a:spAutoFit/>
+          </a:bodyPr>
+          <a:lstStyle/>
+          <a:p>
+            <a:r>
+              <a:rPr lang="de-DE" b="1" u="sng" dirty="0"/>
+              <a:t>Key Features</a:t>
+            </a:r>
+          </a:p>
+        </p:txBody>
+      </p:sp>
+      <p:sp>
+        <p:nvSpPr>
+          <p:cNvPr id="28" name="Rechteck 27">
+            <a:extLst>
+              <a:ext uri="{FF2B5EF4-FFF2-40B4-BE49-F238E27FC236}">
+                <a16:creationId xmlns:a16="http://schemas.microsoft.com/office/drawing/2014/main" id="{B9DE106E-4774-4995-8068-F8EC219ACCDA}"/>
               </a:ext>
             </a:extLst>
           </p:cNvPr>
@@ -3804,8 +3841,8 @@
         </p:nvSpPr>
         <p:spPr>
           <a:xfrm>
-            <a:off x="582163" y="850979"/>
-            <a:ext cx="2130805" cy="271163"/>
+            <a:off x="284324" y="396521"/>
+            <a:ext cx="3364398" cy="1606126"/>
           </a:xfrm>
           <a:prstGeom prst="rect">
             <a:avLst/>
@@ -3846,8 +3883,12 @@
           <a:bodyPr rtlCol="0" anchor="ctr"/>
           <a:lstStyle/>
           <a:p>
-            <a:r>
-              <a:rPr lang="de-DE" dirty="0" err="1">
+            <a:pPr marL="285750" indent="-285750">
+              <a:buFont typeface="Wingdings" panose="05000000000000000000" pitchFamily="2" charset="2"/>
+              <a:buChar char="§"/>
+            </a:pPr>
+            <a:r>
+              <a:rPr lang="de-DE" b="1" dirty="0">
                 <a:solidFill>
                   <a:schemeClr val="bg2">
                     <a:lumMod val="10000"/>
@@ -3862,32 +3903,227 @@
                   </a:outerShdw>
                 </a:effectLst>
               </a:rPr>
-              <a:t>Parenting</a:t>
-            </a:r>
-            <a:endParaRPr lang="de-DE" dirty="0">
-              <a:solidFill>
-                <a:schemeClr val="bg2">
-                  <a:lumMod val="10000"/>
-                </a:schemeClr>
-              </a:solidFill>
-              <a:effectLst>
-                <a:outerShdw blurRad="50800" dist="50800" dir="5400000" sx="1000" sy="1000" algn="ctr" rotWithShape="0">
-                  <a:schemeClr val="bg1">
-                    <a:lumMod val="50000"/>
-                    <a:alpha val="10000"/>
-                  </a:schemeClr>
-                </a:outerShdw>
-              </a:effectLst>
-            </a:endParaRPr>
+              <a:t>Multi-</a:t>
+            </a:r>
+            <a:r>
+              <a:rPr lang="de-DE" b="1" dirty="0" err="1">
+                <a:solidFill>
+                  <a:schemeClr val="bg2">
+                    <a:lumMod val="10000"/>
+                  </a:schemeClr>
+                </a:solidFill>
+                <a:effectLst>
+                  <a:outerShdw blurRad="50800" dist="50800" dir="5400000" sx="1000" sy="1000" algn="ctr" rotWithShape="0">
+                    <a:schemeClr val="bg1">
+                      <a:lumMod val="50000"/>
+                      <a:alpha val="10000"/>
+                    </a:schemeClr>
+                  </a:outerShdw>
+                </a:effectLst>
+              </a:rPr>
+              <a:t>Brush</a:t>
+            </a:r>
+            <a:r>
+              <a:rPr lang="de-DE" b="1" dirty="0">
+                <a:solidFill>
+                  <a:schemeClr val="bg2">
+                    <a:lumMod val="10000"/>
+                  </a:schemeClr>
+                </a:solidFill>
+                <a:effectLst>
+                  <a:outerShdw blurRad="50800" dist="50800" dir="5400000" sx="1000" sy="1000" algn="ctr" rotWithShape="0">
+                    <a:schemeClr val="bg1">
+                      <a:lumMod val="50000"/>
+                      <a:alpha val="10000"/>
+                    </a:schemeClr>
+                  </a:outerShdw>
+                </a:effectLst>
+              </a:rPr>
+              <a:t>-Painting</a:t>
+            </a:r>
+          </a:p>
+          <a:p>
+            <a:pPr marL="285750" indent="-285750">
+              <a:buFont typeface="Wingdings" panose="05000000000000000000" pitchFamily="2" charset="2"/>
+              <a:buChar char="§"/>
+            </a:pPr>
+            <a:r>
+              <a:rPr lang="de-DE" dirty="0" err="1">
+                <a:solidFill>
+                  <a:schemeClr val="bg2">
+                    <a:lumMod val="10000"/>
+                  </a:schemeClr>
+                </a:solidFill>
+                <a:effectLst>
+                  <a:outerShdw blurRad="50800" dist="50800" dir="5400000" sx="1000" sy="1000" algn="ctr" rotWithShape="0">
+                    <a:schemeClr val="bg1">
+                      <a:lumMod val="50000"/>
+                      <a:alpha val="10000"/>
+                    </a:schemeClr>
+                  </a:outerShdw>
+                </a:effectLst>
+              </a:rPr>
+              <a:t>Persisstent</a:t>
+            </a:r>
+            <a:r>
+              <a:rPr lang="de-DE" dirty="0">
+                <a:solidFill>
+                  <a:schemeClr val="bg2">
+                    <a:lumMod val="10000"/>
+                  </a:schemeClr>
+                </a:solidFill>
+                <a:effectLst>
+                  <a:outerShdw blurRad="50800" dist="50800" dir="5400000" sx="1000" sy="1000" algn="ctr" rotWithShape="0">
+                    <a:schemeClr val="bg1">
+                      <a:lumMod val="50000"/>
+                      <a:alpha val="10000"/>
+                    </a:schemeClr>
+                  </a:outerShdw>
+                </a:effectLst>
+              </a:rPr>
+              <a:t>, Exportable </a:t>
+            </a:r>
+            <a:r>
+              <a:rPr lang="de-DE" b="1" dirty="0" err="1">
+                <a:solidFill>
+                  <a:schemeClr val="bg2">
+                    <a:lumMod val="10000"/>
+                  </a:schemeClr>
+                </a:solidFill>
+                <a:effectLst>
+                  <a:outerShdw blurRad="50800" dist="50800" dir="5400000" sx="1000" sy="1000" algn="ctr" rotWithShape="0">
+                    <a:schemeClr val="bg1">
+                      <a:lumMod val="50000"/>
+                      <a:alpha val="10000"/>
+                    </a:schemeClr>
+                  </a:outerShdw>
+                </a:effectLst>
+              </a:rPr>
+              <a:t>Brush</a:t>
+            </a:r>
+            <a:r>
+              <a:rPr lang="de-DE" b="1" dirty="0">
+                <a:solidFill>
+                  <a:schemeClr val="bg2">
+                    <a:lumMod val="10000"/>
+                  </a:schemeClr>
+                </a:solidFill>
+                <a:effectLst>
+                  <a:outerShdw blurRad="50800" dist="50800" dir="5400000" sx="1000" sy="1000" algn="ctr" rotWithShape="0">
+                    <a:schemeClr val="bg1">
+                      <a:lumMod val="50000"/>
+                      <a:alpha val="10000"/>
+                    </a:schemeClr>
+                  </a:outerShdw>
+                </a:effectLst>
+              </a:rPr>
+              <a:t> Collections</a:t>
+            </a:r>
+          </a:p>
+          <a:p>
+            <a:pPr marL="285750" indent="-285750">
+              <a:buFont typeface="Wingdings" panose="05000000000000000000" pitchFamily="2" charset="2"/>
+              <a:buChar char="§"/>
+            </a:pPr>
+            <a:r>
+              <a:rPr lang="de-DE" b="1" dirty="0">
+                <a:solidFill>
+                  <a:schemeClr val="bg2">
+                    <a:lumMod val="10000"/>
+                  </a:schemeClr>
+                </a:solidFill>
+                <a:effectLst>
+                  <a:outerShdw blurRad="50800" dist="50800" dir="5400000" sx="1000" sy="1000" algn="ctr" rotWithShape="0">
+                    <a:schemeClr val="bg1">
+                      <a:lumMod val="50000"/>
+                      <a:alpha val="10000"/>
+                    </a:schemeClr>
+                  </a:outerShdw>
+                </a:effectLst>
+              </a:rPr>
+              <a:t>Copy</a:t>
+            </a:r>
+            <a:r>
+              <a:rPr lang="de-DE" dirty="0">
+                <a:solidFill>
+                  <a:schemeClr val="bg2">
+                    <a:lumMod val="10000"/>
+                  </a:schemeClr>
+                </a:solidFill>
+                <a:effectLst>
+                  <a:outerShdw blurRad="50800" dist="50800" dir="5400000" sx="1000" sy="1000" algn="ctr" rotWithShape="0">
+                    <a:schemeClr val="bg1">
+                      <a:lumMod val="50000"/>
+                      <a:alpha val="10000"/>
+                    </a:schemeClr>
+                  </a:outerShdw>
+                </a:effectLst>
+              </a:rPr>
+              <a:t> And </a:t>
+            </a:r>
+            <a:r>
+              <a:rPr lang="de-DE" b="1" dirty="0">
+                <a:solidFill>
+                  <a:schemeClr val="bg2">
+                    <a:lumMod val="10000"/>
+                  </a:schemeClr>
+                </a:solidFill>
+                <a:effectLst>
+                  <a:outerShdw blurRad="50800" dist="50800" dir="5400000" sx="1000" sy="1000" algn="ctr" rotWithShape="0">
+                    <a:schemeClr val="bg1">
+                      <a:lumMod val="50000"/>
+                      <a:alpha val="10000"/>
+                    </a:schemeClr>
+                  </a:outerShdw>
+                </a:effectLst>
+              </a:rPr>
+              <a:t>Paste </a:t>
+            </a:r>
+            <a:r>
+              <a:rPr lang="de-DE" b="1" dirty="0" err="1">
+                <a:solidFill>
+                  <a:schemeClr val="bg2">
+                    <a:lumMod val="10000"/>
+                  </a:schemeClr>
+                </a:solidFill>
+                <a:effectLst>
+                  <a:outerShdw blurRad="50800" dist="50800" dir="5400000" sx="1000" sy="1000" algn="ctr" rotWithShape="0">
+                    <a:schemeClr val="bg1">
+                      <a:lumMod val="50000"/>
+                      <a:alpha val="10000"/>
+                    </a:schemeClr>
+                  </a:outerShdw>
+                </a:effectLst>
+              </a:rPr>
+              <a:t>Brush</a:t>
+            </a:r>
+            <a:r>
+              <a:rPr lang="de-DE" b="1" dirty="0">
+                <a:solidFill>
+                  <a:schemeClr val="bg2">
+                    <a:lumMod val="10000"/>
+                  </a:schemeClr>
+                </a:solidFill>
+                <a:effectLst>
+                  <a:outerShdw blurRad="50800" dist="50800" dir="5400000" sx="1000" sy="1000" algn="ctr" rotWithShape="0">
+                    <a:schemeClr val="bg1">
+                      <a:lumMod val="50000"/>
+                      <a:alpha val="10000"/>
+                    </a:schemeClr>
+                  </a:outerShdw>
+                </a:effectLst>
+              </a:rPr>
+              <a:t> Settings</a:t>
+            </a:r>
           </a:p>
         </p:txBody>
       </p:sp>
       <p:sp>
         <p:nvSpPr>
-          <p:cNvPr id="27" name="Rechteck 26">
-            <a:extLst>
-              <a:ext uri="{FF2B5EF4-FFF2-40B4-BE49-F238E27FC236}">
-                <a16:creationId xmlns:a16="http://schemas.microsoft.com/office/drawing/2014/main" id="{B77F07A1-721C-4EB3-BA1D-1F9A2FD7E6E9}"/>
+          <p:cNvPr id="29" name="Rechteck 28">
+            <a:extLst>
+              <a:ext uri="{FF2B5EF4-FFF2-40B4-BE49-F238E27FC236}">
+                <a16:creationId xmlns:a16="http://schemas.microsoft.com/office/drawing/2014/main" id="{22438644-0F48-4C7F-A53F-2A55C67E787B}"/>
               </a:ext>
             </a:extLst>
           </p:cNvPr>
@@ -3896,8 +4132,8 @@
         </p:nvSpPr>
         <p:spPr>
           <a:xfrm>
-            <a:off x="582163" y="1253898"/>
-            <a:ext cx="2130805" cy="271163"/>
+            <a:off x="284324" y="4934229"/>
+            <a:ext cx="2130805" cy="1017728"/>
           </a:xfrm>
           <a:prstGeom prst="rect">
             <a:avLst/>
@@ -3938,8 +4174,12 @@
           <a:bodyPr rtlCol="0" anchor="ctr"/>
           <a:lstStyle/>
           <a:p>
-            <a:r>
-              <a:rPr lang="de-DE" dirty="0">
+            <a:pPr marL="285750" indent="-285750">
+              <a:buFont typeface="Wingdings" panose="05000000000000000000" pitchFamily="2" charset="2"/>
+              <a:buChar char="§"/>
+            </a:pPr>
+            <a:r>
+              <a:rPr lang="de-DE" b="1" dirty="0">
                 <a:solidFill>
                   <a:schemeClr val="bg2">
                     <a:lumMod val="10000"/>
@@ -3954,17 +4194,277 @@
                   </a:outerShdw>
                 </a:effectLst>
               </a:rPr>
-              <a:t>Density</a:t>
-            </a:r>
+              <a:t>Filter</a:t>
+            </a:r>
+            <a:r>
+              <a:rPr lang="de-DE" dirty="0">
+                <a:solidFill>
+                  <a:schemeClr val="bg2">
+                    <a:lumMod val="10000"/>
+                  </a:schemeClr>
+                </a:solidFill>
+                <a:effectLst>
+                  <a:outerShdw blurRad="50800" dist="50800" dir="5400000" sx="1000" sy="1000" algn="ctr" rotWithShape="0">
+                    <a:schemeClr val="bg1">
+                      <a:lumMod val="50000"/>
+                      <a:alpha val="10000"/>
+                    </a:schemeClr>
+                  </a:outerShdw>
+                </a:effectLst>
+              </a:rPr>
+              <a:t> </a:t>
+            </a:r>
+            <a:r>
+              <a:rPr lang="de-DE" dirty="0" err="1">
+                <a:solidFill>
+                  <a:schemeClr val="bg2">
+                    <a:lumMod val="10000"/>
+                  </a:schemeClr>
+                </a:solidFill>
+                <a:effectLst>
+                  <a:outerShdw blurRad="50800" dist="50800" dir="5400000" sx="1000" sy="1000" algn="ctr" rotWithShape="0">
+                    <a:schemeClr val="bg1">
+                      <a:lumMod val="50000"/>
+                      <a:alpha val="10000"/>
+                    </a:schemeClr>
+                  </a:outerShdw>
+                </a:effectLst>
+              </a:rPr>
+              <a:t>by</a:t>
+            </a:r>
+            <a:r>
+              <a:rPr lang="de-DE" dirty="0">
+                <a:solidFill>
+                  <a:schemeClr val="bg2">
+                    <a:lumMod val="10000"/>
+                  </a:schemeClr>
+                </a:solidFill>
+                <a:effectLst>
+                  <a:outerShdw blurRad="50800" dist="50800" dir="5400000" sx="1000" sy="1000" algn="ctr" rotWithShape="0">
+                    <a:schemeClr val="bg1">
+                      <a:lumMod val="50000"/>
+                      <a:alpha val="10000"/>
+                    </a:schemeClr>
+                  </a:outerShdw>
+                </a:effectLst>
+              </a:rPr>
+              <a:t> </a:t>
+            </a:r>
+            <a:r>
+              <a:rPr lang="de-DE" dirty="0" err="1">
+                <a:solidFill>
+                  <a:schemeClr val="bg2">
+                    <a:lumMod val="10000"/>
+                  </a:schemeClr>
+                </a:solidFill>
+                <a:effectLst>
+                  <a:outerShdw blurRad="50800" dist="50800" dir="5400000" sx="1000" sy="1000" algn="ctr" rotWithShape="0">
+                    <a:schemeClr val="bg1">
+                      <a:lumMod val="50000"/>
+                      <a:alpha val="10000"/>
+                    </a:schemeClr>
+                  </a:outerShdw>
+                </a:effectLst>
+              </a:rPr>
+              <a:t>Slope</a:t>
+            </a:r>
+            <a:endParaRPr lang="de-DE" dirty="0">
+              <a:solidFill>
+                <a:schemeClr val="bg2">
+                  <a:lumMod val="10000"/>
+                </a:schemeClr>
+              </a:solidFill>
+              <a:effectLst>
+                <a:outerShdw blurRad="50800" dist="50800" dir="5400000" sx="1000" sy="1000" algn="ctr" rotWithShape="0">
+                  <a:schemeClr val="bg1">
+                    <a:lumMod val="50000"/>
+                    <a:alpha val="10000"/>
+                  </a:schemeClr>
+                </a:outerShdw>
+              </a:effectLst>
+            </a:endParaRPr>
+          </a:p>
+          <a:p>
+            <a:pPr marL="285750" indent="-285750">
+              <a:buFont typeface="Wingdings" panose="05000000000000000000" pitchFamily="2" charset="2"/>
+              <a:buChar char="§"/>
+            </a:pPr>
+            <a:r>
+              <a:rPr lang="de-DE" b="1" dirty="0">
+                <a:solidFill>
+                  <a:schemeClr val="bg2">
+                    <a:lumMod val="10000"/>
+                  </a:schemeClr>
+                </a:solidFill>
+                <a:effectLst>
+                  <a:outerShdw blurRad="50800" dist="50800" dir="5400000" sx="1000" sy="1000" algn="ctr" rotWithShape="0">
+                    <a:schemeClr val="bg1">
+                      <a:lumMod val="50000"/>
+                      <a:alpha val="10000"/>
+                    </a:schemeClr>
+                  </a:outerShdw>
+                </a:effectLst>
+              </a:rPr>
+              <a:t>Filter</a:t>
+            </a:r>
+            <a:r>
+              <a:rPr lang="de-DE" dirty="0">
+                <a:solidFill>
+                  <a:schemeClr val="bg2">
+                    <a:lumMod val="10000"/>
+                  </a:schemeClr>
+                </a:solidFill>
+                <a:effectLst>
+                  <a:outerShdw blurRad="50800" dist="50800" dir="5400000" sx="1000" sy="1000" algn="ctr" rotWithShape="0">
+                    <a:schemeClr val="bg1">
+                      <a:lumMod val="50000"/>
+                      <a:alpha val="10000"/>
+                    </a:schemeClr>
+                  </a:outerShdw>
+                </a:effectLst>
+              </a:rPr>
+              <a:t> </a:t>
+            </a:r>
+            <a:r>
+              <a:rPr lang="de-DE" dirty="0" err="1">
+                <a:solidFill>
+                  <a:schemeClr val="bg2">
+                    <a:lumMod val="10000"/>
+                  </a:schemeClr>
+                </a:solidFill>
+                <a:effectLst>
+                  <a:outerShdw blurRad="50800" dist="50800" dir="5400000" sx="1000" sy="1000" algn="ctr" rotWithShape="0">
+                    <a:schemeClr val="bg1">
+                      <a:lumMod val="50000"/>
+                      <a:alpha val="10000"/>
+                    </a:schemeClr>
+                  </a:outerShdw>
+                </a:effectLst>
+              </a:rPr>
+              <a:t>by</a:t>
+            </a:r>
+            <a:r>
+              <a:rPr lang="de-DE" dirty="0">
+                <a:solidFill>
+                  <a:schemeClr val="bg2">
+                    <a:lumMod val="10000"/>
+                  </a:schemeClr>
+                </a:solidFill>
+                <a:effectLst>
+                  <a:outerShdw blurRad="50800" dist="50800" dir="5400000" sx="1000" sy="1000" algn="ctr" rotWithShape="0">
+                    <a:schemeClr val="bg1">
+                      <a:lumMod val="50000"/>
+                      <a:alpha val="10000"/>
+                    </a:schemeClr>
+                  </a:outerShdw>
+                </a:effectLst>
+              </a:rPr>
+              <a:t> Layer</a:t>
+            </a:r>
+          </a:p>
+          <a:p>
+            <a:pPr marL="285750" indent="-285750">
+              <a:buFont typeface="Wingdings" panose="05000000000000000000" pitchFamily="2" charset="2"/>
+              <a:buChar char="§"/>
+            </a:pPr>
+            <a:r>
+              <a:rPr lang="de-DE" b="1" dirty="0">
+                <a:solidFill>
+                  <a:schemeClr val="bg2">
+                    <a:lumMod val="10000"/>
+                  </a:schemeClr>
+                </a:solidFill>
+                <a:effectLst>
+                  <a:outerShdw blurRad="50800" dist="50800" dir="5400000" sx="1000" sy="1000" algn="ctr" rotWithShape="0">
+                    <a:schemeClr val="bg1">
+                      <a:lumMod val="50000"/>
+                      <a:alpha val="10000"/>
+                    </a:schemeClr>
+                  </a:outerShdw>
+                </a:effectLst>
+              </a:rPr>
+              <a:t>Filter</a:t>
+            </a:r>
+            <a:r>
+              <a:rPr lang="de-DE" dirty="0">
+                <a:solidFill>
+                  <a:schemeClr val="bg2">
+                    <a:lumMod val="10000"/>
+                  </a:schemeClr>
+                </a:solidFill>
+                <a:effectLst>
+                  <a:outerShdw blurRad="50800" dist="50800" dir="5400000" sx="1000" sy="1000" algn="ctr" rotWithShape="0">
+                    <a:schemeClr val="bg1">
+                      <a:lumMod val="50000"/>
+                      <a:alpha val="10000"/>
+                    </a:schemeClr>
+                  </a:outerShdw>
+                </a:effectLst>
+              </a:rPr>
+              <a:t> </a:t>
+            </a:r>
+            <a:r>
+              <a:rPr lang="de-DE" dirty="0" err="1">
+                <a:solidFill>
+                  <a:schemeClr val="bg2">
+                    <a:lumMod val="10000"/>
+                  </a:schemeClr>
+                </a:solidFill>
+                <a:effectLst>
+                  <a:outerShdw blurRad="50800" dist="50800" dir="5400000" sx="1000" sy="1000" algn="ctr" rotWithShape="0">
+                    <a:schemeClr val="bg1">
+                      <a:lumMod val="50000"/>
+                      <a:alpha val="10000"/>
+                    </a:schemeClr>
+                  </a:outerShdw>
+                </a:effectLst>
+              </a:rPr>
+              <a:t>by</a:t>
+            </a:r>
+            <a:r>
+              <a:rPr lang="de-DE" dirty="0">
+                <a:solidFill>
+                  <a:schemeClr val="bg2">
+                    <a:lumMod val="10000"/>
+                  </a:schemeClr>
+                </a:solidFill>
+                <a:effectLst>
+                  <a:outerShdw blurRad="50800" dist="50800" dir="5400000" sx="1000" sy="1000" algn="ctr" rotWithShape="0">
+                    <a:schemeClr val="bg1">
+                      <a:lumMod val="50000"/>
+                      <a:alpha val="10000"/>
+                    </a:schemeClr>
+                  </a:outerShdw>
+                </a:effectLst>
+              </a:rPr>
+              <a:t> Tag</a:t>
+            </a:r>
+          </a:p>
+          <a:p>
+            <a:endParaRPr lang="de-DE" dirty="0">
+              <a:solidFill>
+                <a:schemeClr val="bg2">
+                  <a:lumMod val="10000"/>
+                </a:schemeClr>
+              </a:solidFill>
+              <a:effectLst>
+                <a:outerShdw blurRad="50800" dist="50800" dir="5400000" sx="1000" sy="1000" algn="ctr" rotWithShape="0">
+                  <a:schemeClr val="bg1">
+                    <a:lumMod val="50000"/>
+                    <a:alpha val="10000"/>
+                  </a:schemeClr>
+                </a:outerShdw>
+              </a:effectLst>
+            </a:endParaRPr>
           </a:p>
         </p:txBody>
       </p:sp>
       <p:sp>
         <p:nvSpPr>
-          <p:cNvPr id="52" name="Rechteck 51">
-            <a:extLst>
-              <a:ext uri="{FF2B5EF4-FFF2-40B4-BE49-F238E27FC236}">
-                <a16:creationId xmlns:a16="http://schemas.microsoft.com/office/drawing/2014/main" id="{7620DAF5-217C-4E8C-A529-A160796AACDA}"/>
+          <p:cNvPr id="30" name="Rechteck 29">
+            <a:extLst>
+              <a:ext uri="{FF2B5EF4-FFF2-40B4-BE49-F238E27FC236}">
+                <a16:creationId xmlns:a16="http://schemas.microsoft.com/office/drawing/2014/main" id="{0D2F5FFA-74B8-42EB-81A6-DF385E66A481}"/>
               </a:ext>
             </a:extLst>
           </p:cNvPr>
@@ -3973,8 +4473,8 @@
         </p:nvSpPr>
         <p:spPr>
           <a:xfrm>
-            <a:off x="3362515" y="850979"/>
-            <a:ext cx="2130805" cy="271163"/>
+            <a:off x="284324" y="2151777"/>
+            <a:ext cx="4500576" cy="3457897"/>
           </a:xfrm>
           <a:prstGeom prst="rect">
             <a:avLst/>
@@ -4012,11 +4512,15 @@
           </a:fontRef>
         </p:style>
         <p:txBody>
-          <a:bodyPr rtlCol="0" anchor="ctr"/>
+          <a:bodyPr numCol="1" rtlCol="0" anchor="ctr"/>
           <a:lstStyle/>
           <a:p>
-            <a:r>
-              <a:rPr lang="de-DE" dirty="0">
+            <a:pPr marL="285750" indent="-285750">
+              <a:buFont typeface="Wingdings" panose="05000000000000000000" pitchFamily="2" charset="2"/>
+              <a:buChar char="§"/>
+            </a:pPr>
+            <a:r>
+              <a:rPr lang="de-DE" b="1" dirty="0" err="1">
                 <a:solidFill>
                   <a:schemeClr val="bg2">
                     <a:lumMod val="10000"/>
@@ -4031,8 +4535,161 @@
                   </a:outerShdw>
                 </a:effectLst>
               </a:rPr>
-              <a:t>Multi-</a:t>
-            </a:r>
+              <a:t>Parenting</a:t>
+            </a:r>
+            <a:r>
+              <a:rPr lang="de-DE" dirty="0">
+                <a:solidFill>
+                  <a:schemeClr val="bg2">
+                    <a:lumMod val="10000"/>
+                  </a:schemeClr>
+                </a:solidFill>
+                <a:effectLst>
+                  <a:outerShdw blurRad="50800" dist="50800" dir="5400000" sx="1000" sy="1000" algn="ctr" rotWithShape="0">
+                    <a:schemeClr val="bg1">
+                      <a:lumMod val="50000"/>
+                      <a:alpha val="10000"/>
+                    </a:schemeClr>
+                  </a:outerShdw>
+                </a:effectLst>
+              </a:rPr>
+              <a:t> </a:t>
+            </a:r>
+            <a:r>
+              <a:rPr lang="de-DE" dirty="0" err="1">
+                <a:solidFill>
+                  <a:schemeClr val="bg2">
+                    <a:lumMod val="10000"/>
+                  </a:schemeClr>
+                </a:solidFill>
+                <a:effectLst>
+                  <a:outerShdw blurRad="50800" dist="50800" dir="5400000" sx="1000" sy="1000" algn="ctr" rotWithShape="0">
+                    <a:schemeClr val="bg1">
+                      <a:lumMod val="50000"/>
+                      <a:alpha val="10000"/>
+                    </a:schemeClr>
+                  </a:outerShdw>
+                </a:effectLst>
+              </a:rPr>
+              <a:t>of</a:t>
+            </a:r>
+            <a:r>
+              <a:rPr lang="de-DE" dirty="0">
+                <a:solidFill>
+                  <a:schemeClr val="bg2">
+                    <a:lumMod val="10000"/>
+                  </a:schemeClr>
+                </a:solidFill>
+                <a:effectLst>
+                  <a:outerShdw blurRad="50800" dist="50800" dir="5400000" sx="1000" sy="1000" algn="ctr" rotWithShape="0">
+                    <a:schemeClr val="bg1">
+                      <a:lumMod val="50000"/>
+                      <a:alpha val="10000"/>
+                    </a:schemeClr>
+                  </a:outerShdw>
+                </a:effectLst>
+              </a:rPr>
+              <a:t> </a:t>
+            </a:r>
+            <a:r>
+              <a:rPr lang="de-DE" dirty="0" err="1">
+                <a:solidFill>
+                  <a:schemeClr val="bg2">
+                    <a:lumMod val="10000"/>
+                  </a:schemeClr>
+                </a:solidFill>
+                <a:effectLst>
+                  <a:outerShdw blurRad="50800" dist="50800" dir="5400000" sx="1000" sy="1000" algn="ctr" rotWithShape="0">
+                    <a:schemeClr val="bg1">
+                      <a:lumMod val="50000"/>
+                      <a:alpha val="10000"/>
+                    </a:schemeClr>
+                  </a:outerShdw>
+                </a:effectLst>
+              </a:rPr>
+              <a:t>created</a:t>
+            </a:r>
+            <a:r>
+              <a:rPr lang="de-DE" dirty="0">
+                <a:solidFill>
+                  <a:schemeClr val="bg2">
+                    <a:lumMod val="10000"/>
+                  </a:schemeClr>
+                </a:solidFill>
+                <a:effectLst>
+                  <a:outerShdw blurRad="50800" dist="50800" dir="5400000" sx="1000" sy="1000" algn="ctr" rotWithShape="0">
+                    <a:schemeClr val="bg1">
+                      <a:lumMod val="50000"/>
+                      <a:alpha val="10000"/>
+                    </a:schemeClr>
+                  </a:outerShdw>
+                </a:effectLst>
+              </a:rPr>
+              <a:t> </a:t>
+            </a:r>
+            <a:r>
+              <a:rPr lang="de-DE" dirty="0" err="1">
+                <a:solidFill>
+                  <a:schemeClr val="bg2">
+                    <a:lumMod val="10000"/>
+                  </a:schemeClr>
+                </a:solidFill>
+                <a:effectLst>
+                  <a:outerShdw blurRad="50800" dist="50800" dir="5400000" sx="1000" sy="1000" algn="ctr" rotWithShape="0">
+                    <a:schemeClr val="bg1">
+                      <a:lumMod val="50000"/>
+                      <a:alpha val="10000"/>
+                    </a:schemeClr>
+                  </a:outerShdw>
+                </a:effectLst>
+              </a:rPr>
+              <a:t>GameObjects</a:t>
+            </a:r>
+            <a:endParaRPr lang="de-DE" dirty="0">
+              <a:solidFill>
+                <a:schemeClr val="bg2">
+                  <a:lumMod val="10000"/>
+                </a:schemeClr>
+              </a:solidFill>
+              <a:effectLst>
+                <a:outerShdw blurRad="50800" dist="50800" dir="5400000" sx="1000" sy="1000" algn="ctr" rotWithShape="0">
+                  <a:schemeClr val="bg1">
+                    <a:lumMod val="50000"/>
+                    <a:alpha val="10000"/>
+                  </a:schemeClr>
+                </a:outerShdw>
+              </a:effectLst>
+            </a:endParaRPr>
+          </a:p>
+          <a:p>
+            <a:pPr marL="285750" indent="-285750">
+              <a:buFont typeface="Wingdings" panose="05000000000000000000" pitchFamily="2" charset="2"/>
+              <a:buChar char="§"/>
+            </a:pPr>
+            <a:r>
+              <a:rPr lang="de-DE" b="1" dirty="0">
+                <a:solidFill>
+                  <a:schemeClr val="bg2">
+                    <a:lumMod val="10000"/>
+                  </a:schemeClr>
+                </a:solidFill>
+                <a:effectLst>
+                  <a:outerShdw blurRad="50800" dist="50800" dir="5400000" sx="1000" sy="1000" algn="ctr" rotWithShape="0">
+                    <a:schemeClr val="bg1">
+                      <a:lumMod val="50000"/>
+                      <a:alpha val="10000"/>
+                    </a:schemeClr>
+                  </a:outerShdw>
+                </a:effectLst>
+              </a:rPr>
+              <a:t>Density</a:t>
+            </a:r>
+          </a:p>
+          <a:p>
+            <a:pPr marL="285750" indent="-285750">
+              <a:buFont typeface="Wingdings" panose="05000000000000000000" pitchFamily="2" charset="2"/>
+              <a:buChar char="§"/>
+            </a:pPr>
             <a:r>
               <a:rPr lang="de-DE" dirty="0" err="1">
                 <a:solidFill>
@@ -4067,69 +4724,10 @@
                   </a:outerShdw>
                 </a:effectLst>
               </a:rPr>
-              <a:t>-Painting</a:t>
-            </a:r>
-          </a:p>
-        </p:txBody>
-      </p:sp>
-      <p:sp>
-        <p:nvSpPr>
-          <p:cNvPr id="53" name="Rechteck 52">
-            <a:extLst>
-              <a:ext uri="{FF2B5EF4-FFF2-40B4-BE49-F238E27FC236}">
-                <a16:creationId xmlns:a16="http://schemas.microsoft.com/office/drawing/2014/main" id="{D54088B5-5993-46E3-9EC9-186A1228A0EC}"/>
-              </a:ext>
-            </a:extLst>
-          </p:cNvPr>
-          <p:cNvSpPr/>
-          <p:nvPr/>
-        </p:nvSpPr>
-        <p:spPr>
-          <a:xfrm>
-            <a:off x="3382678" y="1253898"/>
-            <a:ext cx="2130805" cy="271163"/>
-          </a:xfrm>
-          <a:prstGeom prst="rect">
-            <a:avLst/>
-          </a:prstGeom>
-          <a:solidFill>
-            <a:schemeClr val="bg1">
-              <a:alpha val="0"/>
-            </a:schemeClr>
-          </a:solidFill>
-          <a:ln>
-            <a:noFill/>
-          </a:ln>
-          <a:effectLst>
-            <a:outerShdw blurRad="50800" dist="38100" dir="2700000" algn="tl" rotWithShape="0">
-              <a:prstClr val="black">
-                <a:alpha val="40000"/>
-              </a:prstClr>
-            </a:outerShdw>
-          </a:effectLst>
-        </p:spPr>
-        <p:style>
-          <a:lnRef idx="2">
-            <a:schemeClr val="accent1">
-              <a:shade val="50000"/>
-            </a:schemeClr>
-          </a:lnRef>
-          <a:fillRef idx="1">
-            <a:schemeClr val="accent1"/>
-          </a:fillRef>
-          <a:effectRef idx="0">
-            <a:schemeClr val="accent1"/>
-          </a:effectRef>
-          <a:fontRef idx="minor">
-            <a:schemeClr val="lt1"/>
-          </a:fontRef>
-        </p:style>
-        <p:txBody>
-          <a:bodyPr rtlCol="0" anchor="ctr"/>
-          <a:lstStyle/>
-          <a:p>
-            <a:r>
-              <a:rPr lang="de-DE" dirty="0">
+              <a:t> </a:t>
+            </a:r>
+            <a:r>
+              <a:rPr lang="de-DE" b="1" dirty="0">
                 <a:solidFill>
                   <a:schemeClr val="bg2">
                     <a:lumMod val="10000"/>
@@ -4144,67 +4742,440 @@
                   </a:outerShdw>
                 </a:effectLst>
               </a:rPr>
-              <a:t>Copy And Paste</a:t>
-            </a:r>
-          </a:p>
-        </p:txBody>
-      </p:sp>
-      <p:sp>
-        <p:nvSpPr>
-          <p:cNvPr id="56" name="Rechteck 55">
-            <a:extLst>
-              <a:ext uri="{FF2B5EF4-FFF2-40B4-BE49-F238E27FC236}">
-                <a16:creationId xmlns:a16="http://schemas.microsoft.com/office/drawing/2014/main" id="{97E6CEA2-A7F3-4541-8EA7-68E5F5E61579}"/>
-              </a:ext>
-            </a:extLst>
-          </p:cNvPr>
-          <p:cNvSpPr/>
-          <p:nvPr/>
-        </p:nvSpPr>
-        <p:spPr>
-          <a:xfrm>
-            <a:off x="3382678" y="1615902"/>
-            <a:ext cx="2130805" cy="714405"/>
-          </a:xfrm>
-          <a:prstGeom prst="rect">
-            <a:avLst/>
-          </a:prstGeom>
-          <a:solidFill>
-            <a:schemeClr val="bg1">
-              <a:alpha val="0"/>
-            </a:schemeClr>
-          </a:solidFill>
-          <a:ln>
-            <a:noFill/>
-          </a:ln>
-          <a:effectLst>
-            <a:outerShdw blurRad="50800" dist="38100" dir="2700000" algn="tl" rotWithShape="0">
-              <a:prstClr val="black">
-                <a:alpha val="40000"/>
-              </a:prstClr>
-            </a:outerShdw>
-          </a:effectLst>
-        </p:spPr>
-        <p:style>
-          <a:lnRef idx="2">
-            <a:schemeClr val="accent1">
-              <a:shade val="50000"/>
-            </a:schemeClr>
-          </a:lnRef>
-          <a:fillRef idx="1">
-            <a:schemeClr val="accent1"/>
-          </a:fillRef>
-          <a:effectRef idx="0">
-            <a:schemeClr val="accent1"/>
-          </a:effectRef>
-          <a:fontRef idx="minor">
-            <a:schemeClr val="lt1"/>
-          </a:fontRef>
-        </p:style>
-        <p:txBody>
-          <a:bodyPr rtlCol="0" anchor="ctr"/>
-          <a:lstStyle/>
-          <a:p>
+              <a:t>Size</a:t>
+            </a:r>
+          </a:p>
+          <a:p>
+            <a:pPr marL="285750" indent="-285750">
+              <a:buFont typeface="Wingdings" panose="05000000000000000000" pitchFamily="2" charset="2"/>
+              <a:buChar char="§"/>
+            </a:pPr>
+            <a:r>
+              <a:rPr lang="de-DE" dirty="0">
+                <a:solidFill>
+                  <a:schemeClr val="bg2">
+                    <a:lumMod val="10000"/>
+                  </a:schemeClr>
+                </a:solidFill>
+                <a:effectLst>
+                  <a:outerShdw blurRad="50800" dist="50800" dir="5400000" sx="1000" sy="1000" algn="ctr" rotWithShape="0">
+                    <a:schemeClr val="bg1">
+                      <a:lumMod val="50000"/>
+                      <a:alpha val="10000"/>
+                    </a:schemeClr>
+                  </a:outerShdw>
+                </a:effectLst>
+              </a:rPr>
+              <a:t>Min and Max </a:t>
+            </a:r>
+            <a:r>
+              <a:rPr lang="de-DE" b="1" dirty="0" err="1">
+                <a:solidFill>
+                  <a:schemeClr val="bg2">
+                    <a:lumMod val="10000"/>
+                  </a:schemeClr>
+                </a:solidFill>
+                <a:effectLst>
+                  <a:outerShdw blurRad="50800" dist="50800" dir="5400000" sx="1000" sy="1000" algn="ctr" rotWithShape="0">
+                    <a:schemeClr val="bg1">
+                      <a:lumMod val="50000"/>
+                      <a:alpha val="10000"/>
+                    </a:schemeClr>
+                  </a:outerShdw>
+                </a:effectLst>
+              </a:rPr>
+              <a:t>Scale</a:t>
+            </a:r>
+            <a:endParaRPr lang="de-DE" b="1" dirty="0">
+              <a:solidFill>
+                <a:schemeClr val="bg2">
+                  <a:lumMod val="10000"/>
+                </a:schemeClr>
+              </a:solidFill>
+              <a:effectLst>
+                <a:outerShdw blurRad="50800" dist="50800" dir="5400000" sx="1000" sy="1000" algn="ctr" rotWithShape="0">
+                  <a:schemeClr val="bg1">
+                    <a:lumMod val="50000"/>
+                    <a:alpha val="10000"/>
+                  </a:schemeClr>
+                </a:outerShdw>
+              </a:effectLst>
+            </a:endParaRPr>
+          </a:p>
+          <a:p>
+            <a:pPr marL="285750" indent="-285750">
+              <a:buFont typeface="Wingdings" panose="05000000000000000000" pitchFamily="2" charset="2"/>
+              <a:buChar char="§"/>
+            </a:pPr>
+            <a:r>
+              <a:rPr lang="de-DE" b="1" dirty="0">
+                <a:solidFill>
+                  <a:schemeClr val="bg2">
+                    <a:lumMod val="10000"/>
+                  </a:schemeClr>
+                </a:solidFill>
+                <a:effectLst>
+                  <a:outerShdw blurRad="50800" dist="50800" dir="5400000" sx="1000" sy="1000" algn="ctr" rotWithShape="0">
+                    <a:schemeClr val="bg1">
+                      <a:lumMod val="50000"/>
+                      <a:alpha val="10000"/>
+                    </a:schemeClr>
+                  </a:outerShdw>
+                </a:effectLst>
+              </a:rPr>
+              <a:t>Offset</a:t>
+            </a:r>
+            <a:r>
+              <a:rPr lang="de-DE" dirty="0">
+                <a:solidFill>
+                  <a:schemeClr val="bg2">
+                    <a:lumMod val="10000"/>
+                  </a:schemeClr>
+                </a:solidFill>
+                <a:effectLst>
+                  <a:outerShdw blurRad="50800" dist="50800" dir="5400000" sx="1000" sy="1000" algn="ctr" rotWithShape="0">
+                    <a:schemeClr val="bg1">
+                      <a:lumMod val="50000"/>
+                      <a:alpha val="10000"/>
+                    </a:schemeClr>
+                  </a:outerShdw>
+                </a:effectLst>
+              </a:rPr>
+              <a:t> </a:t>
+            </a:r>
+            <a:r>
+              <a:rPr lang="de-DE" dirty="0" err="1">
+                <a:solidFill>
+                  <a:schemeClr val="bg2">
+                    <a:lumMod val="10000"/>
+                  </a:schemeClr>
+                </a:solidFill>
+                <a:effectLst>
+                  <a:outerShdw blurRad="50800" dist="50800" dir="5400000" sx="1000" sy="1000" algn="ctr" rotWithShape="0">
+                    <a:schemeClr val="bg1">
+                      <a:lumMod val="50000"/>
+                      <a:alpha val="10000"/>
+                    </a:schemeClr>
+                  </a:outerShdw>
+                </a:effectLst>
+              </a:rPr>
+              <a:t>From</a:t>
+            </a:r>
+            <a:r>
+              <a:rPr lang="de-DE" dirty="0">
+                <a:solidFill>
+                  <a:schemeClr val="bg2">
+                    <a:lumMod val="10000"/>
+                  </a:schemeClr>
+                </a:solidFill>
+                <a:effectLst>
+                  <a:outerShdw blurRad="50800" dist="50800" dir="5400000" sx="1000" sy="1000" algn="ctr" rotWithShape="0">
+                    <a:schemeClr val="bg1">
+                      <a:lumMod val="50000"/>
+                      <a:alpha val="10000"/>
+                    </a:schemeClr>
+                  </a:outerShdw>
+                </a:effectLst>
+              </a:rPr>
+              <a:t> Pivot</a:t>
+            </a:r>
+          </a:p>
+          <a:p>
+            <a:pPr marL="285750" indent="-285750">
+              <a:buFont typeface="Wingdings" panose="05000000000000000000" pitchFamily="2" charset="2"/>
+              <a:buChar char="§"/>
+            </a:pPr>
+            <a:r>
+              <a:rPr lang="de-DE" dirty="0" err="1">
+                <a:solidFill>
+                  <a:schemeClr val="bg2">
+                    <a:lumMod val="10000"/>
+                  </a:schemeClr>
+                </a:solidFill>
+                <a:effectLst>
+                  <a:outerShdw blurRad="50800" dist="50800" dir="5400000" sx="1000" sy="1000" algn="ctr" rotWithShape="0">
+                    <a:schemeClr val="bg1">
+                      <a:lumMod val="50000"/>
+                      <a:alpha val="10000"/>
+                    </a:schemeClr>
+                  </a:outerShdw>
+                </a:effectLst>
+              </a:rPr>
+              <a:t>Rotational</a:t>
+            </a:r>
+            <a:r>
+              <a:rPr lang="de-DE" dirty="0">
+                <a:solidFill>
+                  <a:schemeClr val="bg2">
+                    <a:lumMod val="10000"/>
+                  </a:schemeClr>
+                </a:solidFill>
+                <a:effectLst>
+                  <a:outerShdw blurRad="50800" dist="50800" dir="5400000" sx="1000" sy="1000" algn="ctr" rotWithShape="0">
+                    <a:schemeClr val="bg1">
+                      <a:lumMod val="50000"/>
+                      <a:alpha val="10000"/>
+                    </a:schemeClr>
+                  </a:outerShdw>
+                </a:effectLst>
+              </a:rPr>
+              <a:t> </a:t>
+            </a:r>
+            <a:r>
+              <a:rPr lang="de-DE" b="1" dirty="0">
+                <a:solidFill>
+                  <a:schemeClr val="bg2">
+                    <a:lumMod val="10000"/>
+                  </a:schemeClr>
+                </a:solidFill>
+                <a:effectLst>
+                  <a:outerShdw blurRad="50800" dist="50800" dir="5400000" sx="1000" sy="1000" algn="ctr" rotWithShape="0">
+                    <a:schemeClr val="bg1">
+                      <a:lumMod val="50000"/>
+                      <a:alpha val="10000"/>
+                    </a:schemeClr>
+                  </a:outerShdw>
+                </a:effectLst>
+              </a:rPr>
+              <a:t>Offset</a:t>
+            </a:r>
+          </a:p>
+          <a:p>
+            <a:pPr marL="285750" indent="-285750">
+              <a:buFont typeface="Wingdings" panose="05000000000000000000" pitchFamily="2" charset="2"/>
+              <a:buChar char="§"/>
+            </a:pPr>
+            <a:r>
+              <a:rPr lang="de-DE" dirty="0" err="1">
+                <a:solidFill>
+                  <a:schemeClr val="bg2">
+                    <a:lumMod val="10000"/>
+                  </a:schemeClr>
+                </a:solidFill>
+                <a:effectLst>
+                  <a:outerShdw blurRad="50800" dist="50800" dir="5400000" sx="1000" sy="1000" algn="ctr" rotWithShape="0">
+                    <a:schemeClr val="bg1">
+                      <a:lumMod val="50000"/>
+                      <a:alpha val="10000"/>
+                    </a:schemeClr>
+                  </a:outerShdw>
+                </a:effectLst>
+              </a:rPr>
+              <a:t>Randomize</a:t>
+            </a:r>
+            <a:r>
+              <a:rPr lang="de-DE" dirty="0">
+                <a:solidFill>
+                  <a:schemeClr val="bg2">
+                    <a:lumMod val="10000"/>
+                  </a:schemeClr>
+                </a:solidFill>
+                <a:effectLst>
+                  <a:outerShdw blurRad="50800" dist="50800" dir="5400000" sx="1000" sy="1000" algn="ctr" rotWithShape="0">
+                    <a:schemeClr val="bg1">
+                      <a:lumMod val="50000"/>
+                      <a:alpha val="10000"/>
+                    </a:schemeClr>
+                  </a:outerShdw>
+                </a:effectLst>
+              </a:rPr>
+              <a:t> </a:t>
+            </a:r>
+            <a:r>
+              <a:rPr lang="de-DE" b="1" dirty="0">
+                <a:solidFill>
+                  <a:schemeClr val="bg2">
+                    <a:lumMod val="10000"/>
+                  </a:schemeClr>
+                </a:solidFill>
+                <a:effectLst>
+                  <a:outerShdw blurRad="50800" dist="50800" dir="5400000" sx="1000" sy="1000" algn="ctr" rotWithShape="0">
+                    <a:schemeClr val="bg1">
+                      <a:lumMod val="50000"/>
+                      <a:alpha val="10000"/>
+                    </a:schemeClr>
+                  </a:outerShdw>
+                </a:effectLst>
+              </a:rPr>
+              <a:t>Rotation</a:t>
+            </a:r>
+          </a:p>
+          <a:p>
+            <a:pPr marL="285750" indent="-285750">
+              <a:buFont typeface="Wingdings" panose="05000000000000000000" pitchFamily="2" charset="2"/>
+              <a:buChar char="§"/>
+            </a:pPr>
+            <a:r>
+              <a:rPr lang="de-DE" b="1" dirty="0" err="1">
+                <a:solidFill>
+                  <a:schemeClr val="bg2">
+                    <a:lumMod val="10000"/>
+                  </a:schemeClr>
+                </a:solidFill>
+                <a:effectLst>
+                  <a:outerShdw blurRad="50800" dist="50800" dir="5400000" sx="1000" sy="1000" algn="ctr" rotWithShape="0">
+                    <a:schemeClr val="bg1">
+                      <a:lumMod val="50000"/>
+                      <a:alpha val="10000"/>
+                    </a:schemeClr>
+                  </a:outerShdw>
+                </a:effectLst>
+              </a:rPr>
+              <a:t>Align</a:t>
+            </a:r>
+            <a:r>
+              <a:rPr lang="de-DE" dirty="0">
+                <a:solidFill>
+                  <a:schemeClr val="bg2">
+                    <a:lumMod val="10000"/>
+                  </a:schemeClr>
+                </a:solidFill>
+                <a:effectLst>
+                  <a:outerShdw blurRad="50800" dist="50800" dir="5400000" sx="1000" sy="1000" algn="ctr" rotWithShape="0">
+                    <a:schemeClr val="bg1">
+                      <a:lumMod val="50000"/>
+                      <a:alpha val="10000"/>
+                    </a:schemeClr>
+                  </a:outerShdw>
+                </a:effectLst>
+              </a:rPr>
+              <a:t> </a:t>
+            </a:r>
+            <a:r>
+              <a:rPr lang="de-DE" dirty="0" err="1">
+                <a:solidFill>
+                  <a:schemeClr val="bg2">
+                    <a:lumMod val="10000"/>
+                  </a:schemeClr>
+                </a:solidFill>
+                <a:effectLst>
+                  <a:outerShdw blurRad="50800" dist="50800" dir="5400000" sx="1000" sy="1000" algn="ctr" rotWithShape="0">
+                    <a:schemeClr val="bg1">
+                      <a:lumMod val="50000"/>
+                      <a:alpha val="10000"/>
+                    </a:schemeClr>
+                  </a:outerShdw>
+                </a:effectLst>
+              </a:rPr>
+              <a:t>to</a:t>
+            </a:r>
+            <a:r>
+              <a:rPr lang="de-DE" dirty="0">
+                <a:solidFill>
+                  <a:schemeClr val="bg2">
+                    <a:lumMod val="10000"/>
+                  </a:schemeClr>
+                </a:solidFill>
+                <a:effectLst>
+                  <a:outerShdw blurRad="50800" dist="50800" dir="5400000" sx="1000" sy="1000" algn="ctr" rotWithShape="0">
+                    <a:schemeClr val="bg1">
+                      <a:lumMod val="50000"/>
+                      <a:alpha val="10000"/>
+                    </a:schemeClr>
+                  </a:outerShdw>
+                </a:effectLst>
+              </a:rPr>
+              <a:t> </a:t>
+            </a:r>
+            <a:r>
+              <a:rPr lang="de-DE" b="1" dirty="0">
+                <a:solidFill>
+                  <a:schemeClr val="bg2">
+                    <a:lumMod val="10000"/>
+                  </a:schemeClr>
+                </a:solidFill>
+                <a:effectLst>
+                  <a:outerShdw blurRad="50800" dist="50800" dir="5400000" sx="1000" sy="1000" algn="ctr" rotWithShape="0">
+                    <a:schemeClr val="bg1">
+                      <a:lumMod val="50000"/>
+                      <a:alpha val="10000"/>
+                    </a:schemeClr>
+                  </a:outerShdw>
+                </a:effectLst>
+              </a:rPr>
+              <a:t>Surface</a:t>
+            </a:r>
+          </a:p>
+          <a:p>
+            <a:pPr marL="285750" indent="-285750">
+              <a:buFont typeface="Wingdings" panose="05000000000000000000" pitchFamily="2" charset="2"/>
+              <a:buChar char="§"/>
+            </a:pPr>
+            <a:r>
+              <a:rPr lang="de-DE" dirty="0" err="1">
+                <a:solidFill>
+                  <a:schemeClr val="bg2">
+                    <a:lumMod val="10000"/>
+                  </a:schemeClr>
+                </a:solidFill>
+                <a:effectLst>
+                  <a:outerShdw blurRad="50800" dist="50800" dir="5400000" sx="1000" sy="1000" algn="ctr" rotWithShape="0">
+                    <a:schemeClr val="bg1">
+                      <a:lumMod val="50000"/>
+                      <a:alpha val="10000"/>
+                    </a:schemeClr>
+                  </a:outerShdw>
+                </a:effectLst>
+              </a:rPr>
+              <a:t>Allow</a:t>
+            </a:r>
+            <a:r>
+              <a:rPr lang="de-DE" dirty="0">
+                <a:solidFill>
+                  <a:schemeClr val="bg2">
+                    <a:lumMod val="10000"/>
+                  </a:schemeClr>
+                </a:solidFill>
+                <a:effectLst>
+                  <a:outerShdw blurRad="50800" dist="50800" dir="5400000" sx="1000" sy="1000" algn="ctr" rotWithShape="0">
+                    <a:schemeClr val="bg1">
+                      <a:lumMod val="50000"/>
+                      <a:alpha val="10000"/>
+                    </a:schemeClr>
+                  </a:outerShdw>
+                </a:effectLst>
+              </a:rPr>
+              <a:t> </a:t>
+            </a:r>
+            <a:r>
+              <a:rPr lang="de-DE" b="1" dirty="0" err="1">
+                <a:solidFill>
+                  <a:schemeClr val="bg2">
+                    <a:lumMod val="10000"/>
+                  </a:schemeClr>
+                </a:solidFill>
+                <a:effectLst>
+                  <a:outerShdw blurRad="50800" dist="50800" dir="5400000" sx="1000" sy="1000" algn="ctr" rotWithShape="0">
+                    <a:schemeClr val="bg1">
+                      <a:lumMod val="50000"/>
+                      <a:alpha val="10000"/>
+                    </a:schemeClr>
+                  </a:outerShdw>
+                </a:effectLst>
+              </a:rPr>
+              <a:t>Intercollision</a:t>
+            </a:r>
+            <a:endParaRPr lang="de-DE" b="1" dirty="0">
+              <a:solidFill>
+                <a:schemeClr val="bg2">
+                  <a:lumMod val="10000"/>
+                </a:schemeClr>
+              </a:solidFill>
+              <a:effectLst>
+                <a:outerShdw blurRad="50800" dist="50800" dir="5400000" sx="1000" sy="1000" algn="ctr" rotWithShape="0">
+                  <a:schemeClr val="bg1">
+                    <a:lumMod val="50000"/>
+                    <a:alpha val="10000"/>
+                  </a:schemeClr>
+                </a:outerShdw>
+              </a:effectLst>
+            </a:endParaRPr>
+          </a:p>
+          <a:p>
+            <a:pPr marL="285750" indent="-285750">
+              <a:buFont typeface="Wingdings" panose="05000000000000000000" pitchFamily="2" charset="2"/>
+              <a:buChar char="§"/>
+            </a:pPr>
             <a:r>
               <a:rPr lang="de-DE" dirty="0" err="1">
                 <a:solidFill>
@@ -4275,69 +5246,10 @@
                   </a:outerShdw>
                 </a:effectLst>
               </a:rPr>
-              <a:t> Painting</a:t>
-            </a:r>
-          </a:p>
-        </p:txBody>
-      </p:sp>
-      <p:sp>
-        <p:nvSpPr>
-          <p:cNvPr id="63" name="Rechteck 62">
-            <a:extLst>
-              <a:ext uri="{FF2B5EF4-FFF2-40B4-BE49-F238E27FC236}">
-                <a16:creationId xmlns:a16="http://schemas.microsoft.com/office/drawing/2014/main" id="{5DF0C7A0-2BE8-4BA9-9E97-2D05CE2D277E}"/>
-              </a:ext>
-            </a:extLst>
-          </p:cNvPr>
-          <p:cNvSpPr/>
-          <p:nvPr/>
-        </p:nvSpPr>
-        <p:spPr>
-          <a:xfrm>
-            <a:off x="595142" y="1656817"/>
-            <a:ext cx="2130805" cy="271163"/>
-          </a:xfrm>
-          <a:prstGeom prst="rect">
-            <a:avLst/>
-          </a:prstGeom>
-          <a:solidFill>
-            <a:schemeClr val="bg1">
-              <a:alpha val="0"/>
-            </a:schemeClr>
-          </a:solidFill>
-          <a:ln>
-            <a:noFill/>
-          </a:ln>
-          <a:effectLst>
-            <a:outerShdw blurRad="50800" dist="38100" dir="2700000" algn="tl" rotWithShape="0">
-              <a:prstClr val="black">
-                <a:alpha val="40000"/>
-              </a:prstClr>
-            </a:outerShdw>
-          </a:effectLst>
-        </p:spPr>
-        <p:style>
-          <a:lnRef idx="2">
-            <a:schemeClr val="accent1">
-              <a:shade val="50000"/>
-            </a:schemeClr>
-          </a:lnRef>
-          <a:fillRef idx="1">
-            <a:schemeClr val="accent1"/>
-          </a:fillRef>
-          <a:effectRef idx="0">
-            <a:schemeClr val="accent1"/>
-          </a:effectRef>
-          <a:fontRef idx="minor">
-            <a:schemeClr val="lt1"/>
-          </a:fontRef>
-        </p:style>
-        <p:txBody>
-          <a:bodyPr rtlCol="0" anchor="ctr"/>
-          <a:lstStyle/>
-          <a:p>
-            <a:r>
-              <a:rPr lang="de-DE" dirty="0" err="1">
+              <a:t> </a:t>
+            </a:r>
+            <a:r>
+              <a:rPr lang="de-DE" b="1" dirty="0">
                 <a:solidFill>
                   <a:schemeClr val="bg2">
                     <a:lumMod val="10000"/>
@@ -4352,329 +5264,10 @@
                   </a:outerShdw>
                 </a:effectLst>
               </a:rPr>
-              <a:t>Brush</a:t>
-            </a:r>
-            <a:r>
-              <a:rPr lang="de-DE" dirty="0">
-                <a:solidFill>
-                  <a:schemeClr val="bg2">
-                    <a:lumMod val="10000"/>
-                  </a:schemeClr>
-                </a:solidFill>
-                <a:effectLst>
-                  <a:outerShdw blurRad="50800" dist="50800" dir="5400000" sx="1000" sy="1000" algn="ctr" rotWithShape="0">
-                    <a:schemeClr val="bg1">
-                      <a:lumMod val="50000"/>
-                      <a:alpha val="10000"/>
-                    </a:schemeClr>
-                  </a:outerShdw>
-                </a:effectLst>
-              </a:rPr>
-              <a:t> Size</a:t>
-            </a:r>
-          </a:p>
-        </p:txBody>
-      </p:sp>
-      <p:sp>
-        <p:nvSpPr>
-          <p:cNvPr id="64" name="Rechteck 63">
-            <a:extLst>
-              <a:ext uri="{FF2B5EF4-FFF2-40B4-BE49-F238E27FC236}">
-                <a16:creationId xmlns:a16="http://schemas.microsoft.com/office/drawing/2014/main" id="{1357F489-CDA6-4B2F-A0F5-F58C51411A2F}"/>
-              </a:ext>
-            </a:extLst>
-          </p:cNvPr>
-          <p:cNvSpPr/>
-          <p:nvPr/>
-        </p:nvSpPr>
-        <p:spPr>
-          <a:xfrm>
-            <a:off x="595142" y="2059144"/>
-            <a:ext cx="2130805" cy="271163"/>
-          </a:xfrm>
-          <a:prstGeom prst="rect">
-            <a:avLst/>
-          </a:prstGeom>
-          <a:solidFill>
-            <a:schemeClr val="bg1">
-              <a:alpha val="0"/>
-            </a:schemeClr>
-          </a:solidFill>
-          <a:ln>
-            <a:noFill/>
-          </a:ln>
-          <a:effectLst>
-            <a:outerShdw blurRad="50800" dist="38100" dir="2700000" algn="tl" rotWithShape="0">
-              <a:prstClr val="black">
-                <a:alpha val="40000"/>
-              </a:prstClr>
-            </a:outerShdw>
-          </a:effectLst>
-        </p:spPr>
-        <p:style>
-          <a:lnRef idx="2">
-            <a:schemeClr val="accent1">
-              <a:shade val="50000"/>
-            </a:schemeClr>
-          </a:lnRef>
-          <a:fillRef idx="1">
-            <a:schemeClr val="accent1"/>
-          </a:fillRef>
-          <a:effectRef idx="0">
-            <a:schemeClr val="accent1"/>
-          </a:effectRef>
-          <a:fontRef idx="minor">
-            <a:schemeClr val="lt1"/>
-          </a:fontRef>
-        </p:style>
-        <p:txBody>
-          <a:bodyPr rtlCol="0" anchor="ctr"/>
-          <a:lstStyle/>
-          <a:p>
-            <a:r>
-              <a:rPr lang="de-DE" dirty="0">
-                <a:solidFill>
-                  <a:schemeClr val="bg2">
-                    <a:lumMod val="10000"/>
-                  </a:schemeClr>
-                </a:solidFill>
-                <a:effectLst>
-                  <a:outerShdw blurRad="50800" dist="50800" dir="5400000" sx="1000" sy="1000" algn="ctr" rotWithShape="0">
-                    <a:schemeClr val="bg1">
-                      <a:lumMod val="50000"/>
-                      <a:alpha val="10000"/>
-                    </a:schemeClr>
-                  </a:outerShdw>
-                </a:effectLst>
-              </a:rPr>
-              <a:t>Offset </a:t>
-            </a:r>
-            <a:r>
-              <a:rPr lang="de-DE" dirty="0" err="1">
-                <a:solidFill>
-                  <a:schemeClr val="bg2">
-                    <a:lumMod val="10000"/>
-                  </a:schemeClr>
-                </a:solidFill>
-                <a:effectLst>
-                  <a:outerShdw blurRad="50800" dist="50800" dir="5400000" sx="1000" sy="1000" algn="ctr" rotWithShape="0">
-                    <a:schemeClr val="bg1">
-                      <a:lumMod val="50000"/>
-                      <a:alpha val="10000"/>
-                    </a:schemeClr>
-                  </a:outerShdw>
-                </a:effectLst>
-              </a:rPr>
-              <a:t>From</a:t>
-            </a:r>
-            <a:r>
-              <a:rPr lang="de-DE" dirty="0">
-                <a:solidFill>
-                  <a:schemeClr val="bg2">
-                    <a:lumMod val="10000"/>
-                  </a:schemeClr>
-                </a:solidFill>
-                <a:effectLst>
-                  <a:outerShdw blurRad="50800" dist="50800" dir="5400000" sx="1000" sy="1000" algn="ctr" rotWithShape="0">
-                    <a:schemeClr val="bg1">
-                      <a:lumMod val="50000"/>
-                      <a:alpha val="10000"/>
-                    </a:schemeClr>
-                  </a:outerShdw>
-                </a:effectLst>
-              </a:rPr>
-              <a:t> Pivot</a:t>
-            </a:r>
-          </a:p>
-        </p:txBody>
-      </p:sp>
-      <p:sp>
-        <p:nvSpPr>
-          <p:cNvPr id="65" name="Rechteck 64">
-            <a:extLst>
-              <a:ext uri="{FF2B5EF4-FFF2-40B4-BE49-F238E27FC236}">
-                <a16:creationId xmlns:a16="http://schemas.microsoft.com/office/drawing/2014/main" id="{1EED07DF-3838-415E-B90B-B20BFE1BBA3C}"/>
-              </a:ext>
-            </a:extLst>
-          </p:cNvPr>
-          <p:cNvSpPr/>
-          <p:nvPr/>
-        </p:nvSpPr>
-        <p:spPr>
-          <a:xfrm>
-            <a:off x="595142" y="2462063"/>
-            <a:ext cx="2130805" cy="271163"/>
-          </a:xfrm>
-          <a:prstGeom prst="rect">
-            <a:avLst/>
-          </a:prstGeom>
-          <a:solidFill>
-            <a:schemeClr val="bg1">
-              <a:alpha val="0"/>
-            </a:schemeClr>
-          </a:solidFill>
-          <a:ln>
-            <a:noFill/>
-          </a:ln>
-          <a:effectLst>
-            <a:outerShdw blurRad="50800" dist="38100" dir="2700000" algn="tl" rotWithShape="0">
-              <a:prstClr val="black">
-                <a:alpha val="40000"/>
-              </a:prstClr>
-            </a:outerShdw>
-          </a:effectLst>
-        </p:spPr>
-        <p:style>
-          <a:lnRef idx="2">
-            <a:schemeClr val="accent1">
-              <a:shade val="50000"/>
-            </a:schemeClr>
-          </a:lnRef>
-          <a:fillRef idx="1">
-            <a:schemeClr val="accent1"/>
-          </a:fillRef>
-          <a:effectRef idx="0">
-            <a:schemeClr val="accent1"/>
-          </a:effectRef>
-          <a:fontRef idx="minor">
-            <a:schemeClr val="lt1"/>
-          </a:fontRef>
-        </p:style>
-        <p:txBody>
-          <a:bodyPr rtlCol="0" anchor="ctr"/>
-          <a:lstStyle/>
-          <a:p>
-            <a:r>
-              <a:rPr lang="de-DE" dirty="0" err="1">
-                <a:solidFill>
-                  <a:schemeClr val="bg2">
-                    <a:lumMod val="10000"/>
-                  </a:schemeClr>
-                </a:solidFill>
-                <a:effectLst>
-                  <a:outerShdw blurRad="50800" dist="50800" dir="5400000" sx="1000" sy="1000" algn="ctr" rotWithShape="0">
-                    <a:schemeClr val="bg1">
-                      <a:lumMod val="50000"/>
-                      <a:alpha val="10000"/>
-                    </a:schemeClr>
-                  </a:outerShdw>
-                </a:effectLst>
-              </a:rPr>
-              <a:t>Rotational</a:t>
-            </a:r>
-            <a:r>
-              <a:rPr lang="de-DE" dirty="0">
-                <a:solidFill>
-                  <a:schemeClr val="bg2">
-                    <a:lumMod val="10000"/>
-                  </a:schemeClr>
-                </a:solidFill>
-                <a:effectLst>
-                  <a:outerShdw blurRad="50800" dist="50800" dir="5400000" sx="1000" sy="1000" algn="ctr" rotWithShape="0">
-                    <a:schemeClr val="bg1">
-                      <a:lumMod val="50000"/>
-                      <a:alpha val="10000"/>
-                    </a:schemeClr>
-                  </a:outerShdw>
-                </a:effectLst>
-              </a:rPr>
-              <a:t> Offset</a:t>
-            </a:r>
-          </a:p>
-        </p:txBody>
-      </p:sp>
-      <p:sp>
-        <p:nvSpPr>
-          <p:cNvPr id="66" name="Rechteck 65">
-            <a:extLst>
-              <a:ext uri="{FF2B5EF4-FFF2-40B4-BE49-F238E27FC236}">
-                <a16:creationId xmlns:a16="http://schemas.microsoft.com/office/drawing/2014/main" id="{C91E571C-03CA-4393-9B9B-82ACD4A2196E}"/>
-              </a:ext>
-            </a:extLst>
-          </p:cNvPr>
-          <p:cNvSpPr/>
-          <p:nvPr/>
-        </p:nvSpPr>
-        <p:spPr>
-          <a:xfrm>
-            <a:off x="607060" y="4891370"/>
-            <a:ext cx="2130805" cy="271163"/>
-          </a:xfrm>
-          <a:prstGeom prst="rect">
-            <a:avLst/>
-          </a:prstGeom>
-          <a:solidFill>
-            <a:schemeClr val="bg1">
-              <a:alpha val="0"/>
-            </a:schemeClr>
-          </a:solidFill>
-          <a:ln>
-            <a:noFill/>
-          </a:ln>
-          <a:effectLst>
-            <a:outerShdw blurRad="50800" dist="38100" dir="2700000" algn="tl" rotWithShape="0">
-              <a:prstClr val="black">
-                <a:alpha val="40000"/>
-              </a:prstClr>
-            </a:outerShdw>
-          </a:effectLst>
-        </p:spPr>
-        <p:style>
-          <a:lnRef idx="2">
-            <a:schemeClr val="accent1">
-              <a:shade val="50000"/>
-            </a:schemeClr>
-          </a:lnRef>
-          <a:fillRef idx="1">
-            <a:schemeClr val="accent1"/>
-          </a:fillRef>
-          <a:effectRef idx="0">
-            <a:schemeClr val="accent1"/>
-          </a:effectRef>
-          <a:fontRef idx="minor">
-            <a:schemeClr val="lt1"/>
-          </a:fontRef>
-        </p:style>
-        <p:txBody>
-          <a:bodyPr rtlCol="0" anchor="ctr"/>
-          <a:lstStyle/>
-          <a:p>
-            <a:r>
-              <a:rPr lang="de-DE" dirty="0">
-                <a:solidFill>
-                  <a:schemeClr val="bg2">
-                    <a:lumMod val="10000"/>
-                  </a:schemeClr>
-                </a:solidFill>
-                <a:effectLst>
-                  <a:outerShdw blurRad="50800" dist="50800" dir="5400000" sx="1000" sy="1000" algn="ctr" rotWithShape="0">
-                    <a:schemeClr val="bg1">
-                      <a:lumMod val="50000"/>
-                      <a:alpha val="10000"/>
-                    </a:schemeClr>
-                  </a:outerShdw>
-                </a:effectLst>
-              </a:rPr>
-              <a:t>Min and Max </a:t>
-            </a:r>
-            <a:r>
-              <a:rPr lang="de-DE" dirty="0" err="1">
-                <a:solidFill>
-                  <a:schemeClr val="bg2">
-                    <a:lumMod val="10000"/>
-                  </a:schemeClr>
-                </a:solidFill>
-                <a:effectLst>
-                  <a:outerShdw blurRad="50800" dist="50800" dir="5400000" sx="1000" sy="1000" algn="ctr" rotWithShape="0">
-                    <a:schemeClr val="bg1">
-                      <a:lumMod val="50000"/>
-                      <a:alpha val="10000"/>
-                    </a:schemeClr>
-                  </a:outerShdw>
-                </a:effectLst>
-              </a:rPr>
-              <a:t>Scale</a:t>
-            </a:r>
+              <a:t>Painting</a:t>
+            </a:r>
+          </a:p>
+          <a:p>
             <a:endParaRPr lang="de-DE" dirty="0">
               <a:solidFill>
                 <a:schemeClr val="bg2">
@@ -4691,344 +5284,7 @@
               </a:effectLst>
             </a:endParaRPr>
           </a:p>
-        </p:txBody>
-      </p:sp>
-      <p:sp>
-        <p:nvSpPr>
-          <p:cNvPr id="67" name="Rechteck 66">
-            <a:extLst>
-              <a:ext uri="{FF2B5EF4-FFF2-40B4-BE49-F238E27FC236}">
-                <a16:creationId xmlns:a16="http://schemas.microsoft.com/office/drawing/2014/main" id="{72FCCF9B-D0F8-449C-BEC9-98E1AB7E36EA}"/>
-              </a:ext>
-            </a:extLst>
-          </p:cNvPr>
-          <p:cNvSpPr/>
-          <p:nvPr/>
-        </p:nvSpPr>
-        <p:spPr>
-          <a:xfrm>
-            <a:off x="607062" y="3266718"/>
-            <a:ext cx="2130805" cy="271163"/>
-          </a:xfrm>
-          <a:prstGeom prst="rect">
-            <a:avLst/>
-          </a:prstGeom>
-          <a:solidFill>
-            <a:schemeClr val="bg1">
-              <a:alpha val="0"/>
-            </a:schemeClr>
-          </a:solidFill>
-          <a:ln>
-            <a:noFill/>
-          </a:ln>
-          <a:effectLst>
-            <a:outerShdw blurRad="50800" dist="38100" dir="2700000" algn="tl" rotWithShape="0">
-              <a:prstClr val="black">
-                <a:alpha val="40000"/>
-              </a:prstClr>
-            </a:outerShdw>
-          </a:effectLst>
-        </p:spPr>
-        <p:style>
-          <a:lnRef idx="2">
-            <a:schemeClr val="accent1">
-              <a:shade val="50000"/>
-            </a:schemeClr>
-          </a:lnRef>
-          <a:fillRef idx="1">
-            <a:schemeClr val="accent1"/>
-          </a:fillRef>
-          <a:effectRef idx="0">
-            <a:schemeClr val="accent1"/>
-          </a:effectRef>
-          <a:fontRef idx="minor">
-            <a:schemeClr val="lt1"/>
-          </a:fontRef>
-        </p:style>
-        <p:txBody>
-          <a:bodyPr rtlCol="0" anchor="ctr"/>
-          <a:lstStyle/>
-          <a:p>
-            <a:r>
-              <a:rPr lang="de-DE" dirty="0" err="1">
-                <a:solidFill>
-                  <a:schemeClr val="bg2">
-                    <a:lumMod val="10000"/>
-                  </a:schemeClr>
-                </a:solidFill>
-                <a:effectLst>
-                  <a:outerShdw blurRad="50800" dist="50800" dir="5400000" sx="1000" sy="1000" algn="ctr" rotWithShape="0">
-                    <a:schemeClr val="bg1">
-                      <a:lumMod val="50000"/>
-                      <a:alpha val="10000"/>
-                    </a:schemeClr>
-                  </a:outerShdw>
-                </a:effectLst>
-              </a:rPr>
-              <a:t>Align</a:t>
-            </a:r>
-            <a:r>
-              <a:rPr lang="de-DE" dirty="0">
-                <a:solidFill>
-                  <a:schemeClr val="bg2">
-                    <a:lumMod val="10000"/>
-                  </a:schemeClr>
-                </a:solidFill>
-                <a:effectLst>
-                  <a:outerShdw blurRad="50800" dist="50800" dir="5400000" sx="1000" sy="1000" algn="ctr" rotWithShape="0">
-                    <a:schemeClr val="bg1">
-                      <a:lumMod val="50000"/>
-                      <a:alpha val="10000"/>
-                    </a:schemeClr>
-                  </a:outerShdw>
-                </a:effectLst>
-              </a:rPr>
-              <a:t> </a:t>
-            </a:r>
-            <a:r>
-              <a:rPr lang="de-DE" dirty="0" err="1">
-                <a:solidFill>
-                  <a:schemeClr val="bg2">
-                    <a:lumMod val="10000"/>
-                  </a:schemeClr>
-                </a:solidFill>
-                <a:effectLst>
-                  <a:outerShdw blurRad="50800" dist="50800" dir="5400000" sx="1000" sy="1000" algn="ctr" rotWithShape="0">
-                    <a:schemeClr val="bg1">
-                      <a:lumMod val="50000"/>
-                      <a:alpha val="10000"/>
-                    </a:schemeClr>
-                  </a:outerShdw>
-                </a:effectLst>
-              </a:rPr>
-              <a:t>to</a:t>
-            </a:r>
-            <a:r>
-              <a:rPr lang="de-DE" dirty="0">
-                <a:solidFill>
-                  <a:schemeClr val="bg2">
-                    <a:lumMod val="10000"/>
-                  </a:schemeClr>
-                </a:solidFill>
-                <a:effectLst>
-                  <a:outerShdw blurRad="50800" dist="50800" dir="5400000" sx="1000" sy="1000" algn="ctr" rotWithShape="0">
-                    <a:schemeClr val="bg1">
-                      <a:lumMod val="50000"/>
-                      <a:alpha val="10000"/>
-                    </a:schemeClr>
-                  </a:outerShdw>
-                </a:effectLst>
-              </a:rPr>
-              <a:t> Surface</a:t>
-            </a:r>
-          </a:p>
-        </p:txBody>
-      </p:sp>
-      <p:sp>
-        <p:nvSpPr>
-          <p:cNvPr id="68" name="Rechteck 67">
-            <a:extLst>
-              <a:ext uri="{FF2B5EF4-FFF2-40B4-BE49-F238E27FC236}">
-                <a16:creationId xmlns:a16="http://schemas.microsoft.com/office/drawing/2014/main" id="{EE9757CF-F28D-47E6-B24C-2C7CE25B9F9A}"/>
-              </a:ext>
-            </a:extLst>
-          </p:cNvPr>
-          <p:cNvSpPr/>
-          <p:nvPr/>
-        </p:nvSpPr>
-        <p:spPr>
-          <a:xfrm>
-            <a:off x="595142" y="2864982"/>
-            <a:ext cx="2130805" cy="271163"/>
-          </a:xfrm>
-          <a:prstGeom prst="rect">
-            <a:avLst/>
-          </a:prstGeom>
-          <a:solidFill>
-            <a:schemeClr val="bg1">
-              <a:alpha val="0"/>
-            </a:schemeClr>
-          </a:solidFill>
-          <a:ln>
-            <a:noFill/>
-          </a:ln>
-          <a:effectLst>
-            <a:outerShdw blurRad="50800" dist="38100" dir="2700000" algn="tl" rotWithShape="0">
-              <a:prstClr val="black">
-                <a:alpha val="40000"/>
-              </a:prstClr>
-            </a:outerShdw>
-          </a:effectLst>
-        </p:spPr>
-        <p:style>
-          <a:lnRef idx="2">
-            <a:schemeClr val="accent1">
-              <a:shade val="50000"/>
-            </a:schemeClr>
-          </a:lnRef>
-          <a:fillRef idx="1">
-            <a:schemeClr val="accent1"/>
-          </a:fillRef>
-          <a:effectRef idx="0">
-            <a:schemeClr val="accent1"/>
-          </a:effectRef>
-          <a:fontRef idx="minor">
-            <a:schemeClr val="lt1"/>
-          </a:fontRef>
-        </p:style>
-        <p:txBody>
-          <a:bodyPr rtlCol="0" anchor="ctr"/>
-          <a:lstStyle/>
-          <a:p>
-            <a:r>
-              <a:rPr lang="de-DE" dirty="0" err="1">
-                <a:solidFill>
-                  <a:schemeClr val="bg2">
-                    <a:lumMod val="10000"/>
-                  </a:schemeClr>
-                </a:solidFill>
-                <a:effectLst>
-                  <a:outerShdw blurRad="50800" dist="50800" dir="5400000" sx="1000" sy="1000" algn="ctr" rotWithShape="0">
-                    <a:schemeClr val="bg1">
-                      <a:lumMod val="50000"/>
-                      <a:alpha val="10000"/>
-                    </a:schemeClr>
-                  </a:outerShdw>
-                </a:effectLst>
-              </a:rPr>
-              <a:t>Randomize</a:t>
-            </a:r>
-            <a:r>
-              <a:rPr lang="de-DE" dirty="0">
-                <a:solidFill>
-                  <a:schemeClr val="bg2">
-                    <a:lumMod val="10000"/>
-                  </a:schemeClr>
-                </a:solidFill>
-                <a:effectLst>
-                  <a:outerShdw blurRad="50800" dist="50800" dir="5400000" sx="1000" sy="1000" algn="ctr" rotWithShape="0">
-                    <a:schemeClr val="bg1">
-                      <a:lumMod val="50000"/>
-                      <a:alpha val="10000"/>
-                    </a:schemeClr>
-                  </a:outerShdw>
-                </a:effectLst>
-              </a:rPr>
-              <a:t> Rotation</a:t>
-            </a:r>
-          </a:p>
-        </p:txBody>
-      </p:sp>
-      <p:sp>
-        <p:nvSpPr>
-          <p:cNvPr id="69" name="Rechteck 68">
-            <a:extLst>
-              <a:ext uri="{FF2B5EF4-FFF2-40B4-BE49-F238E27FC236}">
-                <a16:creationId xmlns:a16="http://schemas.microsoft.com/office/drawing/2014/main" id="{1F5AD25B-E44F-4E5F-9285-B606C0EEF64B}"/>
-              </a:ext>
-            </a:extLst>
-          </p:cNvPr>
-          <p:cNvSpPr/>
-          <p:nvPr/>
-        </p:nvSpPr>
-        <p:spPr>
-          <a:xfrm>
-            <a:off x="607062" y="3674282"/>
-            <a:ext cx="2130805" cy="271163"/>
-          </a:xfrm>
-          <a:prstGeom prst="rect">
-            <a:avLst/>
-          </a:prstGeom>
-          <a:solidFill>
-            <a:schemeClr val="bg1">
-              <a:alpha val="0"/>
-            </a:schemeClr>
-          </a:solidFill>
-          <a:ln>
-            <a:noFill/>
-          </a:ln>
-          <a:effectLst>
-            <a:outerShdw blurRad="50800" dist="38100" dir="2700000" algn="tl" rotWithShape="0">
-              <a:prstClr val="black">
-                <a:alpha val="40000"/>
-              </a:prstClr>
-            </a:outerShdw>
-          </a:effectLst>
-        </p:spPr>
-        <p:style>
-          <a:lnRef idx="2">
-            <a:schemeClr val="accent1">
-              <a:shade val="50000"/>
-            </a:schemeClr>
-          </a:lnRef>
-          <a:fillRef idx="1">
-            <a:schemeClr val="accent1"/>
-          </a:fillRef>
-          <a:effectRef idx="0">
-            <a:schemeClr val="accent1"/>
-          </a:effectRef>
-          <a:fontRef idx="minor">
-            <a:schemeClr val="lt1"/>
-          </a:fontRef>
-        </p:style>
-        <p:txBody>
-          <a:bodyPr rtlCol="0" anchor="ctr"/>
-          <a:lstStyle/>
-          <a:p>
-            <a:r>
-              <a:rPr lang="de-DE" dirty="0" err="1">
-                <a:solidFill>
-                  <a:schemeClr val="bg2">
-                    <a:lumMod val="10000"/>
-                  </a:schemeClr>
-                </a:solidFill>
-                <a:effectLst>
-                  <a:outerShdw blurRad="50800" dist="50800" dir="5400000" sx="1000" sy="1000" algn="ctr" rotWithShape="0">
-                    <a:schemeClr val="bg1">
-                      <a:lumMod val="50000"/>
-                      <a:alpha val="10000"/>
-                    </a:schemeClr>
-                  </a:outerShdw>
-                </a:effectLst>
-              </a:rPr>
-              <a:t>Allow</a:t>
-            </a:r>
-            <a:r>
-              <a:rPr lang="de-DE" dirty="0">
-                <a:solidFill>
-                  <a:schemeClr val="bg2">
-                    <a:lumMod val="10000"/>
-                  </a:schemeClr>
-                </a:solidFill>
-                <a:effectLst>
-                  <a:outerShdw blurRad="50800" dist="50800" dir="5400000" sx="1000" sy="1000" algn="ctr" rotWithShape="0">
-                    <a:schemeClr val="bg1">
-                      <a:lumMod val="50000"/>
-                      <a:alpha val="10000"/>
-                    </a:schemeClr>
-                  </a:outerShdw>
-                </a:effectLst>
-              </a:rPr>
-              <a:t> </a:t>
-            </a:r>
-            <a:r>
-              <a:rPr lang="de-DE" dirty="0" err="1">
-                <a:solidFill>
-                  <a:schemeClr val="bg2">
-                    <a:lumMod val="10000"/>
-                  </a:schemeClr>
-                </a:solidFill>
-                <a:effectLst>
-                  <a:outerShdw blurRad="50800" dist="50800" dir="5400000" sx="1000" sy="1000" algn="ctr" rotWithShape="0">
-                    <a:schemeClr val="bg1">
-                      <a:lumMod val="50000"/>
-                      <a:alpha val="10000"/>
-                    </a:schemeClr>
-                  </a:outerShdw>
-                </a:effectLst>
-              </a:rPr>
-              <a:t>Intercollision</a:t>
-            </a:r>
+          <a:p>
             <a:endParaRPr lang="de-DE" dirty="0">
               <a:solidFill>
                 <a:schemeClr val="bg2">
@@ -5045,136 +5301,7 @@
               </a:effectLst>
             </a:endParaRPr>
           </a:p>
-        </p:txBody>
-      </p:sp>
-      <p:sp>
-        <p:nvSpPr>
-          <p:cNvPr id="70" name="Rechteck 69">
-            <a:extLst>
-              <a:ext uri="{FF2B5EF4-FFF2-40B4-BE49-F238E27FC236}">
-                <a16:creationId xmlns:a16="http://schemas.microsoft.com/office/drawing/2014/main" id="{124BD13E-33B7-475C-9CF1-F55BA4742FD3}"/>
-              </a:ext>
-            </a:extLst>
-          </p:cNvPr>
-          <p:cNvSpPr/>
-          <p:nvPr/>
-        </p:nvSpPr>
-        <p:spPr>
-          <a:xfrm>
-            <a:off x="607061" y="4081765"/>
-            <a:ext cx="2130805" cy="271163"/>
-          </a:xfrm>
-          <a:prstGeom prst="rect">
-            <a:avLst/>
-          </a:prstGeom>
-          <a:solidFill>
-            <a:schemeClr val="bg1">
-              <a:alpha val="0"/>
-            </a:schemeClr>
-          </a:solidFill>
-          <a:ln>
-            <a:noFill/>
-          </a:ln>
-          <a:effectLst>
-            <a:outerShdw blurRad="50800" dist="38100" dir="2700000" algn="tl" rotWithShape="0">
-              <a:prstClr val="black">
-                <a:alpha val="40000"/>
-              </a:prstClr>
-            </a:outerShdw>
-          </a:effectLst>
-        </p:spPr>
-        <p:style>
-          <a:lnRef idx="2">
-            <a:schemeClr val="accent1">
-              <a:shade val="50000"/>
-            </a:schemeClr>
-          </a:lnRef>
-          <a:fillRef idx="1">
-            <a:schemeClr val="accent1"/>
-          </a:fillRef>
-          <a:effectRef idx="0">
-            <a:schemeClr val="accent1"/>
-          </a:effectRef>
-          <a:fontRef idx="minor">
-            <a:schemeClr val="lt1"/>
-          </a:fontRef>
-        </p:style>
-        <p:txBody>
-          <a:bodyPr rtlCol="0" anchor="ctr"/>
-          <a:lstStyle/>
-          <a:p>
-            <a:r>
-              <a:rPr lang="de-DE" dirty="0">
-                <a:solidFill>
-                  <a:schemeClr val="bg2">
-                    <a:lumMod val="10000"/>
-                  </a:schemeClr>
-                </a:solidFill>
-                <a:effectLst>
-                  <a:outerShdw blurRad="50800" dist="50800" dir="5400000" sx="1000" sy="1000" algn="ctr" rotWithShape="0">
-                    <a:schemeClr val="bg1">
-                      <a:lumMod val="50000"/>
-                      <a:alpha val="10000"/>
-                    </a:schemeClr>
-                  </a:outerShdw>
-                </a:effectLst>
-              </a:rPr>
-              <a:t>Filter </a:t>
-            </a:r>
-            <a:r>
-              <a:rPr lang="de-DE" dirty="0" err="1">
-                <a:solidFill>
-                  <a:schemeClr val="bg2">
-                    <a:lumMod val="10000"/>
-                  </a:schemeClr>
-                </a:solidFill>
-                <a:effectLst>
-                  <a:outerShdw blurRad="50800" dist="50800" dir="5400000" sx="1000" sy="1000" algn="ctr" rotWithShape="0">
-                    <a:schemeClr val="bg1">
-                      <a:lumMod val="50000"/>
-                      <a:alpha val="10000"/>
-                    </a:schemeClr>
-                  </a:outerShdw>
-                </a:effectLst>
-              </a:rPr>
-              <a:t>by</a:t>
-            </a:r>
-            <a:r>
-              <a:rPr lang="de-DE" dirty="0">
-                <a:solidFill>
-                  <a:schemeClr val="bg2">
-                    <a:lumMod val="10000"/>
-                  </a:schemeClr>
-                </a:solidFill>
-                <a:effectLst>
-                  <a:outerShdw blurRad="50800" dist="50800" dir="5400000" sx="1000" sy="1000" algn="ctr" rotWithShape="0">
-                    <a:schemeClr val="bg1">
-                      <a:lumMod val="50000"/>
-                      <a:alpha val="10000"/>
-                    </a:schemeClr>
-                  </a:outerShdw>
-                </a:effectLst>
-              </a:rPr>
-              <a:t> </a:t>
-            </a:r>
-            <a:r>
-              <a:rPr lang="de-DE" dirty="0" err="1">
-                <a:solidFill>
-                  <a:schemeClr val="bg2">
-                    <a:lumMod val="10000"/>
-                  </a:schemeClr>
-                </a:solidFill>
-                <a:effectLst>
-                  <a:outerShdw blurRad="50800" dist="50800" dir="5400000" sx="1000" sy="1000" algn="ctr" rotWithShape="0">
-                    <a:schemeClr val="bg1">
-                      <a:lumMod val="50000"/>
-                      <a:alpha val="10000"/>
-                    </a:schemeClr>
-                  </a:outerShdw>
-                </a:effectLst>
-              </a:rPr>
-              <a:t>Slope</a:t>
-            </a:r>
+          <a:p>
             <a:endParaRPr lang="de-DE" dirty="0">
               <a:solidFill>
                 <a:schemeClr val="bg2">
@@ -5191,36 +5318,110 @@
               </a:effectLst>
             </a:endParaRPr>
           </a:p>
+          <a:p>
+            <a:endParaRPr lang="de-DE" dirty="0">
+              <a:solidFill>
+                <a:schemeClr val="bg2">
+                  <a:lumMod val="10000"/>
+                </a:schemeClr>
+              </a:solidFill>
+              <a:effectLst>
+                <a:outerShdw blurRad="50800" dist="50800" dir="5400000" sx="1000" sy="1000" algn="ctr" rotWithShape="0">
+                  <a:schemeClr val="bg1">
+                    <a:lumMod val="50000"/>
+                    <a:alpha val="10000"/>
+                  </a:schemeClr>
+                </a:outerShdw>
+              </a:effectLst>
+            </a:endParaRPr>
+          </a:p>
         </p:txBody>
       </p:sp>
-      <p:sp>
-        <p:nvSpPr>
-          <p:cNvPr id="71" name="Rechteck 70">
-            <a:extLst>
-              <a:ext uri="{FF2B5EF4-FFF2-40B4-BE49-F238E27FC236}">
-                <a16:creationId xmlns:a16="http://schemas.microsoft.com/office/drawing/2014/main" id="{4E187B48-7712-4066-B73F-41D148FF1D14}"/>
-              </a:ext>
-            </a:extLst>
-          </p:cNvPr>
-          <p:cNvSpPr/>
+    </p:spTree>
+    <p:extLst>
+      <p:ext uri="{BB962C8B-B14F-4D97-AF65-F5344CB8AC3E}">
+        <p14:creationId xmlns:p14="http://schemas.microsoft.com/office/powerpoint/2010/main" val="912826963"/>
+      </p:ext>
+    </p:extLst>
+  </p:cSld>
+  <p:clrMapOvr>
+    <a:masterClrMapping/>
+  </p:clrMapOvr>
+</p:sld>
+</file>
+
+<file path=ppt/slides/slide3.xml><?xml version="1.0" encoding="utf-8"?>
+<p:sld xmlns:a="http://schemas.openxmlformats.org/drawingml/2006/main" xmlns:r="http://schemas.openxmlformats.org/officeDocument/2006/relationships" xmlns:p="http://schemas.openxmlformats.org/presentationml/2006/main">
+  <p:cSld>
+    <p:spTree>
+      <p:nvGrpSpPr>
+        <p:cNvPr id="1" name=""/>
+        <p:cNvGrpSpPr/>
+        <p:nvPr/>
+      </p:nvGrpSpPr>
+      <p:grpSpPr>
+        <a:xfrm>
+          <a:off x="0" y="0"/>
+          <a:ext cx="0" cy="0"/>
+          <a:chOff x="0" y="0"/>
+          <a:chExt cx="0" cy="0"/>
+        </a:xfrm>
+      </p:grpSpPr>
+      <p:pic>
+        <p:nvPicPr>
+          <p:cNvPr id="4" name="Grafik 3" descr="Ein Bild, das Screenshot enthält.&#10;&#10;Mit sehr hoher Zuverlässigkeit generierte Beschreibung">
+            <a:extLst>
+              <a:ext uri="{FF2B5EF4-FFF2-40B4-BE49-F238E27FC236}">
+                <a16:creationId xmlns:a16="http://schemas.microsoft.com/office/drawing/2014/main" id="{3B8948E2-F40F-4ACD-8747-839CC7E74C71}"/>
+              </a:ext>
+            </a:extLst>
+          </p:cNvPr>
+          <p:cNvPicPr>
+            <a:picLocks noChangeAspect="1"/>
+          </p:cNvPicPr>
           <p:nvPr/>
-        </p:nvSpPr>
+        </p:nvPicPr>
+        <p:blipFill>
+          <a:blip r:embed="rId2">
+            <a:extLst>
+              <a:ext uri="{28A0092B-C50C-407E-A947-70E740481C1C}">
+                <a14:useLocalDpi xmlns:a14="http://schemas.microsoft.com/office/drawing/2010/main" val="0"/>
+              </a:ext>
+            </a:extLst>
+          </a:blip>
+          <a:stretch>
+            <a:fillRect/>
+          </a:stretch>
+        </p:blipFill>
         <p:spPr>
           <a:xfrm>
-            <a:off x="607060" y="4489248"/>
-            <a:ext cx="2130805" cy="271163"/>
+            <a:off x="1863774" y="0"/>
+            <a:ext cx="8464452" cy="6858000"/>
           </a:xfrm>
           <a:prstGeom prst="rect">
             <a:avLst/>
           </a:prstGeom>
-          <a:solidFill>
-            <a:schemeClr val="bg1">
-              <a:alpha val="0"/>
-            </a:schemeClr>
-          </a:solidFill>
-          <a:ln>
-            <a:noFill/>
-          </a:ln>
+        </p:spPr>
+      </p:pic>
+      <p:grpSp>
+        <p:nvGrpSpPr>
+          <p:cNvPr id="16" name="Gruppieren 15">
+            <a:extLst>
+              <a:ext uri="{FF2B5EF4-FFF2-40B4-BE49-F238E27FC236}">
+                <a16:creationId xmlns:a16="http://schemas.microsoft.com/office/drawing/2014/main" id="{CD283649-7ECB-4AF9-8568-FB9ECCF755DF}"/>
+              </a:ext>
+            </a:extLst>
+          </p:cNvPr>
+          <p:cNvGrpSpPr/>
+          <p:nvPr/>
+        </p:nvGrpSpPr>
+        <p:grpSpPr>
+          <a:xfrm>
+            <a:off x="-6568660" y="5070784"/>
+            <a:ext cx="18605963" cy="807447"/>
+            <a:chOff x="1863774" y="6050553"/>
+            <a:chExt cx="7537937" cy="807447"/>
+          </a:xfrm>
           <a:effectLst>
             <a:outerShdw blurRad="50800" dist="38100" dir="2700000" algn="tl" rotWithShape="0">
               <a:prstClr val="black">
@@ -5228,112 +5429,224 @@
               </a:prstClr>
             </a:outerShdw>
           </a:effectLst>
-        </p:spPr>
-        <p:style>
-          <a:lnRef idx="2">
-            <a:schemeClr val="accent1">
-              <a:shade val="50000"/>
-            </a:schemeClr>
-          </a:lnRef>
-          <a:fillRef idx="1">
-            <a:schemeClr val="accent1"/>
-          </a:fillRef>
-          <a:effectRef idx="0">
-            <a:schemeClr val="accent1"/>
-          </a:effectRef>
-          <a:fontRef idx="minor">
-            <a:schemeClr val="lt1"/>
-          </a:fontRef>
-        </p:style>
-        <p:txBody>
-          <a:bodyPr rtlCol="0" anchor="ctr"/>
-          <a:lstStyle/>
-          <a:p>
-            <a:r>
-              <a:rPr lang="de-DE" dirty="0">
-                <a:solidFill>
-                  <a:schemeClr val="bg2">
-                    <a:lumMod val="10000"/>
-                  </a:schemeClr>
-                </a:solidFill>
-                <a:effectLst>
-                  <a:outerShdw blurRad="50800" dist="50800" dir="5400000" sx="1000" sy="1000" algn="ctr" rotWithShape="0">
-                    <a:schemeClr val="bg1">
-                      <a:lumMod val="50000"/>
-                      <a:alpha val="10000"/>
-                    </a:schemeClr>
-                  </a:outerShdw>
-                </a:effectLst>
-              </a:rPr>
-              <a:t>Filter </a:t>
-            </a:r>
-            <a:r>
-              <a:rPr lang="de-DE" dirty="0" err="1">
-                <a:solidFill>
-                  <a:schemeClr val="bg2">
-                    <a:lumMod val="10000"/>
-                  </a:schemeClr>
-                </a:solidFill>
-                <a:effectLst>
-                  <a:outerShdw blurRad="50800" dist="50800" dir="5400000" sx="1000" sy="1000" algn="ctr" rotWithShape="0">
-                    <a:schemeClr val="bg1">
-                      <a:lumMod val="50000"/>
-                      <a:alpha val="10000"/>
-                    </a:schemeClr>
-                  </a:outerShdw>
-                </a:effectLst>
-              </a:rPr>
-              <a:t>by</a:t>
-            </a:r>
-            <a:r>
-              <a:rPr lang="de-DE" dirty="0">
-                <a:solidFill>
-                  <a:schemeClr val="bg2">
-                    <a:lumMod val="10000"/>
-                  </a:schemeClr>
-                </a:solidFill>
-                <a:effectLst>
-                  <a:outerShdw blurRad="50800" dist="50800" dir="5400000" sx="1000" sy="1000" algn="ctr" rotWithShape="0">
-                    <a:schemeClr val="bg1">
-                      <a:lumMod val="50000"/>
-                      <a:alpha val="10000"/>
-                    </a:schemeClr>
-                  </a:outerShdw>
-                </a:effectLst>
-              </a:rPr>
-              <a:t> Layer</a:t>
-            </a:r>
-          </a:p>
-        </p:txBody>
-      </p:sp>
-      <p:sp>
-        <p:nvSpPr>
-          <p:cNvPr id="72" name="Rechteck 71">
-            <a:extLst>
-              <a:ext uri="{FF2B5EF4-FFF2-40B4-BE49-F238E27FC236}">
-                <a16:creationId xmlns:a16="http://schemas.microsoft.com/office/drawing/2014/main" id="{DC113D97-9D70-404C-9A5F-8260B96C60B4}"/>
-              </a:ext>
-            </a:extLst>
-          </p:cNvPr>
-          <p:cNvSpPr/>
+        </p:grpSpPr>
+        <p:sp>
+          <p:nvSpPr>
+            <p:cNvPr id="13" name="Rechteck 12">
+              <a:extLst>
+                <a:ext uri="{FF2B5EF4-FFF2-40B4-BE49-F238E27FC236}">
+                  <a16:creationId xmlns:a16="http://schemas.microsoft.com/office/drawing/2014/main" id="{6419E41E-BD69-42C6-9620-31B21472B185}"/>
+                </a:ext>
+              </a:extLst>
+            </p:cNvPr>
+            <p:cNvSpPr/>
+            <p:nvPr/>
+          </p:nvSpPr>
+          <p:spPr>
+            <a:xfrm>
+              <a:off x="1863774" y="6050553"/>
+              <a:ext cx="7537937" cy="807447"/>
+            </a:xfrm>
+            <a:prstGeom prst="rect">
+              <a:avLst/>
+            </a:prstGeom>
+            <a:solidFill>
+              <a:schemeClr val="bg1"/>
+            </a:solidFill>
+            <a:ln>
+              <a:solidFill>
+                <a:schemeClr val="bg1"/>
+              </a:solidFill>
+            </a:ln>
+          </p:spPr>
+          <p:style>
+            <a:lnRef idx="2">
+              <a:schemeClr val="accent1">
+                <a:shade val="50000"/>
+              </a:schemeClr>
+            </a:lnRef>
+            <a:fillRef idx="1">
+              <a:schemeClr val="accent1"/>
+            </a:fillRef>
+            <a:effectRef idx="0">
+              <a:schemeClr val="accent1"/>
+            </a:effectRef>
+            <a:fontRef idx="minor">
+              <a:schemeClr val="lt1"/>
+            </a:fontRef>
+          </p:style>
+          <p:txBody>
+            <a:bodyPr rtlCol="0" anchor="ctr"/>
+            <a:lstStyle/>
+            <a:p>
+              <a:pPr algn="ctr"/>
+              <a:endParaRPr lang="de-DE"/>
+            </a:p>
+          </p:txBody>
+        </p:sp>
+        <p:sp>
+          <p:nvSpPr>
+            <p:cNvPr id="15" name="Rechteck 14">
+              <a:extLst>
+                <a:ext uri="{FF2B5EF4-FFF2-40B4-BE49-F238E27FC236}">
+                  <a16:creationId xmlns:a16="http://schemas.microsoft.com/office/drawing/2014/main" id="{A32F8EBC-7A65-4B21-8AC2-35B4E931B9D2}"/>
+                </a:ext>
+              </a:extLst>
+            </p:cNvPr>
+            <p:cNvSpPr/>
+            <p:nvPr/>
+          </p:nvSpPr>
+          <p:spPr>
+            <a:xfrm rot="16200000">
+              <a:off x="5424716" y="2851667"/>
+              <a:ext cx="416052" cy="7205217"/>
+            </a:xfrm>
+            <a:prstGeom prst="rect">
+              <a:avLst/>
+            </a:prstGeom>
+            <a:solidFill>
+              <a:srgbClr val="92D050"/>
+            </a:solidFill>
+            <a:ln w="76200">
+              <a:solidFill>
+                <a:srgbClr val="92D050"/>
+              </a:solidFill>
+            </a:ln>
+            <a:effectLst>
+              <a:outerShdw blurRad="63500" sx="102000" sy="102000" algn="ctr" rotWithShape="0">
+                <a:prstClr val="black">
+                  <a:alpha val="40000"/>
+                </a:prstClr>
+              </a:outerShdw>
+            </a:effectLst>
+          </p:spPr>
+          <p:style>
+            <a:lnRef idx="2">
+              <a:schemeClr val="accent1">
+                <a:shade val="50000"/>
+              </a:schemeClr>
+            </a:lnRef>
+            <a:fillRef idx="1">
+              <a:schemeClr val="accent1"/>
+            </a:fillRef>
+            <a:effectRef idx="0">
+              <a:schemeClr val="accent1"/>
+            </a:effectRef>
+            <a:fontRef idx="minor">
+              <a:schemeClr val="lt1"/>
+            </a:fontRef>
+          </p:style>
+          <p:txBody>
+            <a:bodyPr vert="vert" rtlCol="0" anchor="ctr"/>
+            <a:lstStyle/>
+            <a:p>
+              <a:pPr algn="ctr"/>
+              <a:r>
+                <a:rPr lang="de-DE" dirty="0"/>
+                <a:t>Filter </a:t>
+              </a:r>
+              <a:r>
+                <a:rPr lang="de-DE" dirty="0" err="1"/>
+                <a:t>by</a:t>
+              </a:r>
+              <a:r>
+                <a:rPr lang="de-DE" dirty="0"/>
+                <a:t> </a:t>
+              </a:r>
+              <a:r>
+                <a:rPr lang="de-DE" dirty="0" err="1"/>
+                <a:t>Slope</a:t>
+              </a:r>
+              <a:endParaRPr lang="de-DE" dirty="0"/>
+            </a:p>
+          </p:txBody>
+        </p:sp>
+      </p:grpSp>
+    </p:spTree>
+    <p:extLst>
+      <p:ext uri="{BB962C8B-B14F-4D97-AF65-F5344CB8AC3E}">
+        <p14:creationId xmlns:p14="http://schemas.microsoft.com/office/powerpoint/2010/main" val="792445246"/>
+      </p:ext>
+    </p:extLst>
+  </p:cSld>
+  <p:clrMapOvr>
+    <a:masterClrMapping/>
+  </p:clrMapOvr>
+</p:sld>
+</file>
+
+<file path=ppt/slides/slide4.xml><?xml version="1.0" encoding="utf-8"?>
+<p:sld xmlns:a="http://schemas.openxmlformats.org/drawingml/2006/main" xmlns:r="http://schemas.openxmlformats.org/officeDocument/2006/relationships" xmlns:p="http://schemas.openxmlformats.org/presentationml/2006/main">
+  <p:cSld>
+    <p:spTree>
+      <p:nvGrpSpPr>
+        <p:cNvPr id="1" name=""/>
+        <p:cNvGrpSpPr/>
+        <p:nvPr/>
+      </p:nvGrpSpPr>
+      <p:grpSpPr>
+        <a:xfrm>
+          <a:off x="0" y="0"/>
+          <a:ext cx="0" cy="0"/>
+          <a:chOff x="0" y="0"/>
+          <a:chExt cx="0" cy="0"/>
+        </a:xfrm>
+      </p:grpSpPr>
+      <p:pic>
+        <p:nvPicPr>
+          <p:cNvPr id="3" name="Grafik 2" descr="Ein Bild, das Screenshot enthält.&#10;&#10;Mit hoher Zuverlässigkeit generierte Beschreibung">
+            <a:extLst>
+              <a:ext uri="{FF2B5EF4-FFF2-40B4-BE49-F238E27FC236}">
+                <a16:creationId xmlns:a16="http://schemas.microsoft.com/office/drawing/2014/main" id="{6B198581-7CF8-44D1-A678-AEFAAFAC9E93}"/>
+              </a:ext>
+            </a:extLst>
+          </p:cNvPr>
+          <p:cNvPicPr>
+            <a:picLocks noChangeAspect="1"/>
+          </p:cNvPicPr>
           <p:nvPr/>
-        </p:nvSpPr>
+        </p:nvPicPr>
+        <p:blipFill>
+          <a:blip r:embed="rId2">
+            <a:extLst>
+              <a:ext uri="{28A0092B-C50C-407E-A947-70E740481C1C}">
+                <a14:useLocalDpi xmlns:a14="http://schemas.microsoft.com/office/drawing/2010/main" val="0"/>
+              </a:ext>
+            </a:extLst>
+          </a:blip>
+          <a:stretch>
+            <a:fillRect/>
+          </a:stretch>
+        </p:blipFill>
         <p:spPr>
           <a:xfrm>
-            <a:off x="607059" y="5295086"/>
-            <a:ext cx="2130805" cy="271163"/>
+            <a:off x="2007442" y="0"/>
+            <a:ext cx="7510366" cy="6858000"/>
           </a:xfrm>
           <a:prstGeom prst="rect">
             <a:avLst/>
           </a:prstGeom>
-          <a:solidFill>
-            <a:schemeClr val="bg1">
-              <a:alpha val="0"/>
-            </a:schemeClr>
-          </a:solidFill>
-          <a:ln>
-            <a:noFill/>
-          </a:ln>
+        </p:spPr>
+      </p:pic>
+      <p:grpSp>
+        <p:nvGrpSpPr>
+          <p:cNvPr id="16" name="Gruppieren 15">
+            <a:extLst>
+              <a:ext uri="{FF2B5EF4-FFF2-40B4-BE49-F238E27FC236}">
+                <a16:creationId xmlns:a16="http://schemas.microsoft.com/office/drawing/2014/main" id="{CD283649-7ECB-4AF9-8568-FB9ECCF755DF}"/>
+              </a:ext>
+            </a:extLst>
+          </p:cNvPr>
+          <p:cNvGrpSpPr/>
+          <p:nvPr/>
+        </p:nvGrpSpPr>
+        <p:grpSpPr>
+          <a:xfrm>
+            <a:off x="-6080589" y="5070782"/>
+            <a:ext cx="18605963" cy="807447"/>
+            <a:chOff x="1976613" y="6050551"/>
+            <a:chExt cx="7537937" cy="807447"/>
+          </a:xfrm>
           <a:effectLst>
             <a:outerShdw blurRad="50800" dist="38100" dir="2700000" algn="tl" rotWithShape="0">
               <a:prstClr val="black">
@@ -5341,88 +5654,1824 @@
               </a:prstClr>
             </a:outerShdw>
           </a:effectLst>
+        </p:grpSpPr>
+        <p:sp>
+          <p:nvSpPr>
+            <p:cNvPr id="13" name="Rechteck 12">
+              <a:extLst>
+                <a:ext uri="{FF2B5EF4-FFF2-40B4-BE49-F238E27FC236}">
+                  <a16:creationId xmlns:a16="http://schemas.microsoft.com/office/drawing/2014/main" id="{6419E41E-BD69-42C6-9620-31B21472B185}"/>
+                </a:ext>
+              </a:extLst>
+            </p:cNvPr>
+            <p:cNvSpPr/>
+            <p:nvPr/>
+          </p:nvSpPr>
+          <p:spPr>
+            <a:xfrm>
+              <a:off x="1976613" y="6050551"/>
+              <a:ext cx="7537937" cy="807447"/>
+            </a:xfrm>
+            <a:prstGeom prst="rect">
+              <a:avLst/>
+            </a:prstGeom>
+            <a:solidFill>
+              <a:schemeClr val="bg1"/>
+            </a:solidFill>
+            <a:ln>
+              <a:solidFill>
+                <a:schemeClr val="bg1"/>
+              </a:solidFill>
+            </a:ln>
+          </p:spPr>
+          <p:style>
+            <a:lnRef idx="2">
+              <a:schemeClr val="accent1">
+                <a:shade val="50000"/>
+              </a:schemeClr>
+            </a:lnRef>
+            <a:fillRef idx="1">
+              <a:schemeClr val="accent1"/>
+            </a:fillRef>
+            <a:effectRef idx="0">
+              <a:schemeClr val="accent1"/>
+            </a:effectRef>
+            <a:fontRef idx="minor">
+              <a:schemeClr val="lt1"/>
+            </a:fontRef>
+          </p:style>
+          <p:txBody>
+            <a:bodyPr rtlCol="0" anchor="ctr"/>
+            <a:lstStyle/>
+            <a:p>
+              <a:pPr algn="ctr"/>
+              <a:endParaRPr lang="de-DE"/>
+            </a:p>
+          </p:txBody>
+        </p:sp>
+        <p:sp>
+          <p:nvSpPr>
+            <p:cNvPr id="15" name="Rechteck 14">
+              <a:extLst>
+                <a:ext uri="{FF2B5EF4-FFF2-40B4-BE49-F238E27FC236}">
+                  <a16:creationId xmlns:a16="http://schemas.microsoft.com/office/drawing/2014/main" id="{A32F8EBC-7A65-4B21-8AC2-35B4E931B9D2}"/>
+                </a:ext>
+              </a:extLst>
+            </p:cNvPr>
+            <p:cNvSpPr/>
+            <p:nvPr/>
+          </p:nvSpPr>
+          <p:spPr>
+            <a:xfrm rot="16200000">
+              <a:off x="5424716" y="2851667"/>
+              <a:ext cx="416052" cy="7205217"/>
+            </a:xfrm>
+            <a:prstGeom prst="rect">
+              <a:avLst/>
+            </a:prstGeom>
+            <a:solidFill>
+              <a:srgbClr val="92D050"/>
+            </a:solidFill>
+            <a:ln w="76200">
+              <a:solidFill>
+                <a:srgbClr val="92D050"/>
+              </a:solidFill>
+            </a:ln>
+            <a:effectLst>
+              <a:outerShdw blurRad="63500" sx="102000" sy="102000" algn="ctr" rotWithShape="0">
+                <a:prstClr val="black">
+                  <a:alpha val="40000"/>
+                </a:prstClr>
+              </a:outerShdw>
+            </a:effectLst>
+          </p:spPr>
+          <p:style>
+            <a:lnRef idx="2">
+              <a:schemeClr val="accent1">
+                <a:shade val="50000"/>
+              </a:schemeClr>
+            </a:lnRef>
+            <a:fillRef idx="1">
+              <a:schemeClr val="accent1"/>
+            </a:fillRef>
+            <a:effectRef idx="0">
+              <a:schemeClr val="accent1"/>
+            </a:effectRef>
+            <a:fontRef idx="minor">
+              <a:schemeClr val="lt1"/>
+            </a:fontRef>
+          </p:style>
+          <p:txBody>
+            <a:bodyPr vert="vert" rtlCol="0" anchor="ctr"/>
+            <a:lstStyle/>
+            <a:p>
+              <a:pPr algn="ctr"/>
+              <a:r>
+                <a:rPr lang="de-DE" dirty="0" err="1"/>
+                <a:t>Align</a:t>
+              </a:r>
+              <a:r>
+                <a:rPr lang="de-DE" dirty="0"/>
+                <a:t> </a:t>
+              </a:r>
+              <a:r>
+                <a:rPr lang="de-DE" dirty="0" err="1"/>
+                <a:t>to</a:t>
+              </a:r>
+              <a:r>
+                <a:rPr lang="de-DE" dirty="0"/>
+                <a:t> Surface</a:t>
+              </a:r>
+            </a:p>
+          </p:txBody>
+        </p:sp>
+      </p:grpSp>
+    </p:spTree>
+    <p:extLst>
+      <p:ext uri="{BB962C8B-B14F-4D97-AF65-F5344CB8AC3E}">
+        <p14:creationId xmlns:p14="http://schemas.microsoft.com/office/powerpoint/2010/main" val="2497723850"/>
+      </p:ext>
+    </p:extLst>
+  </p:cSld>
+  <p:clrMapOvr>
+    <a:masterClrMapping/>
+  </p:clrMapOvr>
+</p:sld>
+</file>
+
+<file path=ppt/slides/slide5.xml><?xml version="1.0" encoding="utf-8"?>
+<p:sld xmlns:a="http://schemas.openxmlformats.org/drawingml/2006/main" xmlns:r="http://schemas.openxmlformats.org/officeDocument/2006/relationships" xmlns:p="http://schemas.openxmlformats.org/presentationml/2006/main">
+  <p:cSld>
+    <p:spTree>
+      <p:nvGrpSpPr>
+        <p:cNvPr id="1" name=""/>
+        <p:cNvGrpSpPr/>
+        <p:nvPr/>
+      </p:nvGrpSpPr>
+      <p:grpSpPr>
+        <a:xfrm>
+          <a:off x="0" y="0"/>
+          <a:ext cx="0" cy="0"/>
+          <a:chOff x="0" y="0"/>
+          <a:chExt cx="0" cy="0"/>
+        </a:xfrm>
+      </p:grpSpPr>
+      <p:pic>
+        <p:nvPicPr>
+          <p:cNvPr id="4" name="Grafik 3" descr="Ein Bild, das LEGO, Spielzeug enthält.&#10;&#10;Mit sehr hoher Zuverlässigkeit generierte Beschreibung">
+            <a:extLst>
+              <a:ext uri="{FF2B5EF4-FFF2-40B4-BE49-F238E27FC236}">
+                <a16:creationId xmlns:a16="http://schemas.microsoft.com/office/drawing/2014/main" id="{0B2B6CAD-52AF-49A3-B258-6FAE5EC8DA07}"/>
+              </a:ext>
+            </a:extLst>
+          </p:cNvPr>
+          <p:cNvPicPr>
+            <a:picLocks noChangeAspect="1"/>
+          </p:cNvPicPr>
+          <p:nvPr/>
+        </p:nvPicPr>
+        <p:blipFill>
+          <a:blip r:embed="rId2">
+            <a:extLst>
+              <a:ext uri="{28A0092B-C50C-407E-A947-70E740481C1C}">
+                <a14:useLocalDpi xmlns:a14="http://schemas.microsoft.com/office/drawing/2010/main" val="0"/>
+              </a:ext>
+            </a:extLst>
+          </a:blip>
+          <a:stretch>
+            <a:fillRect/>
+          </a:stretch>
+        </p:blipFill>
+        <p:spPr>
+          <a:xfrm>
+            <a:off x="2152114" y="-18569"/>
+            <a:ext cx="7678222" cy="5896798"/>
+          </a:xfrm>
+          <a:prstGeom prst="rect">
+            <a:avLst/>
+          </a:prstGeom>
+        </p:spPr>
+      </p:pic>
+      <p:grpSp>
+        <p:nvGrpSpPr>
+          <p:cNvPr id="16" name="Gruppieren 15">
+            <a:extLst>
+              <a:ext uri="{FF2B5EF4-FFF2-40B4-BE49-F238E27FC236}">
+                <a16:creationId xmlns:a16="http://schemas.microsoft.com/office/drawing/2014/main" id="{CD283649-7ECB-4AF9-8568-FB9ECCF755DF}"/>
+              </a:ext>
+            </a:extLst>
+          </p:cNvPr>
+          <p:cNvGrpSpPr/>
+          <p:nvPr/>
+        </p:nvGrpSpPr>
+        <p:grpSpPr>
+          <a:xfrm>
+            <a:off x="-6080589" y="5070782"/>
+            <a:ext cx="18605963" cy="807447"/>
+            <a:chOff x="1976613" y="6050551"/>
+            <a:chExt cx="7537937" cy="807447"/>
+          </a:xfrm>
+          <a:effectLst>
+            <a:outerShdw blurRad="50800" dist="38100" dir="2700000" algn="tl" rotWithShape="0">
+              <a:prstClr val="black">
+                <a:alpha val="40000"/>
+              </a:prstClr>
+            </a:outerShdw>
+          </a:effectLst>
+        </p:grpSpPr>
+        <p:sp>
+          <p:nvSpPr>
+            <p:cNvPr id="13" name="Rechteck 12">
+              <a:extLst>
+                <a:ext uri="{FF2B5EF4-FFF2-40B4-BE49-F238E27FC236}">
+                  <a16:creationId xmlns:a16="http://schemas.microsoft.com/office/drawing/2014/main" id="{6419E41E-BD69-42C6-9620-31B21472B185}"/>
+                </a:ext>
+              </a:extLst>
+            </p:cNvPr>
+            <p:cNvSpPr/>
+            <p:nvPr/>
+          </p:nvSpPr>
+          <p:spPr>
+            <a:xfrm>
+              <a:off x="1976613" y="6050551"/>
+              <a:ext cx="7537937" cy="807447"/>
+            </a:xfrm>
+            <a:prstGeom prst="rect">
+              <a:avLst/>
+            </a:prstGeom>
+            <a:solidFill>
+              <a:schemeClr val="bg1"/>
+            </a:solidFill>
+            <a:ln>
+              <a:solidFill>
+                <a:schemeClr val="bg1"/>
+              </a:solidFill>
+            </a:ln>
+          </p:spPr>
+          <p:style>
+            <a:lnRef idx="2">
+              <a:schemeClr val="accent1">
+                <a:shade val="50000"/>
+              </a:schemeClr>
+            </a:lnRef>
+            <a:fillRef idx="1">
+              <a:schemeClr val="accent1"/>
+            </a:fillRef>
+            <a:effectRef idx="0">
+              <a:schemeClr val="accent1"/>
+            </a:effectRef>
+            <a:fontRef idx="minor">
+              <a:schemeClr val="lt1"/>
+            </a:fontRef>
+          </p:style>
+          <p:txBody>
+            <a:bodyPr rtlCol="0" anchor="ctr"/>
+            <a:lstStyle/>
+            <a:p>
+              <a:pPr algn="ctr"/>
+              <a:endParaRPr lang="de-DE"/>
+            </a:p>
+          </p:txBody>
+        </p:sp>
+        <p:sp>
+          <p:nvSpPr>
+            <p:cNvPr id="15" name="Rechteck 14">
+              <a:extLst>
+                <a:ext uri="{FF2B5EF4-FFF2-40B4-BE49-F238E27FC236}">
+                  <a16:creationId xmlns:a16="http://schemas.microsoft.com/office/drawing/2014/main" id="{A32F8EBC-7A65-4B21-8AC2-35B4E931B9D2}"/>
+                </a:ext>
+              </a:extLst>
+            </p:cNvPr>
+            <p:cNvSpPr/>
+            <p:nvPr/>
+          </p:nvSpPr>
+          <p:spPr>
+            <a:xfrm rot="16200000">
+              <a:off x="5424716" y="2851667"/>
+              <a:ext cx="416052" cy="7205217"/>
+            </a:xfrm>
+            <a:prstGeom prst="rect">
+              <a:avLst/>
+            </a:prstGeom>
+            <a:solidFill>
+              <a:srgbClr val="92D050"/>
+            </a:solidFill>
+            <a:ln w="76200">
+              <a:solidFill>
+                <a:srgbClr val="92D050"/>
+              </a:solidFill>
+            </a:ln>
+            <a:effectLst>
+              <a:outerShdw blurRad="63500" sx="102000" sy="102000" algn="ctr" rotWithShape="0">
+                <a:prstClr val="black">
+                  <a:alpha val="40000"/>
+                </a:prstClr>
+              </a:outerShdw>
+            </a:effectLst>
+          </p:spPr>
+          <p:style>
+            <a:lnRef idx="2">
+              <a:schemeClr val="accent1">
+                <a:shade val="50000"/>
+              </a:schemeClr>
+            </a:lnRef>
+            <a:fillRef idx="1">
+              <a:schemeClr val="accent1"/>
+            </a:fillRef>
+            <a:effectRef idx="0">
+              <a:schemeClr val="accent1"/>
+            </a:effectRef>
+            <a:fontRef idx="minor">
+              <a:schemeClr val="lt1"/>
+            </a:fontRef>
+          </p:style>
+          <p:txBody>
+            <a:bodyPr vert="vert" rtlCol="0" anchor="ctr"/>
+            <a:lstStyle/>
+            <a:p>
+              <a:pPr algn="ctr"/>
+              <a:r>
+                <a:rPr lang="de-DE" dirty="0" err="1"/>
+                <a:t>Intercollision</a:t>
+              </a:r>
+              <a:endParaRPr lang="de-DE" dirty="0"/>
+            </a:p>
+          </p:txBody>
+        </p:sp>
+      </p:grpSp>
+    </p:spTree>
+    <p:extLst>
+      <p:ext uri="{BB962C8B-B14F-4D97-AF65-F5344CB8AC3E}">
+        <p14:creationId xmlns:p14="http://schemas.microsoft.com/office/powerpoint/2010/main" val="4242349644"/>
+      </p:ext>
+    </p:extLst>
+  </p:cSld>
+  <p:clrMapOvr>
+    <a:masterClrMapping/>
+  </p:clrMapOvr>
+</p:sld>
+</file>
+
+<file path=ppt/slides/slide6.xml><?xml version="1.0" encoding="utf-8"?>
+<p:sld xmlns:a="http://schemas.openxmlformats.org/drawingml/2006/main" xmlns:r="http://schemas.openxmlformats.org/officeDocument/2006/relationships" xmlns:p="http://schemas.openxmlformats.org/presentationml/2006/main">
+  <p:cSld>
+    <p:spTree>
+      <p:nvGrpSpPr>
+        <p:cNvPr id="1" name=""/>
+        <p:cNvGrpSpPr/>
+        <p:nvPr/>
+      </p:nvGrpSpPr>
+      <p:grpSpPr>
+        <a:xfrm>
+          <a:off x="0" y="0"/>
+          <a:ext cx="0" cy="0"/>
+          <a:chOff x="0" y="0"/>
+          <a:chExt cx="0" cy="0"/>
+        </a:xfrm>
+      </p:grpSpPr>
+      <p:pic>
+        <p:nvPicPr>
+          <p:cNvPr id="3" name="Grafik 2">
+            <a:extLst>
+              <a:ext uri="{FF2B5EF4-FFF2-40B4-BE49-F238E27FC236}">
+                <a16:creationId xmlns:a16="http://schemas.microsoft.com/office/drawing/2014/main" id="{87B8ABAE-274B-43A7-B8FD-F3EF62AEE8B1}"/>
+              </a:ext>
+            </a:extLst>
+          </p:cNvPr>
+          <p:cNvPicPr>
+            <a:picLocks noChangeAspect="1"/>
+          </p:cNvPicPr>
+          <p:nvPr/>
+        </p:nvPicPr>
+        <p:blipFill>
+          <a:blip r:embed="rId2">
+            <a:extLst>
+              <a:ext uri="{28A0092B-C50C-407E-A947-70E740481C1C}">
+                <a14:useLocalDpi xmlns:a14="http://schemas.microsoft.com/office/drawing/2010/main" val="0"/>
+              </a:ext>
+            </a:extLst>
+          </a:blip>
+          <a:stretch>
+            <a:fillRect/>
+          </a:stretch>
+        </p:blipFill>
+        <p:spPr>
+          <a:xfrm>
+            <a:off x="2099705" y="1304628"/>
+            <a:ext cx="7992590" cy="4248743"/>
+          </a:xfrm>
+          <a:prstGeom prst="rect">
+            <a:avLst/>
+          </a:prstGeom>
+        </p:spPr>
+      </p:pic>
+      <p:grpSp>
+        <p:nvGrpSpPr>
+          <p:cNvPr id="16" name="Gruppieren 15">
+            <a:extLst>
+              <a:ext uri="{FF2B5EF4-FFF2-40B4-BE49-F238E27FC236}">
+                <a16:creationId xmlns:a16="http://schemas.microsoft.com/office/drawing/2014/main" id="{CD283649-7ECB-4AF9-8568-FB9ECCF755DF}"/>
+              </a:ext>
+            </a:extLst>
+          </p:cNvPr>
+          <p:cNvGrpSpPr/>
+          <p:nvPr/>
+        </p:nvGrpSpPr>
+        <p:grpSpPr>
+          <a:xfrm>
+            <a:off x="-4661364" y="5062630"/>
+            <a:ext cx="18605963" cy="807447"/>
+            <a:chOff x="1976613" y="6050551"/>
+            <a:chExt cx="7537937" cy="807447"/>
+          </a:xfrm>
+          <a:effectLst>
+            <a:outerShdw blurRad="50800" dist="38100" dir="2700000" algn="tl" rotWithShape="0">
+              <a:prstClr val="black">
+                <a:alpha val="40000"/>
+              </a:prstClr>
+            </a:outerShdw>
+          </a:effectLst>
+        </p:grpSpPr>
+        <p:sp>
+          <p:nvSpPr>
+            <p:cNvPr id="13" name="Rechteck 12">
+              <a:extLst>
+                <a:ext uri="{FF2B5EF4-FFF2-40B4-BE49-F238E27FC236}">
+                  <a16:creationId xmlns:a16="http://schemas.microsoft.com/office/drawing/2014/main" id="{6419E41E-BD69-42C6-9620-31B21472B185}"/>
+                </a:ext>
+              </a:extLst>
+            </p:cNvPr>
+            <p:cNvSpPr/>
+            <p:nvPr/>
+          </p:nvSpPr>
+          <p:spPr>
+            <a:xfrm>
+              <a:off x="1976613" y="6050551"/>
+              <a:ext cx="7537937" cy="807447"/>
+            </a:xfrm>
+            <a:prstGeom prst="rect">
+              <a:avLst/>
+            </a:prstGeom>
+            <a:solidFill>
+              <a:schemeClr val="bg1"/>
+            </a:solidFill>
+            <a:ln>
+              <a:solidFill>
+                <a:schemeClr val="bg1"/>
+              </a:solidFill>
+            </a:ln>
+          </p:spPr>
+          <p:style>
+            <a:lnRef idx="2">
+              <a:schemeClr val="accent1">
+                <a:shade val="50000"/>
+              </a:schemeClr>
+            </a:lnRef>
+            <a:fillRef idx="1">
+              <a:schemeClr val="accent1"/>
+            </a:fillRef>
+            <a:effectRef idx="0">
+              <a:schemeClr val="accent1"/>
+            </a:effectRef>
+            <a:fontRef idx="minor">
+              <a:schemeClr val="lt1"/>
+            </a:fontRef>
+          </p:style>
+          <p:txBody>
+            <a:bodyPr rtlCol="0" anchor="ctr"/>
+            <a:lstStyle/>
+            <a:p>
+              <a:pPr algn="ctr"/>
+              <a:endParaRPr lang="de-DE"/>
+            </a:p>
+          </p:txBody>
+        </p:sp>
+        <p:sp>
+          <p:nvSpPr>
+            <p:cNvPr id="15" name="Rechteck 14">
+              <a:extLst>
+                <a:ext uri="{FF2B5EF4-FFF2-40B4-BE49-F238E27FC236}">
+                  <a16:creationId xmlns:a16="http://schemas.microsoft.com/office/drawing/2014/main" id="{A32F8EBC-7A65-4B21-8AC2-35B4E931B9D2}"/>
+                </a:ext>
+              </a:extLst>
+            </p:cNvPr>
+            <p:cNvSpPr/>
+            <p:nvPr/>
+          </p:nvSpPr>
+          <p:spPr>
+            <a:xfrm rot="16200000">
+              <a:off x="5424716" y="2851667"/>
+              <a:ext cx="416052" cy="7205217"/>
+            </a:xfrm>
+            <a:prstGeom prst="rect">
+              <a:avLst/>
+            </a:prstGeom>
+            <a:solidFill>
+              <a:srgbClr val="92D050"/>
+            </a:solidFill>
+            <a:ln w="76200">
+              <a:solidFill>
+                <a:srgbClr val="92D050"/>
+              </a:solidFill>
+            </a:ln>
+            <a:effectLst>
+              <a:outerShdw blurRad="63500" sx="102000" sy="102000" algn="ctr" rotWithShape="0">
+                <a:prstClr val="black">
+                  <a:alpha val="40000"/>
+                </a:prstClr>
+              </a:outerShdw>
+            </a:effectLst>
+          </p:spPr>
+          <p:style>
+            <a:lnRef idx="2">
+              <a:schemeClr val="accent1">
+                <a:shade val="50000"/>
+              </a:schemeClr>
+            </a:lnRef>
+            <a:fillRef idx="1">
+              <a:schemeClr val="accent1"/>
+            </a:fillRef>
+            <a:effectRef idx="0">
+              <a:schemeClr val="accent1"/>
+            </a:effectRef>
+            <a:fontRef idx="minor">
+              <a:schemeClr val="lt1"/>
+            </a:fontRef>
+          </p:style>
+          <p:txBody>
+            <a:bodyPr vert="vert" rtlCol="0" anchor="ctr"/>
+            <a:lstStyle/>
+            <a:p>
+              <a:pPr algn="ctr"/>
+              <a:r>
+                <a:rPr lang="de-DE" dirty="0"/>
+                <a:t>Fix </a:t>
+              </a:r>
+              <a:r>
+                <a:rPr lang="de-DE" dirty="0" err="1"/>
+                <a:t>this</a:t>
+              </a:r>
+              <a:r>
+                <a:rPr lang="de-DE" dirty="0"/>
+                <a:t>! </a:t>
+              </a:r>
+              <a:r>
+                <a:rPr lang="de-DE" dirty="0" err="1"/>
+                <a:t>With</a:t>
+              </a:r>
+              <a:r>
+                <a:rPr lang="de-DE" dirty="0"/>
+                <a:t> </a:t>
+              </a:r>
+              <a:r>
+                <a:rPr lang="de-DE" dirty="0" err="1"/>
+                <a:t>the</a:t>
+              </a:r>
+              <a:r>
+                <a:rPr lang="de-DE" dirty="0"/>
+                <a:t> Offset </a:t>
+              </a:r>
+              <a:r>
+                <a:rPr lang="de-DE" dirty="0" err="1"/>
+                <a:t>from</a:t>
+              </a:r>
+              <a:r>
+                <a:rPr lang="de-DE" dirty="0"/>
+                <a:t> </a:t>
+              </a:r>
+              <a:r>
+                <a:rPr lang="de-DE" dirty="0" err="1"/>
+                <a:t>the</a:t>
+              </a:r>
+              <a:r>
+                <a:rPr lang="de-DE" dirty="0"/>
+                <a:t> </a:t>
+              </a:r>
+              <a:r>
+                <a:rPr lang="de-DE" dirty="0" err="1"/>
+                <a:t>Object</a:t>
+              </a:r>
+              <a:r>
+                <a:rPr lang="de-DE" dirty="0"/>
+                <a:t> Pivot</a:t>
+              </a:r>
+            </a:p>
+          </p:txBody>
+        </p:sp>
+      </p:grpSp>
+      <p:cxnSp>
+        <p:nvCxnSpPr>
+          <p:cNvPr id="6" name="Gerade Verbindung mit Pfeil 5">
+            <a:extLst>
+              <a:ext uri="{FF2B5EF4-FFF2-40B4-BE49-F238E27FC236}">
+                <a16:creationId xmlns:a16="http://schemas.microsoft.com/office/drawing/2014/main" id="{4E457AD3-12C5-452B-AE51-3686FADA560C}"/>
+              </a:ext>
+            </a:extLst>
+          </p:cNvPr>
+          <p:cNvCxnSpPr/>
+          <p:nvPr/>
+        </p:nvCxnSpPr>
+        <p:spPr>
+          <a:xfrm>
+            <a:off x="3419475" y="3429000"/>
+            <a:ext cx="0" cy="466725"/>
+          </a:xfrm>
+          <a:prstGeom prst="straightConnector1">
+            <a:avLst/>
+          </a:prstGeom>
+          <a:ln w="38100">
+            <a:tailEnd type="triangle"/>
+          </a:ln>
         </p:spPr>
         <p:style>
-          <a:lnRef idx="2">
-            <a:schemeClr val="accent1">
-              <a:shade val="50000"/>
-            </a:schemeClr>
+          <a:lnRef idx="1">
+            <a:schemeClr val="accent1"/>
           </a:lnRef>
-          <a:fillRef idx="1">
+          <a:fillRef idx="0">
             <a:schemeClr val="accent1"/>
           </a:fillRef>
           <a:effectRef idx="0">
             <a:schemeClr val="accent1"/>
           </a:effectRef>
           <a:fontRef idx="minor">
-            <a:schemeClr val="lt1"/>
+            <a:schemeClr val="tx1"/>
           </a:fontRef>
         </p:style>
-        <p:txBody>
-          <a:bodyPr rtlCol="0" anchor="ctr"/>
-          <a:lstStyle/>
-          <a:p>
-            <a:r>
-              <a:rPr lang="de-DE" dirty="0">
-                <a:solidFill>
-                  <a:schemeClr val="bg2">
-                    <a:lumMod val="10000"/>
-                  </a:schemeClr>
-                </a:solidFill>
-                <a:effectLst>
-                  <a:outerShdw blurRad="50800" dist="50800" dir="5400000" sx="1000" sy="1000" algn="ctr" rotWithShape="0">
-                    <a:schemeClr val="bg1">
-                      <a:lumMod val="50000"/>
-                      <a:alpha val="10000"/>
-                    </a:schemeClr>
-                  </a:outerShdw>
-                </a:effectLst>
-              </a:rPr>
-              <a:t>Filter </a:t>
-            </a:r>
-            <a:r>
-              <a:rPr lang="de-DE" dirty="0" err="1">
-                <a:solidFill>
-                  <a:schemeClr val="bg2">
-                    <a:lumMod val="10000"/>
-                  </a:schemeClr>
-                </a:solidFill>
-                <a:effectLst>
-                  <a:outerShdw blurRad="50800" dist="50800" dir="5400000" sx="1000" sy="1000" algn="ctr" rotWithShape="0">
-                    <a:schemeClr val="bg1">
-                      <a:lumMod val="50000"/>
-                      <a:alpha val="10000"/>
-                    </a:schemeClr>
-                  </a:outerShdw>
-                </a:effectLst>
-              </a:rPr>
-              <a:t>by</a:t>
-            </a:r>
-            <a:r>
-              <a:rPr lang="de-DE" dirty="0">
-                <a:solidFill>
-                  <a:schemeClr val="bg2">
-                    <a:lumMod val="10000"/>
-                  </a:schemeClr>
-                </a:solidFill>
-                <a:effectLst>
-                  <a:outerShdw blurRad="50800" dist="50800" dir="5400000" sx="1000" sy="1000" algn="ctr" rotWithShape="0">
-                    <a:schemeClr val="bg1">
-                      <a:lumMod val="50000"/>
-                      <a:alpha val="10000"/>
-                    </a:schemeClr>
-                  </a:outerShdw>
-                </a:effectLst>
-              </a:rPr>
-              <a:t> Tag</a:t>
-            </a:r>
-          </a:p>
-        </p:txBody>
-      </p:sp>
+      </p:cxnSp>
+      <p:cxnSp>
+        <p:nvCxnSpPr>
+          <p:cNvPr id="10" name="Gerade Verbindung mit Pfeil 9">
+            <a:extLst>
+              <a:ext uri="{FF2B5EF4-FFF2-40B4-BE49-F238E27FC236}">
+                <a16:creationId xmlns:a16="http://schemas.microsoft.com/office/drawing/2014/main" id="{2D206CF0-DEA2-453F-BC8F-EB955D297151}"/>
+              </a:ext>
+            </a:extLst>
+          </p:cNvPr>
+          <p:cNvCxnSpPr>
+            <a:cxnSpLocks/>
+          </p:cNvCxnSpPr>
+          <p:nvPr/>
+        </p:nvCxnSpPr>
+        <p:spPr>
+          <a:xfrm>
+            <a:off x="2533650" y="3662362"/>
+            <a:ext cx="0" cy="300038"/>
+          </a:xfrm>
+          <a:prstGeom prst="straightConnector1">
+            <a:avLst/>
+          </a:prstGeom>
+          <a:ln w="38100">
+            <a:tailEnd type="triangle"/>
+          </a:ln>
+        </p:spPr>
+        <p:style>
+          <a:lnRef idx="1">
+            <a:schemeClr val="accent1"/>
+          </a:lnRef>
+          <a:fillRef idx="0">
+            <a:schemeClr val="accent1"/>
+          </a:fillRef>
+          <a:effectRef idx="0">
+            <a:schemeClr val="accent1"/>
+          </a:effectRef>
+          <a:fontRef idx="minor">
+            <a:schemeClr val="tx1"/>
+          </a:fontRef>
+        </p:style>
+      </p:cxnSp>
+      <p:cxnSp>
+        <p:nvCxnSpPr>
+          <p:cNvPr id="12" name="Gerade Verbindung mit Pfeil 11">
+            <a:extLst>
+              <a:ext uri="{FF2B5EF4-FFF2-40B4-BE49-F238E27FC236}">
+                <a16:creationId xmlns:a16="http://schemas.microsoft.com/office/drawing/2014/main" id="{2606D444-39D3-4F21-9FA3-84462AF7F027}"/>
+              </a:ext>
+            </a:extLst>
+          </p:cNvPr>
+          <p:cNvCxnSpPr>
+            <a:cxnSpLocks/>
+          </p:cNvCxnSpPr>
+          <p:nvPr/>
+        </p:nvCxnSpPr>
+        <p:spPr>
+          <a:xfrm>
+            <a:off x="5095875" y="3595687"/>
+            <a:ext cx="0" cy="300038"/>
+          </a:xfrm>
+          <a:prstGeom prst="straightConnector1">
+            <a:avLst/>
+          </a:prstGeom>
+          <a:ln w="38100">
+            <a:tailEnd type="triangle"/>
+          </a:ln>
+        </p:spPr>
+        <p:style>
+          <a:lnRef idx="1">
+            <a:schemeClr val="accent1"/>
+          </a:lnRef>
+          <a:fillRef idx="0">
+            <a:schemeClr val="accent1"/>
+          </a:fillRef>
+          <a:effectRef idx="0">
+            <a:schemeClr val="accent1"/>
+          </a:effectRef>
+          <a:fontRef idx="minor">
+            <a:schemeClr val="tx1"/>
+          </a:fontRef>
+        </p:style>
+      </p:cxnSp>
+      <p:cxnSp>
+        <p:nvCxnSpPr>
+          <p:cNvPr id="14" name="Gerade Verbindung mit Pfeil 13">
+            <a:extLst>
+              <a:ext uri="{FF2B5EF4-FFF2-40B4-BE49-F238E27FC236}">
+                <a16:creationId xmlns:a16="http://schemas.microsoft.com/office/drawing/2014/main" id="{1AA870B6-2D92-4B78-9EC4-16ADE14E6EFF}"/>
+              </a:ext>
+            </a:extLst>
+          </p:cNvPr>
+          <p:cNvCxnSpPr>
+            <a:cxnSpLocks/>
+          </p:cNvCxnSpPr>
+          <p:nvPr/>
+        </p:nvCxnSpPr>
+        <p:spPr>
+          <a:xfrm>
+            <a:off x="3114675" y="3662362"/>
+            <a:ext cx="0" cy="300038"/>
+          </a:xfrm>
+          <a:prstGeom prst="straightConnector1">
+            <a:avLst/>
+          </a:prstGeom>
+          <a:ln w="38100">
+            <a:tailEnd type="triangle"/>
+          </a:ln>
+        </p:spPr>
+        <p:style>
+          <a:lnRef idx="1">
+            <a:schemeClr val="accent1"/>
+          </a:lnRef>
+          <a:fillRef idx="0">
+            <a:schemeClr val="accent1"/>
+          </a:fillRef>
+          <a:effectRef idx="0">
+            <a:schemeClr val="accent1"/>
+          </a:effectRef>
+          <a:fontRef idx="minor">
+            <a:schemeClr val="tx1"/>
+          </a:fontRef>
+        </p:style>
+      </p:cxnSp>
+      <p:cxnSp>
+        <p:nvCxnSpPr>
+          <p:cNvPr id="17" name="Gerade Verbindung mit Pfeil 16">
+            <a:extLst>
+              <a:ext uri="{FF2B5EF4-FFF2-40B4-BE49-F238E27FC236}">
+                <a16:creationId xmlns:a16="http://schemas.microsoft.com/office/drawing/2014/main" id="{A1119E7F-E938-4425-A779-C1AF712B6DF7}"/>
+              </a:ext>
+            </a:extLst>
+          </p:cNvPr>
+          <p:cNvCxnSpPr>
+            <a:cxnSpLocks/>
+          </p:cNvCxnSpPr>
+          <p:nvPr/>
+        </p:nvCxnSpPr>
+        <p:spPr>
+          <a:xfrm>
+            <a:off x="7010400" y="3128962"/>
+            <a:ext cx="0" cy="766763"/>
+          </a:xfrm>
+          <a:prstGeom prst="straightConnector1">
+            <a:avLst/>
+          </a:prstGeom>
+          <a:ln w="38100">
+            <a:tailEnd type="triangle"/>
+          </a:ln>
+        </p:spPr>
+        <p:style>
+          <a:lnRef idx="1">
+            <a:schemeClr val="accent1"/>
+          </a:lnRef>
+          <a:fillRef idx="0">
+            <a:schemeClr val="accent1"/>
+          </a:fillRef>
+          <a:effectRef idx="0">
+            <a:schemeClr val="accent1"/>
+          </a:effectRef>
+          <a:fontRef idx="minor">
+            <a:schemeClr val="tx1"/>
+          </a:fontRef>
+        </p:style>
+      </p:cxnSp>
+      <p:cxnSp>
+        <p:nvCxnSpPr>
+          <p:cNvPr id="18" name="Gerade Verbindung mit Pfeil 17">
+            <a:extLst>
+              <a:ext uri="{FF2B5EF4-FFF2-40B4-BE49-F238E27FC236}">
+                <a16:creationId xmlns:a16="http://schemas.microsoft.com/office/drawing/2014/main" id="{94D94DA2-6078-45E1-9F1F-4C4426A9D106}"/>
+              </a:ext>
+            </a:extLst>
+          </p:cNvPr>
+          <p:cNvCxnSpPr>
+            <a:cxnSpLocks/>
+          </p:cNvCxnSpPr>
+          <p:nvPr/>
+        </p:nvCxnSpPr>
+        <p:spPr>
+          <a:xfrm>
+            <a:off x="9420225" y="3278980"/>
+            <a:ext cx="0" cy="616745"/>
+          </a:xfrm>
+          <a:prstGeom prst="straightConnector1">
+            <a:avLst/>
+          </a:prstGeom>
+          <a:ln w="38100">
+            <a:tailEnd type="triangle"/>
+          </a:ln>
+        </p:spPr>
+        <p:style>
+          <a:lnRef idx="1">
+            <a:schemeClr val="accent1"/>
+          </a:lnRef>
+          <a:fillRef idx="0">
+            <a:schemeClr val="accent1"/>
+          </a:fillRef>
+          <a:effectRef idx="0">
+            <a:schemeClr val="accent1"/>
+          </a:effectRef>
+          <a:fontRef idx="minor">
+            <a:schemeClr val="tx1"/>
+          </a:fontRef>
+        </p:style>
+      </p:cxnSp>
+      <p:cxnSp>
+        <p:nvCxnSpPr>
+          <p:cNvPr id="19" name="Gerade Verbindung mit Pfeil 18">
+            <a:extLst>
+              <a:ext uri="{FF2B5EF4-FFF2-40B4-BE49-F238E27FC236}">
+                <a16:creationId xmlns:a16="http://schemas.microsoft.com/office/drawing/2014/main" id="{B829A6BD-25C4-43BE-A605-6216352ACF97}"/>
+              </a:ext>
+            </a:extLst>
+          </p:cNvPr>
+          <p:cNvCxnSpPr>
+            <a:cxnSpLocks/>
+          </p:cNvCxnSpPr>
+          <p:nvPr/>
+        </p:nvCxnSpPr>
+        <p:spPr>
+          <a:xfrm>
+            <a:off x="7858125" y="3587352"/>
+            <a:ext cx="0" cy="308373"/>
+          </a:xfrm>
+          <a:prstGeom prst="straightConnector1">
+            <a:avLst/>
+          </a:prstGeom>
+          <a:ln w="38100">
+            <a:tailEnd type="triangle"/>
+          </a:ln>
+        </p:spPr>
+        <p:style>
+          <a:lnRef idx="1">
+            <a:schemeClr val="accent1"/>
+          </a:lnRef>
+          <a:fillRef idx="0">
+            <a:schemeClr val="accent1"/>
+          </a:fillRef>
+          <a:effectRef idx="0">
+            <a:schemeClr val="accent1"/>
+          </a:effectRef>
+          <a:fontRef idx="minor">
+            <a:schemeClr val="tx1"/>
+          </a:fontRef>
+        </p:style>
+      </p:cxnSp>
+      <p:cxnSp>
+        <p:nvCxnSpPr>
+          <p:cNvPr id="20" name="Gerade Verbindung mit Pfeil 19">
+            <a:extLst>
+              <a:ext uri="{FF2B5EF4-FFF2-40B4-BE49-F238E27FC236}">
+                <a16:creationId xmlns:a16="http://schemas.microsoft.com/office/drawing/2014/main" id="{66E8E51B-7555-43B5-BA4B-1601BA7E3DBA}"/>
+              </a:ext>
+            </a:extLst>
+          </p:cNvPr>
+          <p:cNvCxnSpPr>
+            <a:cxnSpLocks/>
+          </p:cNvCxnSpPr>
+          <p:nvPr/>
+        </p:nvCxnSpPr>
+        <p:spPr>
+          <a:xfrm>
+            <a:off x="6496050" y="3441500"/>
+            <a:ext cx="0" cy="454225"/>
+          </a:xfrm>
+          <a:prstGeom prst="straightConnector1">
+            <a:avLst/>
+          </a:prstGeom>
+          <a:ln w="38100">
+            <a:tailEnd type="triangle"/>
+          </a:ln>
+        </p:spPr>
+        <p:style>
+          <a:lnRef idx="1">
+            <a:schemeClr val="accent1"/>
+          </a:lnRef>
+          <a:fillRef idx="0">
+            <a:schemeClr val="accent1"/>
+          </a:fillRef>
+          <a:effectRef idx="0">
+            <a:schemeClr val="accent1"/>
+          </a:effectRef>
+          <a:fontRef idx="minor">
+            <a:schemeClr val="tx1"/>
+          </a:fontRef>
+        </p:style>
+      </p:cxnSp>
+      <p:cxnSp>
+        <p:nvCxnSpPr>
+          <p:cNvPr id="22" name="Gerade Verbindung mit Pfeil 21">
+            <a:extLst>
+              <a:ext uri="{FF2B5EF4-FFF2-40B4-BE49-F238E27FC236}">
+                <a16:creationId xmlns:a16="http://schemas.microsoft.com/office/drawing/2014/main" id="{47071668-BF6D-45A5-B95A-43739D900A7A}"/>
+              </a:ext>
+            </a:extLst>
+          </p:cNvPr>
+          <p:cNvCxnSpPr>
+            <a:cxnSpLocks/>
+          </p:cNvCxnSpPr>
+          <p:nvPr/>
+        </p:nvCxnSpPr>
+        <p:spPr>
+          <a:xfrm>
+            <a:off x="4543425" y="3708200"/>
+            <a:ext cx="0" cy="254200"/>
+          </a:xfrm>
+          <a:prstGeom prst="straightConnector1">
+            <a:avLst/>
+          </a:prstGeom>
+          <a:ln w="38100">
+            <a:tailEnd type="triangle"/>
+          </a:ln>
+        </p:spPr>
+        <p:style>
+          <a:lnRef idx="1">
+            <a:schemeClr val="accent1"/>
+          </a:lnRef>
+          <a:fillRef idx="0">
+            <a:schemeClr val="accent1"/>
+          </a:fillRef>
+          <a:effectRef idx="0">
+            <a:schemeClr val="accent1"/>
+          </a:effectRef>
+          <a:fontRef idx="minor">
+            <a:schemeClr val="tx1"/>
+          </a:fontRef>
+        </p:style>
+      </p:cxnSp>
+      <p:cxnSp>
+        <p:nvCxnSpPr>
+          <p:cNvPr id="24" name="Gerade Verbindung mit Pfeil 23">
+            <a:extLst>
+              <a:ext uri="{FF2B5EF4-FFF2-40B4-BE49-F238E27FC236}">
+                <a16:creationId xmlns:a16="http://schemas.microsoft.com/office/drawing/2014/main" id="{0B7A7D4F-591D-4CC5-87D5-6A5C813D2FA9}"/>
+              </a:ext>
+            </a:extLst>
+          </p:cNvPr>
+          <p:cNvCxnSpPr>
+            <a:cxnSpLocks/>
+          </p:cNvCxnSpPr>
+          <p:nvPr/>
+        </p:nvCxnSpPr>
+        <p:spPr>
+          <a:xfrm>
+            <a:off x="8886825" y="3535262"/>
+            <a:ext cx="0" cy="360463"/>
+          </a:xfrm>
+          <a:prstGeom prst="straightConnector1">
+            <a:avLst/>
+          </a:prstGeom>
+          <a:ln w="38100">
+            <a:tailEnd type="triangle"/>
+          </a:ln>
+        </p:spPr>
+        <p:style>
+          <a:lnRef idx="1">
+            <a:schemeClr val="accent1"/>
+          </a:lnRef>
+          <a:fillRef idx="0">
+            <a:schemeClr val="accent1"/>
+          </a:fillRef>
+          <a:effectRef idx="0">
+            <a:schemeClr val="accent1"/>
+          </a:effectRef>
+          <a:fontRef idx="minor">
+            <a:schemeClr val="tx1"/>
+          </a:fontRef>
+        </p:style>
+      </p:cxnSp>
+      <p:cxnSp>
+        <p:nvCxnSpPr>
+          <p:cNvPr id="26" name="Gerade Verbindung mit Pfeil 25">
+            <a:extLst>
+              <a:ext uri="{FF2B5EF4-FFF2-40B4-BE49-F238E27FC236}">
+                <a16:creationId xmlns:a16="http://schemas.microsoft.com/office/drawing/2014/main" id="{3AF44C19-86F3-4EA9-92E2-70C9844D985A}"/>
+              </a:ext>
+            </a:extLst>
+          </p:cNvPr>
+          <p:cNvCxnSpPr>
+            <a:cxnSpLocks/>
+          </p:cNvCxnSpPr>
+          <p:nvPr/>
+        </p:nvCxnSpPr>
+        <p:spPr>
+          <a:xfrm>
+            <a:off x="9867900" y="3482130"/>
+            <a:ext cx="0" cy="413595"/>
+          </a:xfrm>
+          <a:prstGeom prst="straightConnector1">
+            <a:avLst/>
+          </a:prstGeom>
+          <a:ln w="38100">
+            <a:tailEnd type="triangle"/>
+          </a:ln>
+        </p:spPr>
+        <p:style>
+          <a:lnRef idx="1">
+            <a:schemeClr val="accent1"/>
+          </a:lnRef>
+          <a:fillRef idx="0">
+            <a:schemeClr val="accent1"/>
+          </a:fillRef>
+          <a:effectRef idx="0">
+            <a:schemeClr val="accent1"/>
+          </a:effectRef>
+          <a:fontRef idx="minor">
+            <a:schemeClr val="tx1"/>
+          </a:fontRef>
+        </p:style>
+      </p:cxnSp>
+      <p:cxnSp>
+        <p:nvCxnSpPr>
+          <p:cNvPr id="28" name="Gerade Verbindung mit Pfeil 27">
+            <a:extLst>
+              <a:ext uri="{FF2B5EF4-FFF2-40B4-BE49-F238E27FC236}">
+                <a16:creationId xmlns:a16="http://schemas.microsoft.com/office/drawing/2014/main" id="{368F39BC-42CC-4E3C-9554-4EEDDB079884}"/>
+              </a:ext>
+            </a:extLst>
+          </p:cNvPr>
+          <p:cNvCxnSpPr>
+            <a:cxnSpLocks/>
+          </p:cNvCxnSpPr>
+          <p:nvPr/>
+        </p:nvCxnSpPr>
+        <p:spPr>
+          <a:xfrm>
+            <a:off x="6019800" y="3708200"/>
+            <a:ext cx="0" cy="187525"/>
+          </a:xfrm>
+          <a:prstGeom prst="straightConnector1">
+            <a:avLst/>
+          </a:prstGeom>
+          <a:ln w="38100">
+            <a:tailEnd type="triangle"/>
+          </a:ln>
+        </p:spPr>
+        <p:style>
+          <a:lnRef idx="1">
+            <a:schemeClr val="accent1"/>
+          </a:lnRef>
+          <a:fillRef idx="0">
+            <a:schemeClr val="accent1"/>
+          </a:fillRef>
+          <a:effectRef idx="0">
+            <a:schemeClr val="accent1"/>
+          </a:effectRef>
+          <a:fontRef idx="minor">
+            <a:schemeClr val="tx1"/>
+          </a:fontRef>
+        </p:style>
+      </p:cxnSp>
     </p:spTree>
     <p:extLst>
       <p:ext uri="{BB962C8B-B14F-4D97-AF65-F5344CB8AC3E}">
-        <p14:creationId xmlns:p14="http://schemas.microsoft.com/office/powerpoint/2010/main" val="912826963"/>
+        <p14:creationId xmlns:p14="http://schemas.microsoft.com/office/powerpoint/2010/main" val="2618763798"/>
+      </p:ext>
+    </p:extLst>
+  </p:cSld>
+  <p:clrMapOvr>
+    <a:masterClrMapping/>
+  </p:clrMapOvr>
+</p:sld>
+</file>
+
+<file path=ppt/slides/slide7.xml><?xml version="1.0" encoding="utf-8"?>
+<p:sld xmlns:a="http://schemas.openxmlformats.org/drawingml/2006/main" xmlns:r="http://schemas.openxmlformats.org/officeDocument/2006/relationships" xmlns:p="http://schemas.openxmlformats.org/presentationml/2006/main">
+  <p:cSld>
+    <p:spTree>
+      <p:nvGrpSpPr>
+        <p:cNvPr id="1" name=""/>
+        <p:cNvGrpSpPr/>
+        <p:nvPr/>
+      </p:nvGrpSpPr>
+      <p:grpSpPr>
+        <a:xfrm>
+          <a:off x="0" y="0"/>
+          <a:ext cx="0" cy="0"/>
+          <a:chOff x="0" y="0"/>
+          <a:chExt cx="0" cy="0"/>
+        </a:xfrm>
+      </p:grpSpPr>
+      <p:pic>
+        <p:nvPicPr>
+          <p:cNvPr id="4" name="Grafik 3" descr="Ein Bild, das Screenshot enthält.&#10;&#10;Mit hoher Zuverlässigkeit generierte Beschreibung">
+            <a:extLst>
+              <a:ext uri="{FF2B5EF4-FFF2-40B4-BE49-F238E27FC236}">
+                <a16:creationId xmlns:a16="http://schemas.microsoft.com/office/drawing/2014/main" id="{25AAF9B4-91D0-4C72-945F-300EE9C784DC}"/>
+              </a:ext>
+            </a:extLst>
+          </p:cNvPr>
+          <p:cNvPicPr>
+            <a:picLocks noChangeAspect="1"/>
+          </p:cNvPicPr>
+          <p:nvPr/>
+        </p:nvPicPr>
+        <p:blipFill>
+          <a:blip r:embed="rId2">
+            <a:extLst>
+              <a:ext uri="{28A0092B-C50C-407E-A947-70E740481C1C}">
+                <a14:useLocalDpi xmlns:a14="http://schemas.microsoft.com/office/drawing/2010/main" val="0"/>
+              </a:ext>
+            </a:extLst>
+          </a:blip>
+          <a:stretch>
+            <a:fillRect/>
+          </a:stretch>
+        </p:blipFill>
+        <p:spPr>
+          <a:xfrm>
+            <a:off x="2128212" y="120531"/>
+            <a:ext cx="8964276" cy="5553850"/>
+          </a:xfrm>
+          <a:prstGeom prst="rect">
+            <a:avLst/>
+          </a:prstGeom>
+        </p:spPr>
+      </p:pic>
+      <p:grpSp>
+        <p:nvGrpSpPr>
+          <p:cNvPr id="16" name="Gruppieren 15">
+            <a:extLst>
+              <a:ext uri="{FF2B5EF4-FFF2-40B4-BE49-F238E27FC236}">
+                <a16:creationId xmlns:a16="http://schemas.microsoft.com/office/drawing/2014/main" id="{CD283649-7ECB-4AF9-8568-FB9ECCF755DF}"/>
+              </a:ext>
+            </a:extLst>
+          </p:cNvPr>
+          <p:cNvGrpSpPr/>
+          <p:nvPr/>
+        </p:nvGrpSpPr>
+        <p:grpSpPr>
+          <a:xfrm>
+            <a:off x="-4661364" y="5062630"/>
+            <a:ext cx="18605963" cy="807447"/>
+            <a:chOff x="1976613" y="6050551"/>
+            <a:chExt cx="7537937" cy="807447"/>
+          </a:xfrm>
+          <a:effectLst>
+            <a:outerShdw blurRad="50800" dist="38100" dir="2700000" algn="tl" rotWithShape="0">
+              <a:prstClr val="black">
+                <a:alpha val="40000"/>
+              </a:prstClr>
+            </a:outerShdw>
+          </a:effectLst>
+        </p:grpSpPr>
+        <p:sp>
+          <p:nvSpPr>
+            <p:cNvPr id="13" name="Rechteck 12">
+              <a:extLst>
+                <a:ext uri="{FF2B5EF4-FFF2-40B4-BE49-F238E27FC236}">
+                  <a16:creationId xmlns:a16="http://schemas.microsoft.com/office/drawing/2014/main" id="{6419E41E-BD69-42C6-9620-31B21472B185}"/>
+                </a:ext>
+              </a:extLst>
+            </p:cNvPr>
+            <p:cNvSpPr/>
+            <p:nvPr/>
+          </p:nvSpPr>
+          <p:spPr>
+            <a:xfrm>
+              <a:off x="1976613" y="6050551"/>
+              <a:ext cx="7537937" cy="807447"/>
+            </a:xfrm>
+            <a:prstGeom prst="rect">
+              <a:avLst/>
+            </a:prstGeom>
+            <a:solidFill>
+              <a:schemeClr val="bg1"/>
+            </a:solidFill>
+            <a:ln>
+              <a:solidFill>
+                <a:schemeClr val="bg1"/>
+              </a:solidFill>
+            </a:ln>
+          </p:spPr>
+          <p:style>
+            <a:lnRef idx="2">
+              <a:schemeClr val="accent1">
+                <a:shade val="50000"/>
+              </a:schemeClr>
+            </a:lnRef>
+            <a:fillRef idx="1">
+              <a:schemeClr val="accent1"/>
+            </a:fillRef>
+            <a:effectRef idx="0">
+              <a:schemeClr val="accent1"/>
+            </a:effectRef>
+            <a:fontRef idx="minor">
+              <a:schemeClr val="lt1"/>
+            </a:fontRef>
+          </p:style>
+          <p:txBody>
+            <a:bodyPr rtlCol="0" anchor="ctr"/>
+            <a:lstStyle/>
+            <a:p>
+              <a:pPr algn="ctr"/>
+              <a:endParaRPr lang="de-DE"/>
+            </a:p>
+          </p:txBody>
+        </p:sp>
+        <p:sp>
+          <p:nvSpPr>
+            <p:cNvPr id="15" name="Rechteck 14">
+              <a:extLst>
+                <a:ext uri="{FF2B5EF4-FFF2-40B4-BE49-F238E27FC236}">
+                  <a16:creationId xmlns:a16="http://schemas.microsoft.com/office/drawing/2014/main" id="{A32F8EBC-7A65-4B21-8AC2-35B4E931B9D2}"/>
+                </a:ext>
+              </a:extLst>
+            </p:cNvPr>
+            <p:cNvSpPr/>
+            <p:nvPr/>
+          </p:nvSpPr>
+          <p:spPr>
+            <a:xfrm rot="16200000">
+              <a:off x="5424716" y="2851667"/>
+              <a:ext cx="416052" cy="7205217"/>
+            </a:xfrm>
+            <a:prstGeom prst="rect">
+              <a:avLst/>
+            </a:prstGeom>
+            <a:solidFill>
+              <a:srgbClr val="92D050"/>
+            </a:solidFill>
+            <a:ln w="76200">
+              <a:solidFill>
+                <a:srgbClr val="92D050"/>
+              </a:solidFill>
+            </a:ln>
+            <a:effectLst>
+              <a:outerShdw blurRad="63500" sx="102000" sy="102000" algn="ctr" rotWithShape="0">
+                <a:prstClr val="black">
+                  <a:alpha val="40000"/>
+                </a:prstClr>
+              </a:outerShdw>
+            </a:effectLst>
+          </p:spPr>
+          <p:style>
+            <a:lnRef idx="2">
+              <a:schemeClr val="accent1">
+                <a:shade val="50000"/>
+              </a:schemeClr>
+            </a:lnRef>
+            <a:fillRef idx="1">
+              <a:schemeClr val="accent1"/>
+            </a:fillRef>
+            <a:effectRef idx="0">
+              <a:schemeClr val="accent1"/>
+            </a:effectRef>
+            <a:fontRef idx="minor">
+              <a:schemeClr val="lt1"/>
+            </a:fontRef>
+          </p:style>
+          <p:txBody>
+            <a:bodyPr vert="vert" rtlCol="0" anchor="ctr"/>
+            <a:lstStyle/>
+            <a:p>
+              <a:pPr algn="ctr"/>
+              <a:r>
+                <a:rPr lang="de-DE" dirty="0"/>
+                <a:t>Paint </a:t>
+              </a:r>
+              <a:r>
+                <a:rPr lang="de-DE" dirty="0" err="1"/>
+                <a:t>with</a:t>
+              </a:r>
+              <a:r>
+                <a:rPr lang="de-DE" dirty="0"/>
+                <a:t> multiple </a:t>
+              </a:r>
+              <a:r>
+                <a:rPr lang="de-DE" dirty="0" err="1"/>
+                <a:t>Brushes</a:t>
+              </a:r>
+              <a:r>
+                <a:rPr lang="de-DE" dirty="0"/>
+                <a:t> at </a:t>
+              </a:r>
+              <a:r>
+                <a:rPr lang="de-DE" dirty="0" err="1"/>
+                <a:t>the</a:t>
+              </a:r>
+              <a:r>
+                <a:rPr lang="de-DE" dirty="0"/>
+                <a:t> same Time</a:t>
+              </a:r>
+            </a:p>
+          </p:txBody>
+        </p:sp>
+      </p:grpSp>
+    </p:spTree>
+    <p:extLst>
+      <p:ext uri="{BB962C8B-B14F-4D97-AF65-F5344CB8AC3E}">
+        <p14:creationId xmlns:p14="http://schemas.microsoft.com/office/powerpoint/2010/main" val="3811245092"/>
+      </p:ext>
+    </p:extLst>
+  </p:cSld>
+  <p:clrMapOvr>
+    <a:masterClrMapping/>
+  </p:clrMapOvr>
+</p:sld>
+</file>
+
+<file path=ppt/slides/slide8.xml><?xml version="1.0" encoding="utf-8"?>
+<p:sld xmlns:a="http://schemas.openxmlformats.org/drawingml/2006/main" xmlns:r="http://schemas.openxmlformats.org/officeDocument/2006/relationships" xmlns:p="http://schemas.openxmlformats.org/presentationml/2006/main">
+  <p:cSld>
+    <p:spTree>
+      <p:nvGrpSpPr>
+        <p:cNvPr id="1" name=""/>
+        <p:cNvGrpSpPr/>
+        <p:nvPr/>
+      </p:nvGrpSpPr>
+      <p:grpSpPr>
+        <a:xfrm>
+          <a:off x="0" y="0"/>
+          <a:ext cx="0" cy="0"/>
+          <a:chOff x="0" y="0"/>
+          <a:chExt cx="0" cy="0"/>
+        </a:xfrm>
+      </p:grpSpPr>
+      <p:pic>
+        <p:nvPicPr>
+          <p:cNvPr id="3" name="Grafik 2" descr="Ein Bild, das Screenshot enthält.&#10;&#10;Mit sehr hoher Zuverlässigkeit generierte Beschreibung">
+            <a:extLst>
+              <a:ext uri="{FF2B5EF4-FFF2-40B4-BE49-F238E27FC236}">
+                <a16:creationId xmlns:a16="http://schemas.microsoft.com/office/drawing/2014/main" id="{6712D93A-2CBB-479A-AEA7-AD7E54FDD383}"/>
+              </a:ext>
+            </a:extLst>
+          </p:cNvPr>
+          <p:cNvPicPr>
+            <a:picLocks noChangeAspect="1"/>
+          </p:cNvPicPr>
+          <p:nvPr/>
+        </p:nvPicPr>
+        <p:blipFill>
+          <a:blip r:embed="rId2">
+            <a:extLst>
+              <a:ext uri="{28A0092B-C50C-407E-A947-70E740481C1C}">
+                <a14:useLocalDpi xmlns:a14="http://schemas.microsoft.com/office/drawing/2010/main" val="0"/>
+              </a:ext>
+            </a:extLst>
+          </a:blip>
+          <a:stretch>
+            <a:fillRect/>
+          </a:stretch>
+        </p:blipFill>
+        <p:spPr>
+          <a:xfrm>
+            <a:off x="2483903" y="2985890"/>
+            <a:ext cx="4315427" cy="2076740"/>
+          </a:xfrm>
+          <a:prstGeom prst="rect">
+            <a:avLst/>
+          </a:prstGeom>
+        </p:spPr>
+      </p:pic>
+      <p:grpSp>
+        <p:nvGrpSpPr>
+          <p:cNvPr id="16" name="Gruppieren 15">
+            <a:extLst>
+              <a:ext uri="{FF2B5EF4-FFF2-40B4-BE49-F238E27FC236}">
+                <a16:creationId xmlns:a16="http://schemas.microsoft.com/office/drawing/2014/main" id="{CD283649-7ECB-4AF9-8568-FB9ECCF755DF}"/>
+              </a:ext>
+            </a:extLst>
+          </p:cNvPr>
+          <p:cNvGrpSpPr/>
+          <p:nvPr/>
+        </p:nvGrpSpPr>
+        <p:grpSpPr>
+          <a:xfrm>
+            <a:off x="-4661364" y="5062630"/>
+            <a:ext cx="18605963" cy="807447"/>
+            <a:chOff x="1976613" y="6050551"/>
+            <a:chExt cx="7537937" cy="807447"/>
+          </a:xfrm>
+          <a:effectLst>
+            <a:outerShdw blurRad="50800" dist="38100" dir="2700000" algn="tl" rotWithShape="0">
+              <a:prstClr val="black">
+                <a:alpha val="40000"/>
+              </a:prstClr>
+            </a:outerShdw>
+          </a:effectLst>
+        </p:grpSpPr>
+        <p:sp>
+          <p:nvSpPr>
+            <p:cNvPr id="13" name="Rechteck 12">
+              <a:extLst>
+                <a:ext uri="{FF2B5EF4-FFF2-40B4-BE49-F238E27FC236}">
+                  <a16:creationId xmlns:a16="http://schemas.microsoft.com/office/drawing/2014/main" id="{6419E41E-BD69-42C6-9620-31B21472B185}"/>
+                </a:ext>
+              </a:extLst>
+            </p:cNvPr>
+            <p:cNvSpPr/>
+            <p:nvPr/>
+          </p:nvSpPr>
+          <p:spPr>
+            <a:xfrm>
+              <a:off x="1976613" y="6050551"/>
+              <a:ext cx="7537937" cy="807447"/>
+            </a:xfrm>
+            <a:prstGeom prst="rect">
+              <a:avLst/>
+            </a:prstGeom>
+            <a:solidFill>
+              <a:schemeClr val="bg1"/>
+            </a:solidFill>
+            <a:ln>
+              <a:solidFill>
+                <a:schemeClr val="bg1"/>
+              </a:solidFill>
+            </a:ln>
+          </p:spPr>
+          <p:style>
+            <a:lnRef idx="2">
+              <a:schemeClr val="accent1">
+                <a:shade val="50000"/>
+              </a:schemeClr>
+            </a:lnRef>
+            <a:fillRef idx="1">
+              <a:schemeClr val="accent1"/>
+            </a:fillRef>
+            <a:effectRef idx="0">
+              <a:schemeClr val="accent1"/>
+            </a:effectRef>
+            <a:fontRef idx="minor">
+              <a:schemeClr val="lt1"/>
+            </a:fontRef>
+          </p:style>
+          <p:txBody>
+            <a:bodyPr rtlCol="0" anchor="ctr"/>
+            <a:lstStyle/>
+            <a:p>
+              <a:pPr algn="ctr"/>
+              <a:endParaRPr lang="de-DE"/>
+            </a:p>
+          </p:txBody>
+        </p:sp>
+        <p:sp>
+          <p:nvSpPr>
+            <p:cNvPr id="15" name="Rechteck 14">
+              <a:extLst>
+                <a:ext uri="{FF2B5EF4-FFF2-40B4-BE49-F238E27FC236}">
+                  <a16:creationId xmlns:a16="http://schemas.microsoft.com/office/drawing/2014/main" id="{A32F8EBC-7A65-4B21-8AC2-35B4E931B9D2}"/>
+                </a:ext>
+              </a:extLst>
+            </p:cNvPr>
+            <p:cNvSpPr/>
+            <p:nvPr/>
+          </p:nvSpPr>
+          <p:spPr>
+            <a:xfrm rot="16200000">
+              <a:off x="5424716" y="2851667"/>
+              <a:ext cx="416052" cy="7205217"/>
+            </a:xfrm>
+            <a:prstGeom prst="rect">
+              <a:avLst/>
+            </a:prstGeom>
+            <a:solidFill>
+              <a:srgbClr val="92D050"/>
+            </a:solidFill>
+            <a:ln w="76200">
+              <a:solidFill>
+                <a:srgbClr val="92D050"/>
+              </a:solidFill>
+            </a:ln>
+            <a:effectLst>
+              <a:outerShdw blurRad="63500" sx="102000" sy="102000" algn="ctr" rotWithShape="0">
+                <a:prstClr val="black">
+                  <a:alpha val="40000"/>
+                </a:prstClr>
+              </a:outerShdw>
+            </a:effectLst>
+          </p:spPr>
+          <p:style>
+            <a:lnRef idx="2">
+              <a:schemeClr val="accent1">
+                <a:shade val="50000"/>
+              </a:schemeClr>
+            </a:lnRef>
+            <a:fillRef idx="1">
+              <a:schemeClr val="accent1"/>
+            </a:fillRef>
+            <a:effectRef idx="0">
+              <a:schemeClr val="accent1"/>
+            </a:effectRef>
+            <a:fontRef idx="minor">
+              <a:schemeClr val="lt1"/>
+            </a:fontRef>
+          </p:style>
+          <p:txBody>
+            <a:bodyPr vert="vert" rtlCol="0" anchor="ctr"/>
+            <a:lstStyle/>
+            <a:p>
+              <a:pPr algn="ctr"/>
+              <a:r>
+                <a:rPr lang="de-DE" dirty="0"/>
+                <a:t>Save and </a:t>
+              </a:r>
+              <a:r>
+                <a:rPr lang="de-DE" dirty="0" err="1"/>
+                <a:t>share</a:t>
+              </a:r>
+              <a:r>
+                <a:rPr lang="de-DE" dirty="0"/>
+                <a:t> </a:t>
+              </a:r>
+              <a:r>
+                <a:rPr lang="de-DE" dirty="0" err="1"/>
+                <a:t>your</a:t>
+              </a:r>
+              <a:r>
+                <a:rPr lang="de-DE" dirty="0"/>
+                <a:t> </a:t>
+              </a:r>
+              <a:r>
+                <a:rPr lang="de-DE" dirty="0" err="1"/>
+                <a:t>Brush</a:t>
+              </a:r>
+              <a:r>
+                <a:rPr lang="de-DE" dirty="0"/>
+                <a:t> Collections</a:t>
+              </a:r>
+            </a:p>
+          </p:txBody>
+        </p:sp>
+      </p:grpSp>
+    </p:spTree>
+    <p:extLst>
+      <p:ext uri="{BB962C8B-B14F-4D97-AF65-F5344CB8AC3E}">
+        <p14:creationId xmlns:p14="http://schemas.microsoft.com/office/powerpoint/2010/main" val="3466322720"/>
+      </p:ext>
+    </p:extLst>
+  </p:cSld>
+  <p:clrMapOvr>
+    <a:masterClrMapping/>
+  </p:clrMapOvr>
+</p:sld>
+</file>
+
+<file path=ppt/slides/slide9.xml><?xml version="1.0" encoding="utf-8"?>
+<p:sld xmlns:a="http://schemas.openxmlformats.org/drawingml/2006/main" xmlns:r="http://schemas.openxmlformats.org/officeDocument/2006/relationships" xmlns:p="http://schemas.openxmlformats.org/presentationml/2006/main">
+  <p:cSld>
+    <p:spTree>
+      <p:nvGrpSpPr>
+        <p:cNvPr id="1" name=""/>
+        <p:cNvGrpSpPr/>
+        <p:nvPr/>
+      </p:nvGrpSpPr>
+      <p:grpSpPr>
+        <a:xfrm>
+          <a:off x="0" y="0"/>
+          <a:ext cx="0" cy="0"/>
+          <a:chOff x="0" y="0"/>
+          <a:chExt cx="0" cy="0"/>
+        </a:xfrm>
+      </p:grpSpPr>
+      <p:pic>
+        <p:nvPicPr>
+          <p:cNvPr id="2" name="Grafik 1">
+            <a:extLst>
+              <a:ext uri="{FF2B5EF4-FFF2-40B4-BE49-F238E27FC236}">
+                <a16:creationId xmlns:a16="http://schemas.microsoft.com/office/drawing/2014/main" id="{12948F9E-0F38-44A8-9B70-73DB54F2EBCA}"/>
+              </a:ext>
+            </a:extLst>
+          </p:cNvPr>
+          <p:cNvPicPr>
+            <a:picLocks noChangeAspect="1"/>
+          </p:cNvPicPr>
+          <p:nvPr/>
+        </p:nvPicPr>
+        <p:blipFill>
+          <a:blip r:embed="rId2"/>
+          <a:stretch>
+            <a:fillRect/>
+          </a:stretch>
+        </p:blipFill>
+        <p:spPr>
+          <a:xfrm>
+            <a:off x="2286000" y="2195605"/>
+            <a:ext cx="5391150" cy="2867025"/>
+          </a:xfrm>
+          <a:prstGeom prst="rect">
+            <a:avLst/>
+          </a:prstGeom>
+        </p:spPr>
+      </p:pic>
+      <p:grpSp>
+        <p:nvGrpSpPr>
+          <p:cNvPr id="16" name="Gruppieren 15">
+            <a:extLst>
+              <a:ext uri="{FF2B5EF4-FFF2-40B4-BE49-F238E27FC236}">
+                <a16:creationId xmlns:a16="http://schemas.microsoft.com/office/drawing/2014/main" id="{CD283649-7ECB-4AF9-8568-FB9ECCF755DF}"/>
+              </a:ext>
+            </a:extLst>
+          </p:cNvPr>
+          <p:cNvGrpSpPr/>
+          <p:nvPr/>
+        </p:nvGrpSpPr>
+        <p:grpSpPr>
+          <a:xfrm>
+            <a:off x="-4661364" y="5062630"/>
+            <a:ext cx="18605963" cy="807447"/>
+            <a:chOff x="1976613" y="6050551"/>
+            <a:chExt cx="7537937" cy="807447"/>
+          </a:xfrm>
+          <a:effectLst>
+            <a:outerShdw blurRad="50800" dist="38100" dir="2700000" algn="tl" rotWithShape="0">
+              <a:prstClr val="black">
+                <a:alpha val="40000"/>
+              </a:prstClr>
+            </a:outerShdw>
+          </a:effectLst>
+        </p:grpSpPr>
+        <p:sp>
+          <p:nvSpPr>
+            <p:cNvPr id="13" name="Rechteck 12">
+              <a:extLst>
+                <a:ext uri="{FF2B5EF4-FFF2-40B4-BE49-F238E27FC236}">
+                  <a16:creationId xmlns:a16="http://schemas.microsoft.com/office/drawing/2014/main" id="{6419E41E-BD69-42C6-9620-31B21472B185}"/>
+                </a:ext>
+              </a:extLst>
+            </p:cNvPr>
+            <p:cNvSpPr/>
+            <p:nvPr/>
+          </p:nvSpPr>
+          <p:spPr>
+            <a:xfrm>
+              <a:off x="1976613" y="6050551"/>
+              <a:ext cx="7537937" cy="807447"/>
+            </a:xfrm>
+            <a:prstGeom prst="rect">
+              <a:avLst/>
+            </a:prstGeom>
+            <a:solidFill>
+              <a:schemeClr val="bg1"/>
+            </a:solidFill>
+            <a:ln>
+              <a:solidFill>
+                <a:schemeClr val="bg1"/>
+              </a:solidFill>
+            </a:ln>
+          </p:spPr>
+          <p:style>
+            <a:lnRef idx="2">
+              <a:schemeClr val="accent1">
+                <a:shade val="50000"/>
+              </a:schemeClr>
+            </a:lnRef>
+            <a:fillRef idx="1">
+              <a:schemeClr val="accent1"/>
+            </a:fillRef>
+            <a:effectRef idx="0">
+              <a:schemeClr val="accent1"/>
+            </a:effectRef>
+            <a:fontRef idx="minor">
+              <a:schemeClr val="lt1"/>
+            </a:fontRef>
+          </p:style>
+          <p:txBody>
+            <a:bodyPr rtlCol="0" anchor="ctr"/>
+            <a:lstStyle/>
+            <a:p>
+              <a:pPr algn="ctr"/>
+              <a:endParaRPr lang="de-DE"/>
+            </a:p>
+          </p:txBody>
+        </p:sp>
+        <p:sp>
+          <p:nvSpPr>
+            <p:cNvPr id="15" name="Rechteck 14">
+              <a:extLst>
+                <a:ext uri="{FF2B5EF4-FFF2-40B4-BE49-F238E27FC236}">
+                  <a16:creationId xmlns:a16="http://schemas.microsoft.com/office/drawing/2014/main" id="{A32F8EBC-7A65-4B21-8AC2-35B4E931B9D2}"/>
+                </a:ext>
+              </a:extLst>
+            </p:cNvPr>
+            <p:cNvSpPr/>
+            <p:nvPr/>
+          </p:nvSpPr>
+          <p:spPr>
+            <a:xfrm rot="16200000">
+              <a:off x="5424716" y="2851667"/>
+              <a:ext cx="416052" cy="7205217"/>
+            </a:xfrm>
+            <a:prstGeom prst="rect">
+              <a:avLst/>
+            </a:prstGeom>
+            <a:solidFill>
+              <a:srgbClr val="92D050"/>
+            </a:solidFill>
+            <a:ln w="76200">
+              <a:solidFill>
+                <a:srgbClr val="92D050"/>
+              </a:solidFill>
+            </a:ln>
+            <a:effectLst>
+              <a:outerShdw blurRad="63500" sx="102000" sy="102000" algn="ctr" rotWithShape="0">
+                <a:prstClr val="black">
+                  <a:alpha val="40000"/>
+                </a:prstClr>
+              </a:outerShdw>
+            </a:effectLst>
+          </p:spPr>
+          <p:style>
+            <a:lnRef idx="2">
+              <a:schemeClr val="accent1">
+                <a:shade val="50000"/>
+              </a:schemeClr>
+            </a:lnRef>
+            <a:fillRef idx="1">
+              <a:schemeClr val="accent1"/>
+            </a:fillRef>
+            <a:effectRef idx="0">
+              <a:schemeClr val="accent1"/>
+            </a:effectRef>
+            <a:fontRef idx="minor">
+              <a:schemeClr val="lt1"/>
+            </a:fontRef>
+          </p:style>
+          <p:txBody>
+            <a:bodyPr vert="vert" rtlCol="0" anchor="ctr"/>
+            <a:lstStyle/>
+            <a:p>
+              <a:pPr algn="ctr"/>
+              <a:r>
+                <a:rPr lang="de-DE" dirty="0" err="1"/>
+                <a:t>Customize</a:t>
+              </a:r>
+              <a:r>
+                <a:rPr lang="de-DE" dirty="0"/>
+                <a:t> </a:t>
+              </a:r>
+              <a:r>
+                <a:rPr lang="de-DE" dirty="0" err="1"/>
+                <a:t>every</a:t>
+              </a:r>
+              <a:r>
+                <a:rPr lang="de-DE" dirty="0"/>
+                <a:t> </a:t>
+              </a:r>
+              <a:r>
+                <a:rPr lang="de-DE" dirty="0" err="1"/>
+                <a:t>little</a:t>
+              </a:r>
+              <a:r>
+                <a:rPr lang="de-DE" dirty="0"/>
+                <a:t> Detail </a:t>
+              </a:r>
+              <a:r>
+                <a:rPr lang="de-DE" dirty="0" err="1"/>
+                <a:t>of</a:t>
+              </a:r>
+              <a:r>
+                <a:rPr lang="de-DE" dirty="0"/>
+                <a:t> </a:t>
+              </a:r>
+              <a:r>
+                <a:rPr lang="de-DE" dirty="0" err="1"/>
+                <a:t>your</a:t>
+              </a:r>
+              <a:r>
+                <a:rPr lang="de-DE" dirty="0"/>
+                <a:t> </a:t>
+              </a:r>
+              <a:r>
+                <a:rPr lang="de-DE" dirty="0" err="1"/>
+                <a:t>Brush</a:t>
+              </a:r>
+              <a:endParaRPr lang="de-DE" dirty="0"/>
+            </a:p>
+          </p:txBody>
+        </p:sp>
+      </p:grpSp>
+    </p:spTree>
+    <p:extLst>
+      <p:ext uri="{BB962C8B-B14F-4D97-AF65-F5344CB8AC3E}">
+        <p14:creationId xmlns:p14="http://schemas.microsoft.com/office/powerpoint/2010/main" val="263101314"/>
       </p:ext>
     </p:extLst>
   </p:cSld>

</xml_diff>